<commit_message>
gave up on the three... kept getting worse
</commit_message>
<xml_diff>
--- a/output/comprehensive_demo_dark.pptx
+++ b/output/comprehensive_demo_dark.pptx
@@ -6872,7 +6872,7 @@
         <p:spPr>
           <a:xfrm>
             <a:off x="200025" y="1171575"/>
-            <a:ext cx="8943975" cy="1866899"/>
+            <a:ext cx="8943975" cy="2152650"/>
           </a:xfrm>
           <a:prstGeom prst="rect">
             <a:avLst/>
@@ -6927,7 +6927,7 @@
         </p:nvSpPr>
         <p:spPr>
           <a:xfrm>
-            <a:off x="200025" y="3181350"/>
+            <a:off x="200025" y="3467100"/>
             <a:ext cx="8943975" cy="274320"/>
           </a:xfrm>
           <a:prstGeom prst="rect">
@@ -6974,7 +6974,7 @@
         </p:nvSpPr>
         <p:spPr>
           <a:xfrm>
-            <a:off x="200025" y="3514725"/>
+            <a:off x="200025" y="3800475"/>
             <a:ext cx="8943975" cy="666750"/>
           </a:xfrm>
           <a:prstGeom prst="rect">
@@ -7127,7 +7127,7 @@
         </p:nvSpPr>
         <p:spPr>
           <a:xfrm>
-            <a:off x="200025" y="4286250"/>
+            <a:off x="200025" y="4572000"/>
             <a:ext cx="8943975" cy="274320"/>
           </a:xfrm>
           <a:prstGeom prst="rect">
@@ -12824,7 +12824,7 @@
         <p:spPr>
           <a:xfrm>
             <a:off x="200025" y="885825"/>
-            <a:ext cx="8943975" cy="1866899"/>
+            <a:ext cx="8943975" cy="2152650"/>
           </a:xfrm>
           <a:prstGeom prst="rect">
             <a:avLst/>
@@ -12880,7 +12880,7 @@
         </p:nvSpPr>
         <p:spPr>
           <a:xfrm>
-            <a:off x="200025" y="2895600"/>
+            <a:off x="200025" y="3181350"/>
             <a:ext cx="8943975" cy="274320"/>
           </a:xfrm>
           <a:prstGeom prst="rect">
@@ -12927,8 +12927,8 @@
         </p:nvSpPr>
         <p:spPr>
           <a:xfrm>
-            <a:off x="200025" y="3228975"/>
-            <a:ext cx="8943975" cy="1866899"/>
+            <a:off x="200025" y="3514725"/>
+            <a:ext cx="8943975" cy="2152650"/>
           </a:xfrm>
           <a:prstGeom prst="rect">
             <a:avLst/>
@@ -12985,7 +12985,7 @@
         </p:nvSpPr>
         <p:spPr>
           <a:xfrm>
-            <a:off x="200025" y="5238749"/>
+            <a:off x="200025" y="5810249"/>
             <a:ext cx="8943975" cy="274320"/>
           </a:xfrm>
           <a:prstGeom prst="rect">
@@ -13051,7 +13051,7 @@
         <p:spPr>
           <a:xfrm>
             <a:off x="200025" y="180975"/>
-            <a:ext cx="8943975" cy="2276474"/>
+            <a:ext cx="8943975" cy="2562224"/>
           </a:xfrm>
           <a:prstGeom prst="rect">
             <a:avLst/>

</xml_diff>

<commit_message>
add support for strikethrough, hyperlink
</commit_message>
<xml_diff>
--- a/output/comprehensive_demo_dark.pptx
+++ b/output/comprehensive_demo_dark.pptx
@@ -8021,8 +8021,8 @@
         </p:nvSpPr>
         <p:spPr>
           <a:xfrm>
-            <a:off x="276225" y="3438525"/>
-            <a:ext cx="8867775" cy="274320"/>
+            <a:off x="228600" y="3438525"/>
+            <a:ext cx="8915400" cy="274320"/>
           </a:xfrm>
           <a:prstGeom prst="rect">
             <a:avLst/>
@@ -8071,7 +8071,7 @@
         </p:nvSpPr>
         <p:spPr>
           <a:xfrm>
-            <a:off x="276225" y="3705224"/>
+            <a:off x="228600" y="3705224"/>
             <a:ext cx="1800225" cy="1628775"/>
           </a:xfrm>
           <a:prstGeom prst="rect">
@@ -8105,7 +8105,7 @@
           <p:nvPr/>
         </p:nvGraphicFramePr>
         <p:xfrm>
-          <a:off x="276225" y="3705224"/>
+          <a:off x="228600" y="3705224"/>
           <a:ext cx="1978854" cy="1571625"/>
         </p:xfrm>
         <a:graphic>
@@ -8876,8 +8876,8 @@
         </p:nvSpPr>
         <p:spPr>
           <a:xfrm>
-            <a:off x="4800600" y="3457575"/>
-            <a:ext cx="4343400" cy="274320"/>
+            <a:off x="4648200" y="3457575"/>
+            <a:ext cx="4495799" cy="274320"/>
           </a:xfrm>
           <a:prstGeom prst="rect">
             <a:avLst/>
@@ -8926,8 +8926,8 @@
         </p:nvSpPr>
         <p:spPr>
           <a:xfrm>
-            <a:off x="4800600" y="3724274"/>
-            <a:ext cx="4343400" cy="342900"/>
+            <a:off x="4648200" y="3724274"/>
+            <a:ext cx="4495799" cy="342900"/>
           </a:xfrm>
           <a:prstGeom prst="rect">
             <a:avLst/>
@@ -9060,7 +9060,7 @@
         </p:blipFill>
         <p:spPr>
           <a:xfrm>
-            <a:off x="276225" y="542925"/>
+            <a:off x="228600" y="542925"/>
             <a:ext cx="3809999" cy="2857500"/>
           </a:xfrm>
           <a:prstGeom prst="rect">
@@ -9076,8 +9076,8 @@
         </p:nvSpPr>
         <p:spPr>
           <a:xfrm>
-            <a:off x="4800600" y="638175"/>
-            <a:ext cx="4343400" cy="342900"/>
+            <a:off x="4648200" y="638175"/>
+            <a:ext cx="4495799" cy="342900"/>
           </a:xfrm>
           <a:prstGeom prst="rect">
             <a:avLst/>
@@ -9210,7 +9210,7 @@
         </p:blipFill>
         <p:spPr>
           <a:xfrm>
-            <a:off x="276225" y="542925"/>
+            <a:off x="228600" y="542925"/>
             <a:ext cx="2857500" cy="2857500"/>
           </a:xfrm>
           <a:prstGeom prst="rect">
@@ -9226,7 +9226,7 @@
         </p:nvSpPr>
         <p:spPr>
           <a:xfrm>
-            <a:off x="4800600" y="542925"/>
+            <a:off x="4648200" y="542925"/>
             <a:ext cx="923924" cy="1333500"/>
           </a:xfrm>
           <a:prstGeom prst="rect">
@@ -9260,7 +9260,7 @@
           <p:nvPr/>
         </p:nvGraphicFramePr>
         <p:xfrm>
-          <a:off x="4800600" y="542925"/>
+          <a:off x="4648200" y="542925"/>
           <a:ext cx="1014352" cy="1285872"/>
         </p:xfrm>
         <a:graphic>
@@ -9761,8 +9761,8 @@
         </p:nvSpPr>
         <p:spPr>
           <a:xfrm>
-            <a:off x="276225" y="542925"/>
-            <a:ext cx="8867775" cy="274320"/>
+            <a:off x="228600" y="542925"/>
+            <a:ext cx="8915400" cy="274320"/>
           </a:xfrm>
           <a:prstGeom prst="rect">
             <a:avLst/>
@@ -9811,7 +9811,7 @@
         </p:nvSpPr>
         <p:spPr>
           <a:xfrm>
-            <a:off x="276225" y="800100"/>
+            <a:off x="228600" y="800100"/>
             <a:ext cx="1800225" cy="1628775"/>
           </a:xfrm>
           <a:prstGeom prst="rect">
@@ -9845,7 +9845,7 @@
           <p:nvPr/>
         </p:nvGraphicFramePr>
         <p:xfrm>
-          <a:off x="276225" y="800100"/>
+          <a:off x="228600" y="800100"/>
           <a:ext cx="1978854" cy="1571625"/>
         </p:xfrm>
         <a:graphic>
@@ -10616,8 +10616,8 @@
         </p:nvSpPr>
         <p:spPr>
           <a:xfrm>
-            <a:off x="5972175" y="561974"/>
-            <a:ext cx="3171825" cy="274320"/>
+            <a:off x="5619750" y="561974"/>
+            <a:ext cx="3524250" cy="274320"/>
           </a:xfrm>
           <a:prstGeom prst="rect">
             <a:avLst/>
@@ -10666,8 +10666,8 @@
         </p:nvSpPr>
         <p:spPr>
           <a:xfrm>
-            <a:off x="5972175" y="819149"/>
-            <a:ext cx="3171825" cy="342900"/>
+            <a:off x="5619750" y="819149"/>
+            <a:ext cx="3524250" cy="342900"/>
           </a:xfrm>
           <a:prstGeom prst="rect">
             <a:avLst/>
@@ -11227,7 +11227,289 @@
         </p:nvSpPr>
         <p:spPr>
           <a:xfrm>
-            <a:off x="200025" y="1943100"/>
+            <a:off x="200025" y="2038349"/>
+            <a:ext cx="8943975" cy="274320"/>
+          </a:xfrm>
+          <a:prstGeom prst="rect">
+            <a:avLst/>
+          </a:prstGeom>
+          <a:noFill/>
+        </p:spPr>
+        <p:txBody>
+          <a:bodyPr wrap="square" lIns="0" rIns="0" tIns="0" bIns="0">
+            <a:spAutoFit/>
+          </a:bodyPr>
+          <a:lstStyle/>
+          <a:p>
+            <a:pPr algn="l">
+              <a:lnSpc>
+                <a:spcPct val="100000"/>
+              </a:lnSpc>
+              <a:spcBef>
+                <a:spcPts val="0"/>
+              </a:spcBef>
+              <a:spcAft>
+                <a:spcPts val="0"/>
+              </a:spcAft>
+              <a:defRPr>
+                <a:solidFill>
+                  <a:srgbClr val="E0E0E0"/>
+                </a:solidFill>
+              </a:defRPr>
+            </a:pPr>
+            <a:r>
+              <a:rPr strike="sngStrike" sz="700">
+                <a:solidFill>
+                  <a:srgbClr val="E0E0E0"/>
+                </a:solidFill>
+                <a:latin typeface="Arial"/>
+              </a:rPr>
+              <a:t>strikethrough text</a:t>
+            </a:r>
+            <a:r>
+              <a:rPr sz="700">
+                <a:solidFill>
+                  <a:srgbClr val="E0E0E0"/>
+                </a:solidFill>
+                <a:latin typeface="Arial"/>
+              </a:rPr>
+              <a:t> using double tilde for </a:t>
+            </a:r>
+            <a:r>
+              <a:rPr strike="sngStrike" sz="700">
+                <a:solidFill>
+                  <a:srgbClr val="E0E0E0"/>
+                </a:solidFill>
+                <a:latin typeface="Arial"/>
+              </a:rPr>
+              <a:t>deleted text</a:t>
+            </a:r>
+            <a:r>
+              <a:rPr sz="700">
+                <a:solidFill>
+                  <a:srgbClr val="E0E0E0"/>
+                </a:solidFill>
+                <a:latin typeface="Arial"/>
+              </a:rPr>
+              <a:t>.</a:t>
+            </a:r>
+          </a:p>
+        </p:txBody>
+      </p:sp>
+      <p:sp>
+        <p:nvSpPr>
+          <p:cNvPr id="10" name="TextBox 9"/>
+          <p:cNvSpPr txBox="1"/>
+          <p:nvPr/>
+        </p:nvSpPr>
+        <p:spPr>
+          <a:xfrm>
+            <a:off x="200025" y="2266950"/>
+            <a:ext cx="8943975" cy="274320"/>
+          </a:xfrm>
+          <a:prstGeom prst="rect">
+            <a:avLst/>
+          </a:prstGeom>
+          <a:noFill/>
+        </p:spPr>
+        <p:txBody>
+          <a:bodyPr wrap="square" lIns="0" rIns="0" tIns="0" bIns="0">
+            <a:spAutoFit/>
+          </a:bodyPr>
+          <a:lstStyle/>
+          <a:p>
+            <a:pPr algn="l">
+              <a:lnSpc>
+                <a:spcPct val="100000"/>
+              </a:lnSpc>
+              <a:spcBef>
+                <a:spcPts val="0"/>
+              </a:spcBef>
+              <a:spcAft>
+                <a:spcPts val="0"/>
+              </a:spcAft>
+              <a:defRPr>
+                <a:solidFill>
+                  <a:srgbClr val="E0E0E0"/>
+                </a:solidFill>
+              </a:defRPr>
+            </a:pPr>
+            <a:r>
+              <a:rPr u="wavy" sz="700">
+                <a:solidFill>
+                  <a:srgbClr val="E0E0E0"/>
+                </a:solidFill>
+                <a:latin typeface="Arial"/>
+              </a:rPr>
+              <a:t>wavy underlined text</a:t>
+            </a:r>
+            <a:r>
+              <a:rPr sz="700">
+                <a:solidFill>
+                  <a:srgbClr val="E0E0E0"/>
+                </a:solidFill>
+                <a:latin typeface="Arial"/>
+              </a:rPr>
+              <a:t> using double caret for </a:t>
+            </a:r>
+            <a:r>
+              <a:rPr u="wavy" sz="700">
+                <a:solidFill>
+                  <a:srgbClr val="E0E0E0"/>
+                </a:solidFill>
+                <a:latin typeface="Arial"/>
+              </a:rPr>
+              <a:t>emphasized information</a:t>
+            </a:r>
+            <a:r>
+              <a:rPr sz="700">
+                <a:solidFill>
+                  <a:srgbClr val="E0E0E0"/>
+                </a:solidFill>
+                <a:latin typeface="Arial"/>
+              </a:rPr>
+              <a:t>.</a:t>
+            </a:r>
+          </a:p>
+        </p:txBody>
+      </p:sp>
+      <p:sp>
+        <p:nvSpPr>
+          <p:cNvPr id="11" name="TextBox 10"/>
+          <p:cNvSpPr txBox="1"/>
+          <p:nvPr/>
+        </p:nvSpPr>
+        <p:spPr>
+          <a:xfrm>
+            <a:off x="200025" y="2495550"/>
+            <a:ext cx="8943975" cy="274320"/>
+          </a:xfrm>
+          <a:prstGeom prst="rect">
+            <a:avLst/>
+          </a:prstGeom>
+          <a:noFill/>
+        </p:spPr>
+        <p:txBody>
+          <a:bodyPr wrap="square" lIns="0" rIns="0" tIns="0" bIns="0">
+            <a:spAutoFit/>
+          </a:bodyPr>
+          <a:lstStyle/>
+          <a:p>
+            <a:pPr algn="l">
+              <a:lnSpc>
+                <a:spcPct val="100000"/>
+              </a:lnSpc>
+              <a:spcBef>
+                <a:spcPts val="0"/>
+              </a:spcBef>
+              <a:spcAft>
+                <a:spcPts val="0"/>
+              </a:spcAft>
+              <a:defRPr>
+                <a:solidFill>
+                  <a:srgbClr val="E0E0E0"/>
+                </a:solidFill>
+              </a:defRPr>
+            </a:pPr>
+            <a:r>
+              <a:rPr sz="700">
+                <a:solidFill>
+                  <a:srgbClr val="E0E0E0"/>
+                </a:solidFill>
+                <a:latin typeface="Arial"/>
+              </a:rPr>
+              <a:t>A sentence with a </a:t>
+            </a:r>
+            <a:r>
+              <a:rPr u="sng" sz="700">
+                <a:solidFill>
+                  <a:srgbClr val="0066CC"/>
+                </a:solidFill>
+                <a:latin typeface="Arial"/>
+                <a:hlinkClick r:id="rId2"/>
+              </a:rPr>
+              <a:t>Google</a:t>
+            </a:r>
+            <a:r>
+              <a:rPr sz="700">
+                <a:solidFill>
+                  <a:srgbClr val="E0E0E0"/>
+                </a:solidFill>
+                <a:latin typeface="Arial"/>
+              </a:rPr>
+              <a:t> hyperlink embedded.</a:t>
+            </a:r>
+          </a:p>
+        </p:txBody>
+      </p:sp>
+      <p:sp>
+        <p:nvSpPr>
+          <p:cNvPr id="12" name="TextBox 11"/>
+          <p:cNvSpPr txBox="1"/>
+          <p:nvPr/>
+        </p:nvSpPr>
+        <p:spPr>
+          <a:xfrm>
+            <a:off x="200025" y="2724150"/>
+            <a:ext cx="8943975" cy="274320"/>
+          </a:xfrm>
+          <a:prstGeom prst="rect">
+            <a:avLst/>
+          </a:prstGeom>
+          <a:noFill/>
+        </p:spPr>
+        <p:txBody>
+          <a:bodyPr wrap="square" lIns="0" rIns="0" tIns="0" bIns="0">
+            <a:spAutoFit/>
+          </a:bodyPr>
+          <a:lstStyle/>
+          <a:p>
+            <a:pPr algn="l">
+              <a:lnSpc>
+                <a:spcPct val="100000"/>
+              </a:lnSpc>
+              <a:spcBef>
+                <a:spcPts val="0"/>
+              </a:spcBef>
+              <a:spcAft>
+                <a:spcPts val="0"/>
+              </a:spcAft>
+              <a:defRPr>
+                <a:solidFill>
+                  <a:srgbClr val="E0E0E0"/>
+                </a:solidFill>
+              </a:defRPr>
+            </a:pPr>
+            <a:r>
+              <a:rPr sz="700">
+                <a:solidFill>
+                  <a:srgbClr val="FF0000"/>
+                </a:solidFill>
+                <a:latin typeface="Arial"/>
+              </a:rPr>
+              <a:t>Colorful text</a:t>
+            </a:r>
+            <a:r>
+              <a:rPr sz="700">
+                <a:solidFill>
+                  <a:srgbClr val="E0E0E0"/>
+                </a:solidFill>
+                <a:latin typeface="Arial"/>
+              </a:rPr>
+              <a:t> demonstrates inline color customization.</a:t>
+            </a:r>
+          </a:p>
+        </p:txBody>
+      </p:sp>
+      <p:sp>
+        <p:nvSpPr>
+          <p:cNvPr id="13" name="TextBox 12"/>
+          <p:cNvSpPr txBox="1"/>
+          <p:nvPr/>
+        </p:nvSpPr>
+        <p:spPr>
+          <a:xfrm>
+            <a:off x="200025" y="2857500"/>
             <a:ext cx="8943975" cy="304800"/>
           </a:xfrm>
           <a:prstGeom prst="rect">
@@ -11271,13 +11553,13 @@
       </p:sp>
       <p:sp>
         <p:nvSpPr>
-          <p:cNvPr id="10" name="TextBox 9"/>
+          <p:cNvPr id="14" name="TextBox 13"/>
           <p:cNvSpPr txBox="1"/>
           <p:nvPr/>
         </p:nvSpPr>
         <p:spPr>
           <a:xfrm>
-            <a:off x="200025" y="2247899"/>
+            <a:off x="200025" y="3162299"/>
             <a:ext cx="8943975" cy="723900"/>
           </a:xfrm>
           <a:prstGeom prst="rect">
@@ -11516,13 +11798,13 @@
       </p:sp>
       <p:sp>
         <p:nvSpPr>
-          <p:cNvPr id="11" name="TextBox 10"/>
+          <p:cNvPr id="15" name="TextBox 14"/>
           <p:cNvSpPr txBox="1"/>
           <p:nvPr/>
         </p:nvSpPr>
         <p:spPr>
           <a:xfrm>
-            <a:off x="200025" y="2886075"/>
+            <a:off x="200025" y="3800475"/>
             <a:ext cx="8943975" cy="304800"/>
           </a:xfrm>
           <a:prstGeom prst="rect">
@@ -11566,13 +11848,13 @@
       </p:sp>
       <p:sp>
         <p:nvSpPr>
-          <p:cNvPr id="12" name="TextBox 11"/>
+          <p:cNvPr id="16" name="TextBox 15"/>
           <p:cNvSpPr txBox="1"/>
           <p:nvPr/>
         </p:nvSpPr>
         <p:spPr>
           <a:xfrm>
-            <a:off x="200025" y="3200400"/>
+            <a:off x="200025" y="4114800"/>
             <a:ext cx="8943975" cy="274320"/>
           </a:xfrm>
           <a:prstGeom prst="rect">
@@ -11706,13 +11988,13 @@
       </p:sp>
       <p:sp>
         <p:nvSpPr>
-          <p:cNvPr id="13" name="TextBox 12"/>
+          <p:cNvPr id="17" name="TextBox 16"/>
           <p:cNvSpPr txBox="1"/>
           <p:nvPr/>
         </p:nvSpPr>
         <p:spPr>
           <a:xfrm>
-            <a:off x="200025" y="3476624"/>
+            <a:off x="200025" y="4391025"/>
             <a:ext cx="8943975" cy="274320"/>
           </a:xfrm>
           <a:prstGeom prst="rect">
@@ -11910,8 +12192,8 @@
         </p:nvSpPr>
         <p:spPr>
           <a:xfrm>
-            <a:off x="276225" y="542925"/>
-            <a:ext cx="8867775" cy="274320"/>
+            <a:off x="228600" y="542925"/>
+            <a:ext cx="8915400" cy="274320"/>
           </a:xfrm>
           <a:prstGeom prst="rect">
             <a:avLst/>
@@ -11960,7 +12242,7 @@
         </p:nvSpPr>
         <p:spPr>
           <a:xfrm>
-            <a:off x="276225" y="800100"/>
+            <a:off x="228600" y="800100"/>
             <a:ext cx="1800225" cy="1628775"/>
           </a:xfrm>
           <a:prstGeom prst="rect">
@@ -11994,7 +12276,7 @@
           <p:nvPr/>
         </p:nvGraphicFramePr>
         <p:xfrm>
-          <a:off x="276225" y="800100"/>
+          <a:off x="228600" y="800100"/>
           <a:ext cx="1978854" cy="1571625"/>
         </p:xfrm>
         <a:graphic>
@@ -12765,8 +13047,8 @@
         </p:nvSpPr>
         <p:spPr>
           <a:xfrm>
-            <a:off x="2533649" y="561974"/>
-            <a:ext cx="6610349" cy="274320"/>
+            <a:off x="2181225" y="561974"/>
+            <a:ext cx="6962775" cy="274320"/>
           </a:xfrm>
           <a:prstGeom prst="rect">
             <a:avLst/>
@@ -12815,8 +13097,8 @@
         </p:nvSpPr>
         <p:spPr>
           <a:xfrm>
-            <a:off x="2533649" y="819149"/>
-            <a:ext cx="6610349" cy="274320"/>
+            <a:off x="2181225" y="819149"/>
+            <a:ext cx="6962775" cy="274320"/>
           </a:xfrm>
           <a:prstGeom prst="rect">
             <a:avLst/>

</xml_diff>

<commit_message>
use plugin attributes for color and strikethrough, etc.
</commit_message>
<xml_diff>
--- a/output/comprehensive_demo_dark.pptx
+++ b/output/comprehensive_demo_dark.pptx
@@ -10616,8 +10616,8 @@
         </p:nvSpPr>
         <p:spPr>
           <a:xfrm>
-            <a:off x="5619750" y="561974"/>
-            <a:ext cx="3524250" cy="274320"/>
+            <a:off x="4648200" y="561974"/>
+            <a:ext cx="4495799" cy="274320"/>
           </a:xfrm>
           <a:prstGeom prst="rect">
             <a:avLst/>
@@ -10666,8 +10666,8 @@
         </p:nvSpPr>
         <p:spPr>
           <a:xfrm>
-            <a:off x="5619750" y="819149"/>
-            <a:ext cx="3524250" cy="342900"/>
+            <a:off x="4648200" y="819149"/>
+            <a:ext cx="4495799" cy="342900"/>
           </a:xfrm>
           <a:prstGeom prst="rect">
             <a:avLst/>
@@ -13047,8 +13047,8 @@
         </p:nvSpPr>
         <p:spPr>
           <a:xfrm>
-            <a:off x="2181225" y="561974"/>
-            <a:ext cx="6962775" cy="274320"/>
+            <a:off x="4648200" y="561974"/>
+            <a:ext cx="4495799" cy="274320"/>
           </a:xfrm>
           <a:prstGeom prst="rect">
             <a:avLst/>
@@ -13097,8 +13097,8 @@
         </p:nvSpPr>
         <p:spPr>
           <a:xfrm>
-            <a:off x="2181225" y="819149"/>
-            <a:ext cx="6962775" cy="274320"/>
+            <a:off x="4648200" y="819149"/>
+            <a:ext cx="4495799" cy="342900"/>
           </a:xfrm>
           <a:prstGeom prst="rect">
             <a:avLst/>

</xml_diff>

<commit_message>
fix all face-level issues of M2
</commit_message>
<xml_diff>
--- a/output/comprehensive_demo_dark.pptx
+++ b/output/comprehensive_demo_dark.pptx
@@ -4477,7 +4477,7 @@
         <p:spPr>
           <a:xfrm>
             <a:off x="200025" y="2781300"/>
-            <a:ext cx="8943975" cy="685800"/>
+            <a:ext cx="8943975" cy="814387"/>
           </a:xfrm>
           <a:prstGeom prst="rect">
             <a:avLst/>
@@ -4813,8 +4813,7 @@
                 </a:solidFill>
                 <a:latin typeface="Arial"/>
               </a:rPr>
-              <a:t>: Columns distributed equally regardless of content
-</a:t>
+              <a:t>: Columns distributed equally regardless of content </a:t>
             </a:r>
             <a:r>
               <a:rPr b="1" sz="1000">
@@ -4922,8 +4921,7 @@
                 </a:solidFill>
                 <a:latin typeface="Arial"/>
               </a:rPr>
-              <a:t> due to equal distribution
-</a:t>
+              <a:t> due to equal distribution </a:t>
             </a:r>
             <a:r>
               <a:rPr b="1" sz="1000">
@@ -5040,8 +5038,7 @@
                 </a:solidFill>
                 <a:latin typeface="Arial"/>
               </a:rPr>
-              <a:t>: Black borders invisible on dark background
-</a:t>
+              <a:t>: Black borders invisible on dark background </a:t>
             </a:r>
             <a:r>
               <a:rPr b="1" sz="1000">
@@ -5131,8 +5128,7 @@
                 </a:solidFill>
                 <a:latin typeface="Arial"/>
               </a:rPr>
-              <a:t>) for visibility
-</a:t>
+              <a:t>) for visibility </a:t>
             </a:r>
             <a:r>
               <a:rPr b="1" sz="1000">
@@ -6328,7 +6324,7 @@
         <p:spPr>
           <a:xfrm>
             <a:off x="200025" y="2781300"/>
-            <a:ext cx="8943975" cy="571500"/>
+            <a:ext cx="8943975" cy="678180"/>
           </a:xfrm>
           <a:prstGeom prst="rect">
             <a:avLst/>
@@ -6630,7 +6626,7 @@
         <p:spPr>
           <a:xfrm>
             <a:off x="200025" y="847724"/>
-            <a:ext cx="8943975" cy="800100"/>
+            <a:ext cx="8943975" cy="950595"/>
           </a:xfrm>
           <a:prstGeom prst="rect">
             <a:avLst/>
@@ -6893,7 +6889,7 @@
         </p:nvSpPr>
         <p:spPr>
           <a:xfrm>
-            <a:off x="200025" y="1552574"/>
+            <a:off x="200025" y="1703070"/>
             <a:ext cx="8943975" cy="304800"/>
           </a:xfrm>
           <a:prstGeom prst="rect">
@@ -6938,7 +6934,7 @@
         </p:nvSpPr>
         <p:spPr>
           <a:xfrm>
-            <a:off x="200025" y="1857375"/>
+            <a:off x="200025" y="2007870"/>
             <a:ext cx="8943975" cy="274320"/>
           </a:xfrm>
           <a:prstGeom prst="rect">
@@ -7001,8 +6997,8 @@
         </p:nvSpPr>
         <p:spPr>
           <a:xfrm>
-            <a:off x="200025" y="2085975"/>
-            <a:ext cx="8943975" cy="685800"/>
+            <a:off x="200025" y="2236470"/>
+            <a:ext cx="8943975" cy="814387"/>
           </a:xfrm>
           <a:prstGeom prst="rect">
             <a:avLst/>
@@ -7226,7 +7222,7 @@
         </p:nvSpPr>
         <p:spPr>
           <a:xfrm>
-            <a:off x="200025" y="2771775"/>
+            <a:off x="200025" y="3050857"/>
             <a:ext cx="8943975" cy="274320"/>
           </a:xfrm>
           <a:prstGeom prst="rect">
@@ -7493,14 +7489,7 @@
                 </a:solidFill>
                 <a:latin typeface="Courier New"/>
               </a:rPr>
-              <a:t>from slide_generator.generator import SlideGenerator
-# Basic usage
-generator = SlideGenerator()
-generator.generate(markdown_content, "output.pptx")
-# With theme support
-generator = SlideGenerator(theme="dark")
-generator.generate(markdown_content, "dark_presentation.pptx")
-</a:t>
+              <a:t>from slide_generator.generator import SlideGenerator # Basic usage generator = SlideGenerator() generator.generate(markdown_content, "output.pptx") # With theme support generator = SlideGenerator(theme="dark") generator.generate(markdown_content, "dark_presentation.pptx") </a:t>
             </a:r>
           </a:p>
         </p:txBody>
@@ -7559,7 +7548,7 @@
         <p:spPr>
           <a:xfrm>
             <a:off x="200025" y="3124200"/>
-            <a:ext cx="8943975" cy="581025"/>
+            <a:ext cx="8943975" cy="687705"/>
           </a:xfrm>
           <a:prstGeom prst="rect">
             <a:avLst/>
@@ -7735,7 +7724,7 @@
         </p:nvSpPr>
         <p:spPr>
           <a:xfrm>
-            <a:off x="200025" y="3705224"/>
+            <a:off x="200025" y="3811904"/>
             <a:ext cx="8943975" cy="274320"/>
           </a:xfrm>
           <a:prstGeom prst="rect">
@@ -11972,7 +11961,7 @@
         <p:spPr>
           <a:xfrm>
             <a:off x="200025" y="3124200"/>
-            <a:ext cx="8943975" cy="695325"/>
+            <a:ext cx="8943975" cy="823912"/>
           </a:xfrm>
           <a:prstGeom prst="rect">
             <a:avLst/>
@@ -12187,7 +12176,7 @@
         </p:nvSpPr>
         <p:spPr>
           <a:xfrm>
-            <a:off x="200025" y="3724274"/>
+            <a:off x="200025" y="3852862"/>
             <a:ext cx="8943975" cy="304800"/>
           </a:xfrm>
           <a:prstGeom prst="rect">
@@ -12232,7 +12221,7 @@
         </p:nvSpPr>
         <p:spPr>
           <a:xfrm>
-            <a:off x="200025" y="4029075"/>
+            <a:off x="200025" y="4157662"/>
             <a:ext cx="8943975" cy="274320"/>
           </a:xfrm>
           <a:prstGeom prst="rect">
@@ -12367,7 +12356,7 @@
         </p:nvSpPr>
         <p:spPr>
           <a:xfrm>
-            <a:off x="200025" y="4267199"/>
+            <a:off x="200025" y="4395787"/>
             <a:ext cx="8943975" cy="274320"/>
           </a:xfrm>
           <a:prstGeom prst="rect">
@@ -16218,7 +16207,7 @@
         <p:spPr>
           <a:xfrm>
             <a:off x="200025" y="4343400"/>
-            <a:ext cx="8943975" cy="457200"/>
+            <a:ext cx="8943975" cy="541972"/>
           </a:xfrm>
           <a:prstGeom prst="rect">
             <a:avLst/>
@@ -16481,7 +16470,7 @@
         <p:spPr>
           <a:xfrm>
             <a:off x="200025" y="847724"/>
-            <a:ext cx="8943975" cy="571500"/>
+            <a:ext cx="8943975" cy="678180"/>
           </a:xfrm>
           <a:prstGeom prst="rect">
             <a:avLst/>
@@ -16630,7 +16619,7 @@
         </p:nvSpPr>
         <p:spPr>
           <a:xfrm>
-            <a:off x="200025" y="1323974"/>
+            <a:off x="200025" y="1430655"/>
             <a:ext cx="8943975" cy="304800"/>
           </a:xfrm>
           <a:prstGeom prst="rect">
@@ -16675,8 +16664,8 @@
         </p:nvSpPr>
         <p:spPr>
           <a:xfrm>
-            <a:off x="200025" y="1628775"/>
-            <a:ext cx="8943975" cy="571500"/>
+            <a:off x="200025" y="1735454"/>
+            <a:ext cx="8943975" cy="678180"/>
           </a:xfrm>
           <a:prstGeom prst="rect">
             <a:avLst/>
@@ -16975,15 +16964,7 @@
                 </a:solidFill>
                 <a:latin typeface="Courier New"/>
               </a:rPr>
-              <a:t>def fibonacci(n):
-    if n &lt;= 1:
-        return n
-    return fibonacci(n-1) + fibonacci(n-2)
-# Generate sequence
-for i in range(10):
-    result = fibonacci(i)
-    print(f"F({i}) = {result}")
-</a:t>
+              <a:t>def fibonacci(n):     if n &lt;= 1:         return n     return fibonacci(n-1) + fibonacci(n-2) # Generate sequence for i in range(10):     result = fibonacci(i)     print(f"F({i}) = {result}") </a:t>
             </a:r>
           </a:p>
         </p:txBody>
@@ -17075,16 +17056,7 @@
                 </a:solidFill>
                 <a:latin typeface="Courier New"/>
               </a:rPr>
-              <a:t>async function fetchUserData(userId) {
-    try {
-        const response = await fetch(`/api/users/${userId}`);
-        return await response.json();
-    } catch (error) {
-        console.error('Failed to fetch user data:', error);
-        throw error;
-    }
-}
-</a:t>
+              <a:t>async function fetchUserData(userId) {     try {         const response = await fetch(`/api/users/${userId}`);         return await response.json();     } catch (error) {         console.error('Failed to fetch user data:', error);         throw error;     } } </a:t>
             </a:r>
           </a:p>
         </p:txBody>
@@ -17202,18 +17174,7 @@
                 </a:solidFill>
                 <a:latin typeface="Courier New"/>
               </a:rPr>
-              <a:t>-- Complex query with joins and aggregation
-SELECT 
-    u.username,
-    COUNT(p.id) as post_count,
-    AVG(p.rating) as avg_rating
-FROM users u
-LEFT JOIN posts p ON u.id = p.user_id
-WHERE u.created_at &gt;= '2024-01-01'
-GROUP BY u.id, u.username
-HAVING COUNT(p.id) &gt; 5
-ORDER BY avg_rating DESC;
-</a:t>
+              <a:t>-- Complex query with joins and aggregation SELECT      u.username,     COUNT(p.id) as post_count,     AVG(p.rating) as avg_rating FROM users u LEFT JOIN posts p ON u.id = p.user_id WHERE u.created_at &gt;= '2024-01-01' GROUP BY u.id, u.username HAVING COUNT(p.id) &gt; 5 ORDER BY avg_rating DESC; </a:t>
             </a:r>
           </a:p>
         </p:txBody>
@@ -17343,7 +17304,7 @@
         <p:spPr>
           <a:xfrm>
             <a:off x="200025" y="847724"/>
-            <a:ext cx="8943975" cy="809625"/>
+            <a:ext cx="8943975" cy="960119"/>
           </a:xfrm>
           <a:prstGeom prst="rect">
             <a:avLst/>
@@ -17552,7 +17513,7 @@
         </p:nvSpPr>
         <p:spPr>
           <a:xfrm>
-            <a:off x="200025" y="1562100"/>
+            <a:off x="200025" y="1712595"/>
             <a:ext cx="8943975" cy="304800"/>
           </a:xfrm>
           <a:prstGeom prst="rect">
@@ -17597,8 +17558,8 @@
         </p:nvSpPr>
         <p:spPr>
           <a:xfrm>
-            <a:off x="200025" y="1866899"/>
-            <a:ext cx="8943975" cy="1504950"/>
+            <a:off x="200025" y="2017394"/>
+            <a:ext cx="8943975" cy="1786890"/>
           </a:xfrm>
           <a:prstGeom prst="rect">
             <a:avLst/>
@@ -19161,7 +19122,7 @@
         <p:spPr>
           <a:xfrm>
             <a:off x="200025" y="3419474"/>
-            <a:ext cx="8943975" cy="685800"/>
+            <a:ext cx="8943975" cy="814387"/>
           </a:xfrm>
           <a:prstGeom prst="rect">
             <a:avLst/>
@@ -19520,7 +19481,7 @@
         <p:spPr>
           <a:xfrm>
             <a:off x="200025" y="1076325"/>
-            <a:ext cx="8943975" cy="571500"/>
+            <a:ext cx="8943975" cy="678180"/>
           </a:xfrm>
           <a:prstGeom prst="rect">
             <a:avLst/>
@@ -19705,7 +19666,7 @@
         </p:nvSpPr>
         <p:spPr>
           <a:xfrm>
-            <a:off x="200025" y="1552574"/>
+            <a:off x="200025" y="1659255"/>
             <a:ext cx="8943975" cy="304800"/>
           </a:xfrm>
           <a:prstGeom prst="rect">
@@ -19750,8 +19711,8 @@
         </p:nvSpPr>
         <p:spPr>
           <a:xfrm>
-            <a:off x="200025" y="1857375"/>
-            <a:ext cx="8943975" cy="571500"/>
+            <a:off x="200025" y="1964054"/>
+            <a:ext cx="8943975" cy="678180"/>
           </a:xfrm>
           <a:prstGeom prst="rect">
             <a:avLst/>

</xml_diff>

<commit_message>
add supports to do inline formatting in [this kind of syntax]{.red .wavy .bold}
</commit_message>
<xml_diff>
--- a/output/comprehensive_demo_dark.pptx
+++ b/output/comprehensive_demo_dark.pptx
@@ -12246,7 +12246,16 @@
                 </a:solidFill>
                 <a:latin typeface="Arial"/>
               </a:rPr>
-              <a:t>Two-column slide: table on left, text on right</a:t>
+              <a:t>Two-column slide: table on left, </a:t>
+            </a:r>
+            <a:r>
+              <a:rPr u="wavy" sz="1600" b="1">
+                <a:solidFill>
+                  <a:srgbClr val="0066CC"/>
+                </a:solidFill>
+                <a:latin typeface="Arial"/>
+              </a:rPr>
+              <a:t>text on right</a:t>
             </a:r>
           </a:p>
         </p:txBody>
@@ -12673,7 +12682,7 @@
                       <a:r>
                         <a:rPr sz="800">
                           <a:solidFill>
-                            <a:srgbClr val="FFFFFF"/>
+                            <a:srgbClr val="FF0000"/>
                           </a:solidFill>
                           <a:latin typeface="Arial"/>
                         </a:rPr>
@@ -12858,7 +12867,7 @@
                       <a:r>
                         <a:rPr sz="800">
                           <a:solidFill>
-                            <a:srgbClr val="FFFFFF"/>
+                            <a:srgbClr val="009900"/>
                           </a:solidFill>
                           <a:latin typeface="Arial"/>
                         </a:rPr>
@@ -13041,9 +13050,9 @@
                         </a:lnSpc>
                       </a:pPr>
                       <a:r>
-                        <a:rPr sz="800">
+                        <a:rPr u="sng" sz="800">
                           <a:solidFill>
-                            <a:srgbClr val="FFFFFF"/>
+                            <a:srgbClr val="009900"/>
                           </a:solidFill>
                           <a:latin typeface="Arial"/>
                         </a:rPr>
@@ -13335,7 +13344,7 @@
         <p:spPr>
           <a:xfrm>
             <a:off x="4619625" y="3714750"/>
-            <a:ext cx="4524374" cy="342900"/>
+            <a:ext cx="4524374" cy="274320"/>
           </a:xfrm>
           <a:prstGeom prst="rect">
             <a:avLst/>
@@ -13366,7 +13375,25 @@
                 </a:solidFill>
                 <a:latin typeface="Arial"/>
               </a:rPr>
-              <a:t>All core features are either complete or in progress. Remaining items are performance tuning and UX polish.</a:t>
+              <a:t>All core features are either complete or in final testing. </a:t>
+            </a:r>
+            <a:r>
+              <a:rPr b="1" sz="1000">
+                <a:solidFill>
+                  <a:srgbClr val="0066CC"/>
+                </a:solidFill>
+                <a:latin typeface="Arial"/>
+              </a:rPr>
+              <a:t>Performance</a:t>
+            </a:r>
+            <a:r>
+              <a:rPr sz="1000">
+                <a:solidFill>
+                  <a:srgbClr val="E0E0E0"/>
+                </a:solidFill>
+                <a:latin typeface="Arial"/>
+              </a:rPr>
+              <a:t> metrics are excellent.</a:t>
             </a:r>
           </a:p>
         </p:txBody>

</xml_diff>

<commit_message>
update file path handling
</commit_message>
<xml_diff>
--- a/output/comprehensive_demo_dark.pptx
+++ b/output/comprehensive_demo_dark.pptx
@@ -3449,7 +3449,7 @@
         <p:spPr>
           <a:xfrm>
             <a:off x="384809" y="619124"/>
-            <a:ext cx="4139565" cy="466724"/>
+            <a:ext cx="4063365" cy="466724"/>
           </a:xfrm>
           <a:prstGeom prst="rect">
             <a:avLst/>
@@ -3513,7 +3513,7 @@
         </p:nvSpPr>
         <p:spPr>
           <a:xfrm>
-            <a:off x="4619625" y="619124"/>
+            <a:off x="4686300" y="619124"/>
             <a:ext cx="137160" cy="466724"/>
           </a:xfrm>
           <a:prstGeom prst="rect">
@@ -3556,8 +3556,8 @@
         </p:nvSpPr>
         <p:spPr>
           <a:xfrm>
-            <a:off x="4756785" y="619124"/>
-            <a:ext cx="4139565" cy="466724"/>
+            <a:off x="4823460" y="619124"/>
+            <a:ext cx="4063365" cy="466724"/>
           </a:xfrm>
           <a:prstGeom prst="rect">
             <a:avLst/>
@@ -3737,8 +3737,8 @@
         </p:nvSpPr>
         <p:spPr>
           <a:xfrm>
-            <a:off x="200025" y="847724"/>
-            <a:ext cx="4495799" cy="2038349"/>
+            <a:off x="200025" y="857250"/>
+            <a:ext cx="4486275" cy="2038349"/>
           </a:xfrm>
           <a:prstGeom prst="rect">
             <a:avLst/>
@@ -3771,8 +3771,8 @@
           <p:nvPr/>
         </p:nvGraphicFramePr>
         <p:xfrm>
-          <a:off x="200025" y="847724"/>
-          <a:ext cx="4934902" cy="1981200"/>
+          <a:off x="200025" y="857250"/>
+          <a:ext cx="4930317" cy="1981200"/>
         </p:xfrm>
         <a:graphic>
           <a:graphicData uri="http://schemas.openxmlformats.org/drawingml/2006/table">
@@ -3781,8 +3781,8 @@
                 <a:tableStyleId>{5C22544A-7EE6-4342-B048-85BDC9FD1C3A}</a:tableStyleId>
               </a:tblPr>
               <a:tblGrid>
-                <a:gridCol w="1026795"/>
-                <a:gridCol w="1634490"/>
+                <a:gridCol w="1022456"/>
+                <a:gridCol w="1634244"/>
                 <a:gridCol w="2273617"/>
               </a:tblGrid>
               <a:tr h="396240">
@@ -4740,7 +4740,7 @@
         </p:nvSpPr>
         <p:spPr>
           <a:xfrm>
-            <a:off x="200025" y="2886075"/>
+            <a:off x="200025" y="2895600"/>
             <a:ext cx="8943975" cy="304800"/>
           </a:xfrm>
           <a:prstGeom prst="rect">
@@ -4785,7 +4785,7 @@
         </p:nvSpPr>
         <p:spPr>
           <a:xfrm>
-            <a:off x="200025" y="3190874"/>
+            <a:off x="200025" y="3209925"/>
             <a:ext cx="8943975" cy="274320"/>
           </a:xfrm>
           <a:prstGeom prst="rect">
@@ -4830,7 +4830,7 @@
         </p:nvSpPr>
         <p:spPr>
           <a:xfrm>
-            <a:off x="200025" y="3419474"/>
+            <a:off x="200025" y="3438525"/>
             <a:ext cx="8943975" cy="814387"/>
           </a:xfrm>
           <a:prstGeom prst="rect">
@@ -5126,7 +5126,7 @@
         </p:nvSpPr>
         <p:spPr>
           <a:xfrm>
-            <a:off x="200025" y="847724"/>
+            <a:off x="200025" y="857250"/>
             <a:ext cx="8943975" cy="274320"/>
           </a:xfrm>
           <a:prstGeom prst="rect">
@@ -5189,7 +5189,7 @@
         </p:nvSpPr>
         <p:spPr>
           <a:xfrm>
-            <a:off x="200025" y="1076325"/>
+            <a:off x="200025" y="1085850"/>
             <a:ext cx="8943975" cy="678180"/>
           </a:xfrm>
           <a:prstGeom prst="rect">
@@ -5375,7 +5375,7 @@
         </p:nvSpPr>
         <p:spPr>
           <a:xfrm>
-            <a:off x="200025" y="1659255"/>
+            <a:off x="200025" y="1668779"/>
             <a:ext cx="8943975" cy="304800"/>
           </a:xfrm>
           <a:prstGeom prst="rect">
@@ -5420,7 +5420,7 @@
         </p:nvSpPr>
         <p:spPr>
           <a:xfrm>
-            <a:off x="200025" y="1964054"/>
+            <a:off x="200025" y="1983104"/>
             <a:ext cx="8943975" cy="678180"/>
           </a:xfrm>
           <a:prstGeom prst="rect">
@@ -5686,8 +5686,8 @@
         </p:nvSpPr>
         <p:spPr>
           <a:xfrm>
-            <a:off x="200025" y="847724"/>
-            <a:ext cx="2419349" cy="1628775"/>
+            <a:off x="200025" y="857250"/>
+            <a:ext cx="2409825" cy="1628775"/>
           </a:xfrm>
           <a:prstGeom prst="rect">
             <a:avLst/>
@@ -5720,8 +5720,8 @@
           <p:nvPr/>
         </p:nvGraphicFramePr>
         <p:xfrm>
-          <a:off x="200025" y="847724"/>
-          <a:ext cx="2650807" cy="1571625"/>
+          <a:off x="200025" y="857250"/>
+          <a:ext cx="2640738" cy="1571625"/>
         </p:xfrm>
         <a:graphic>
           <a:graphicData uri="http://schemas.openxmlformats.org/drawingml/2006/table">
@@ -5730,9 +5730,9 @@
                 <a:tableStyleId>{5C22544A-7EE6-4342-B048-85BDC9FD1C3A}</a:tableStyleId>
               </a:tblPr>
               <a:tblGrid>
-                <a:gridCol w="953452"/>
-                <a:gridCol w="481965"/>
-                <a:gridCol w="1215390"/>
+                <a:gridCol w="945021"/>
+                <a:gridCol w="480737"/>
+                <a:gridCol w="1214980"/>
               </a:tblGrid>
               <a:tr h="314325">
                 <a:tc>
@@ -6671,7 +6671,7 @@
         </p:nvSpPr>
         <p:spPr>
           <a:xfrm>
-            <a:off x="200025" y="2476499"/>
+            <a:off x="200025" y="2486025"/>
             <a:ext cx="8943975" cy="304800"/>
           </a:xfrm>
           <a:prstGeom prst="rect">
@@ -6716,7 +6716,7 @@
         </p:nvSpPr>
         <p:spPr>
           <a:xfrm>
-            <a:off x="200025" y="2781300"/>
+            <a:off x="200025" y="2800350"/>
             <a:ext cx="8943975" cy="814387"/>
           </a:xfrm>
           <a:prstGeom prst="rect">
@@ -7012,7 +7012,7 @@
         </p:nvSpPr>
         <p:spPr>
           <a:xfrm>
-            <a:off x="200025" y="847724"/>
+            <a:off x="200025" y="857250"/>
             <a:ext cx="8943975" cy="274320"/>
           </a:xfrm>
           <a:prstGeom prst="rect">
@@ -7084,7 +7084,7 @@
         </p:nvSpPr>
         <p:spPr>
           <a:xfrm>
-            <a:off x="200025" y="1076325"/>
+            <a:off x="200025" y="1085850"/>
             <a:ext cx="8943975" cy="274320"/>
           </a:xfrm>
           <a:prstGeom prst="rect">
@@ -7152,7 +7152,7 @@
                 </a:solidFill>
                 <a:latin typeface="Courier New"/>
               </a:rPr>
-              <a:t>Ag\ne</a:t>
+              <a:t>Ag\\ne</a:t>
             </a:r>
             <a:r>
               <a:rPr sz="1000">
@@ -7192,7 +7192,7 @@
         </p:nvSpPr>
         <p:spPr>
           <a:xfrm>
-            <a:off x="200025" y="1219200"/>
+            <a:off x="200025" y="1228725"/>
             <a:ext cx="8943975" cy="304800"/>
           </a:xfrm>
           <a:prstGeom prst="rect">
@@ -7237,7 +7237,7 @@
         </p:nvSpPr>
         <p:spPr>
           <a:xfrm>
-            <a:off x="200025" y="1523999"/>
+            <a:off x="200025" y="1543050"/>
             <a:ext cx="8943975" cy="274320"/>
           </a:xfrm>
           <a:prstGeom prst="rect">
@@ -7309,7 +7309,7 @@
         </p:nvSpPr>
         <p:spPr>
           <a:xfrm>
-            <a:off x="200025" y="1752599"/>
+            <a:off x="200025" y="1771650"/>
             <a:ext cx="8943975" cy="274320"/>
           </a:xfrm>
           <a:prstGeom prst="rect">
@@ -7533,8 +7533,8 @@
         </p:nvSpPr>
         <p:spPr>
           <a:xfrm>
-            <a:off x="200025" y="847724"/>
-            <a:ext cx="2657475" cy="1628775"/>
+            <a:off x="200025" y="857250"/>
+            <a:ext cx="2647949" cy="1628775"/>
           </a:xfrm>
           <a:prstGeom prst="rect">
             <a:avLst/>
@@ -7567,8 +7567,8 @@
           <p:nvPr/>
         </p:nvGraphicFramePr>
         <p:xfrm>
-          <a:off x="200025" y="847724"/>
-          <a:ext cx="2912744" cy="1571625"/>
+          <a:off x="200025" y="857250"/>
+          <a:ext cx="2902675" cy="1571625"/>
         </p:xfrm>
         <a:graphic>
           <a:graphicData uri="http://schemas.openxmlformats.org/drawingml/2006/table">
@@ -7577,9 +7577,9 @@
                 <a:tableStyleId>{5C22544A-7EE6-4342-B048-85BDC9FD1C3A}</a:tableStyleId>
               </a:tblPr>
               <a:tblGrid>
-                <a:gridCol w="859155"/>
-                <a:gridCol w="1016317"/>
-                <a:gridCol w="1037272"/>
+                <a:gridCol w="853752"/>
+                <a:gridCol w="1014762"/>
+                <a:gridCol w="1034161"/>
               </a:tblGrid>
               <a:tr h="314325">
                 <a:tc>
@@ -8518,7 +8518,7 @@
         </p:nvSpPr>
         <p:spPr>
           <a:xfrm>
-            <a:off x="200025" y="2476499"/>
+            <a:off x="200025" y="2486025"/>
             <a:ext cx="8943975" cy="304800"/>
           </a:xfrm>
           <a:prstGeom prst="rect">
@@ -8563,7 +8563,7 @@
         </p:nvSpPr>
         <p:spPr>
           <a:xfrm>
-            <a:off x="200025" y="2781300"/>
+            <a:off x="200025" y="2800350"/>
             <a:ext cx="8943975" cy="678180"/>
           </a:xfrm>
           <a:prstGeom prst="rect">
@@ -8865,7 +8865,7 @@
         </p:nvSpPr>
         <p:spPr>
           <a:xfrm>
-            <a:off x="200025" y="847724"/>
+            <a:off x="200025" y="857250"/>
             <a:ext cx="8943975" cy="950595"/>
           </a:xfrm>
           <a:prstGeom prst="rect">
@@ -9129,7 +9129,7 @@
         </p:nvSpPr>
         <p:spPr>
           <a:xfrm>
-            <a:off x="200025" y="1703070"/>
+            <a:off x="200025" y="1712595"/>
             <a:ext cx="8943975" cy="304800"/>
           </a:xfrm>
           <a:prstGeom prst="rect">
@@ -9174,7 +9174,7 @@
         </p:nvSpPr>
         <p:spPr>
           <a:xfrm>
-            <a:off x="200025" y="2007870"/>
+            <a:off x="200025" y="2026920"/>
             <a:ext cx="8943975" cy="274320"/>
           </a:xfrm>
           <a:prstGeom prst="rect">
@@ -9237,7 +9237,7 @@
         </p:nvSpPr>
         <p:spPr>
           <a:xfrm>
-            <a:off x="200025" y="2236470"/>
+            <a:off x="200025" y="2255520"/>
             <a:ext cx="8943975" cy="814387"/>
           </a:xfrm>
           <a:prstGeom prst="rect">
@@ -9462,7 +9462,7 @@
         </p:nvSpPr>
         <p:spPr>
           <a:xfrm>
-            <a:off x="200025" y="3050857"/>
+            <a:off x="200025" y="3069907"/>
             <a:ext cx="8943975" cy="274320"/>
           </a:xfrm>
           <a:prstGeom prst="rect">
@@ -9650,7 +9650,7 @@
         </p:nvSpPr>
         <p:spPr>
           <a:xfrm>
-            <a:off x="200025" y="847724"/>
+            <a:off x="200025" y="857250"/>
             <a:ext cx="8943975" cy="274320"/>
           </a:xfrm>
           <a:prstGeom prst="rect">
@@ -9695,8 +9695,8 @@
         </p:nvSpPr>
         <p:spPr>
           <a:xfrm>
-            <a:off x="200025" y="1114425"/>
-            <a:ext cx="8943975" cy="1838324"/>
+            <a:off x="200025" y="1123949"/>
+            <a:ext cx="8943975" cy="1904999"/>
           </a:xfrm>
           <a:prstGeom prst="rect">
             <a:avLst/>
@@ -9742,7 +9742,7 @@
         </p:nvSpPr>
         <p:spPr>
           <a:xfrm>
-            <a:off x="200025" y="2819399"/>
+            <a:off x="200025" y="2895600"/>
             <a:ext cx="8943975" cy="304800"/>
           </a:xfrm>
           <a:prstGeom prst="rect">
@@ -9787,7 +9787,7 @@
         </p:nvSpPr>
         <p:spPr>
           <a:xfrm>
-            <a:off x="200025" y="3124200"/>
+            <a:off x="200025" y="3209925"/>
             <a:ext cx="8943975" cy="687705"/>
           </a:xfrm>
           <a:prstGeom prst="rect">
@@ -9964,7 +9964,7 @@
         </p:nvSpPr>
         <p:spPr>
           <a:xfrm>
-            <a:off x="200025" y="3811904"/>
+            <a:off x="200025" y="3897629"/>
             <a:ext cx="8943975" cy="274320"/>
           </a:xfrm>
           <a:prstGeom prst="rect">
@@ -10197,7 +10197,7 @@
         </p:nvSpPr>
         <p:spPr>
           <a:xfrm>
-            <a:off x="200025" y="981074"/>
+            <a:off x="200025" y="990599"/>
             <a:ext cx="8943975" cy="274320"/>
           </a:xfrm>
           <a:prstGeom prst="rect">
@@ -10278,7 +10278,7 @@
         </p:nvSpPr>
         <p:spPr>
           <a:xfrm>
-            <a:off x="200025" y="1209674"/>
+            <a:off x="200025" y="1219200"/>
             <a:ext cx="8943975" cy="274320"/>
           </a:xfrm>
           <a:prstGeom prst="rect">
@@ -10341,7 +10341,7 @@
         </p:nvSpPr>
         <p:spPr>
           <a:xfrm>
-            <a:off x="200025" y="1343025"/>
+            <a:off x="200025" y="1352549"/>
             <a:ext cx="8943975" cy="304800"/>
           </a:xfrm>
           <a:prstGeom prst="rect">
@@ -10386,7 +10386,7 @@
         </p:nvSpPr>
         <p:spPr>
           <a:xfrm>
-            <a:off x="200025" y="1647825"/>
+            <a:off x="200025" y="1666874"/>
             <a:ext cx="8943975" cy="274320"/>
           </a:xfrm>
           <a:prstGeom prst="rect">
@@ -10439,7 +10439,7 @@
         </p:blipFill>
         <p:spPr>
           <a:xfrm>
-            <a:off x="838200" y="1724024"/>
+            <a:off x="838200" y="1743075"/>
             <a:ext cx="7467599" cy="466724"/>
           </a:xfrm>
           <a:prstGeom prst="rect">
@@ -10455,7 +10455,7 @@
         </p:nvSpPr>
         <p:spPr>
           <a:xfrm>
-            <a:off x="200025" y="2419349"/>
+            <a:off x="200025" y="2428875"/>
             <a:ext cx="8943975" cy="274320"/>
           </a:xfrm>
           <a:prstGeom prst="rect">
@@ -10508,7 +10508,7 @@
         </p:blipFill>
         <p:spPr>
           <a:xfrm>
-            <a:off x="838200" y="2476499"/>
+            <a:off x="838200" y="2486025"/>
             <a:ext cx="7467599" cy="228600"/>
           </a:xfrm>
           <a:prstGeom prst="rect">
@@ -10823,7 +10823,52 @@
         </p:nvSpPr>
         <p:spPr>
           <a:xfrm>
-            <a:off x="200025" y="3667124"/>
+            <a:off x="200025" y="3619499"/>
+            <a:ext cx="4457700" cy="274320"/>
+          </a:xfrm>
+          <a:prstGeom prst="rect">
+            <a:avLst/>
+          </a:prstGeom>
+          <a:noFill/>
+        </p:spPr>
+        <p:txBody>
+          <a:bodyPr wrap="square" lIns="0" rIns="0" tIns="0" bIns="0">
+            <a:spAutoFit/>
+          </a:bodyPr>
+          <a:lstStyle/>
+          <a:p>
+            <a:pPr algn="ctr">
+              <a:lnSpc>
+                <a:spcPct val="100000"/>
+              </a:lnSpc>
+              <a:spcBef>
+                <a:spcPts val="0"/>
+              </a:spcBef>
+              <a:spcAft>
+                <a:spcPts val="0"/>
+              </a:spcAft>
+            </a:pPr>
+            <a:r>
+              <a:rPr sz="1000" i="1">
+                <a:solidFill>
+                  <a:srgbClr val="CCCCCC"/>
+                </a:solidFill>
+                <a:latin typeface="Arial"/>
+              </a:rPr>
+              <a:t>Sample bar chart demonstrating data visualization with proper scaling</a:t>
+            </a:r>
+          </a:p>
+        </p:txBody>
+      </p:sp>
+      <p:sp>
+        <p:nvSpPr>
+          <p:cNvPr id="6" name="TextBox 5"/>
+          <p:cNvSpPr txBox="1"/>
+          <p:nvPr/>
+        </p:nvSpPr>
+        <p:spPr>
+          <a:xfrm>
+            <a:off x="200025" y="3848099"/>
             <a:ext cx="8943975" cy="274320"/>
           </a:xfrm>
           <a:prstGeom prst="rect">
@@ -11451,7 +11496,7 @@
               <a:t>wavy underlined text</a:t>
             </a:r>
             <a:r>
-              <a:rPr sz="1000">
+              <a:rPr u="wavy" sz="1000">
                 <a:solidFill>
                   <a:srgbClr val="E0E0E0"/>
                 </a:solidFill>
@@ -11469,7 +11514,7 @@
               <a:t>emphasized information</a:t>
             </a:r>
             <a:r>
-              <a:rPr sz="1000">
+              <a:rPr u="wavy" sz="1000">
                 <a:solidFill>
                   <a:srgbClr val="E0E0E0"/>
                 </a:solidFill>
@@ -11651,7 +11696,7 @@
         </p:nvSpPr>
         <p:spPr>
           <a:xfrm>
-            <a:off x="200025" y="3124200"/>
+            <a:off x="200025" y="3133724"/>
             <a:ext cx="8943975" cy="823912"/>
           </a:xfrm>
           <a:prstGeom prst="rect">
@@ -11800,7 +11845,7 @@
               <a:t>• </a:t>
             </a:r>
             <a:r>
-              <a:rPr sz="1000">
+              <a:rPr u="sng" sz="1000">
                 <a:solidFill>
                   <a:srgbClr val="E0E0E0"/>
                 </a:solidFill>
@@ -11809,7 +11854,7 @@
               <a:t>Underlined with </a:t>
             </a:r>
             <a:r>
-              <a:rPr b="1" sz="1000">
+              <a:rPr u="sng" b="1" sz="1000">
                 <a:solidFill>
                   <a:srgbClr val="E0E0E0"/>
                 </a:solidFill>
@@ -11818,7 +11863,7 @@
               <a:t>bold inside</a:t>
             </a:r>
             <a:r>
-              <a:rPr sz="1000">
+              <a:rPr u="sng" sz="1000">
                 <a:solidFill>
                   <a:srgbClr val="E0E0E0"/>
                 </a:solidFill>
@@ -11867,7 +11912,7 @@
         </p:nvSpPr>
         <p:spPr>
           <a:xfrm>
-            <a:off x="200025" y="3852862"/>
+            <a:off x="200025" y="3862387"/>
             <a:ext cx="8943975" cy="304800"/>
           </a:xfrm>
           <a:prstGeom prst="rect">
@@ -11912,7 +11957,7 @@
         </p:nvSpPr>
         <p:spPr>
           <a:xfrm>
-            <a:off x="200025" y="4157662"/>
+            <a:off x="200025" y="4167187"/>
             <a:ext cx="8943975" cy="274320"/>
           </a:xfrm>
           <a:prstGeom prst="rect">
@@ -12047,7 +12092,7 @@
         </p:nvSpPr>
         <p:spPr>
           <a:xfrm>
-            <a:off x="200025" y="4395787"/>
+            <a:off x="200025" y="4405312"/>
             <a:ext cx="8943975" cy="274320"/>
           </a:xfrm>
           <a:prstGeom prst="rect">
@@ -12133,25 +12178,7 @@
                 </a:solidFill>
                 <a:latin typeface="Arial"/>
               </a:rPr>
-              <a:t> is the </a:t>
-            </a:r>
-            <a:r>
-              <a:rPr u="sng" sz="1000">
-                <a:solidFill>
-                  <a:srgbClr val="E0E0E0"/>
-                </a:solidFill>
-                <a:latin typeface="Arial"/>
-              </a:rPr>
-              <a:t>final result</a:t>
-            </a:r>
-            <a:r>
-              <a:rPr sz="1000">
-                <a:solidFill>
-                  <a:srgbClr val="E0E0E0"/>
-                </a:solidFill>
-                <a:latin typeface="Arial"/>
-              </a:rPr>
-              <a:t>.</a:t>
+              <a:t> is the ++final result++.</a:t>
             </a:r>
           </a:p>
         </p:txBody>
@@ -12214,7 +12241,142 @@
         </p:nvSpPr>
         <p:spPr>
           <a:xfrm>
-            <a:off x="200025" y="3076574"/>
+            <a:off x="200025" y="3124200"/>
+            <a:ext cx="2867025" cy="274320"/>
+          </a:xfrm>
+          <a:prstGeom prst="rect">
+            <a:avLst/>
+          </a:prstGeom>
+          <a:noFill/>
+        </p:spPr>
+        <p:txBody>
+          <a:bodyPr wrap="square" lIns="0" rIns="0" tIns="0" bIns="0">
+            <a:spAutoFit/>
+          </a:bodyPr>
+          <a:lstStyle/>
+          <a:p>
+            <a:pPr algn="ctr">
+              <a:lnSpc>
+                <a:spcPct val="100000"/>
+              </a:lnSpc>
+              <a:spcBef>
+                <a:spcPts val="0"/>
+              </a:spcBef>
+              <a:spcAft>
+                <a:spcPts val="0"/>
+              </a:spcAft>
+            </a:pPr>
+            <a:r>
+              <a:rPr sz="1000" i="1">
+                <a:solidFill>
+                  <a:srgbClr val="CCCCCC"/>
+                </a:solidFill>
+                <a:latin typeface="Arial"/>
+              </a:rPr>
+              <a:t>Distribution chart showing proportional data representation</a:t>
+            </a:r>
+          </a:p>
+        </p:txBody>
+      </p:sp>
+      <p:sp>
+        <p:nvSpPr>
+          <p:cNvPr id="4" name="TextBox 3"/>
+          <p:cNvSpPr txBox="1"/>
+          <p:nvPr/>
+        </p:nvSpPr>
+        <p:spPr>
+          <a:xfrm>
+            <a:off x="200025" y="3257550"/>
+            <a:ext cx="8943975" cy="304800"/>
+          </a:xfrm>
+          <a:prstGeom prst="rect">
+            <a:avLst/>
+          </a:prstGeom>
+          <a:noFill/>
+        </p:spPr>
+        <p:txBody>
+          <a:bodyPr wrap="square" lIns="0" rIns="0" tIns="0" bIns="0">
+            <a:spAutoFit/>
+          </a:bodyPr>
+          <a:lstStyle/>
+          <a:p>
+            <a:pPr algn="l">
+              <a:lnSpc>
+                <a:spcPct val="100000"/>
+              </a:lnSpc>
+              <a:spcBef>
+                <a:spcPts val="0"/>
+              </a:spcBef>
+              <a:spcAft>
+                <a:spcPts val="0"/>
+              </a:spcAft>
+            </a:pPr>
+            <a:r>
+              <a:rPr sz="1300" b="1">
+                <a:solidFill>
+                  <a:srgbClr val="E0E0E0"/>
+                </a:solidFill>
+                <a:latin typeface="Arial"/>
+              </a:rPr>
+              <a:t>Advanced Jinja2 Template Examples</a:t>
+            </a:r>
+          </a:p>
+        </p:txBody>
+      </p:sp>
+      <p:sp>
+        <p:nvSpPr>
+          <p:cNvPr id="5" name="TextBox 4"/>
+          <p:cNvSpPr txBox="1"/>
+          <p:nvPr/>
+        </p:nvSpPr>
+        <p:spPr>
+          <a:xfrm>
+            <a:off x="200025" y="3571875"/>
+            <a:ext cx="8943975" cy="274320"/>
+          </a:xfrm>
+          <a:prstGeom prst="rect">
+            <a:avLst/>
+          </a:prstGeom>
+          <a:noFill/>
+        </p:spPr>
+        <p:txBody>
+          <a:bodyPr wrap="square" lIns="0" rIns="0" tIns="0" bIns="0">
+            <a:spAutoFit/>
+          </a:bodyPr>
+          <a:lstStyle/>
+          <a:p>
+            <a:pPr algn="l">
+              <a:lnSpc>
+                <a:spcPct val="100000"/>
+              </a:lnSpc>
+              <a:spcBef>
+                <a:spcPts val="0"/>
+              </a:spcBef>
+              <a:spcAft>
+                <a:spcPts val="0"/>
+              </a:spcAft>
+            </a:pPr>
+            <a:r>
+              <a:rPr sz="1000">
+                <a:solidFill>
+                  <a:srgbClr val="E0E0E0"/>
+                </a:solidFill>
+                <a:latin typeface="Arial"/>
+              </a:rPr>
+              <a:t>You can also use the new template syntax for dynamic figures: {% figure "bar_chart" width=0.7 caption="Generated using Jinja2 template syntax" %}</a:t>
+            </a:r>
+          </a:p>
+        </p:txBody>
+      </p:sp>
+      <p:sp>
+        <p:nvSpPr>
+          <p:cNvPr id="6" name="TextBox 5"/>
+          <p:cNvSpPr txBox="1"/>
+          <p:nvPr/>
+        </p:nvSpPr>
+        <p:spPr>
+          <a:xfrm>
+            <a:off x="200025" y="3705224"/>
             <a:ext cx="8943975" cy="361950"/>
           </a:xfrm>
           <a:prstGeom prst="rect">
@@ -12262,13 +12424,13 @@
       </p:sp>
       <p:sp>
         <p:nvSpPr>
-          <p:cNvPr id="4" name="TextBox 3"/>
+          <p:cNvPr id="7" name="TextBox 6"/>
           <p:cNvSpPr txBox="1"/>
           <p:nvPr/>
         </p:nvSpPr>
         <p:spPr>
           <a:xfrm>
-            <a:off x="247649" y="3438525"/>
+            <a:off x="247649" y="4067174"/>
             <a:ext cx="8896350" cy="274320"/>
           </a:xfrm>
           <a:prstGeom prst="rect">
@@ -12307,14 +12469,14 @@
       </p:sp>
       <p:sp>
         <p:nvSpPr>
-          <p:cNvPr id="5" name="TextBox 4"/>
+          <p:cNvPr id="8" name="TextBox 7"/>
           <p:cNvSpPr txBox="1"/>
           <p:nvPr/>
         </p:nvSpPr>
         <p:spPr>
           <a:xfrm>
-            <a:off x="247649" y="3695699"/>
-            <a:ext cx="1828800" cy="1628775"/>
+            <a:off x="247649" y="4324349"/>
+            <a:ext cx="1800225" cy="1628775"/>
           </a:xfrm>
           <a:prstGeom prst="rect">
             <a:avLst/>
@@ -12340,15 +12502,15 @@
       </p:sp>
       <p:graphicFrame>
         <p:nvGraphicFramePr>
-          <p:cNvPr id="6" name="Table 5"/>
+          <p:cNvPr id="9" name="Table 8"/>
           <p:cNvGraphicFramePr>
             <a:graphicFrameLocks noGrp="1"/>
           </p:cNvGraphicFramePr>
           <p:nvPr/>
         </p:nvGraphicFramePr>
         <p:xfrm>
-          <a:off x="247649" y="3695699"/>
-          <a:ext cx="2001201" cy="1571625"/>
+          <a:off x="247649" y="4324349"/>
+          <a:ext cx="1978854" cy="1571625"/>
         </p:xfrm>
         <a:graphic>
           <a:graphicData uri="http://schemas.openxmlformats.org/drawingml/2006/table">
@@ -12357,9 +12519,9 @@
                 <a:tableStyleId>{5C22544A-7EE6-4342-B048-85BDC9FD1C3A}</a:tableStyleId>
               </a:tblPr>
               <a:tblGrid>
-                <a:gridCol w="848677"/>
-                <a:gridCol w="513397"/>
-                <a:gridCol w="639127"/>
+                <a:gridCol w="842210"/>
+                <a:gridCol w="504229"/>
+                <a:gridCol w="632415"/>
               </a:tblGrid>
               <a:tr h="314325">
                 <a:tc>
@@ -13292,14 +13454,14 @@
       </p:graphicFrame>
       <p:sp>
         <p:nvSpPr>
-          <p:cNvPr id="7" name="TextBox 6"/>
+          <p:cNvPr id="10" name="TextBox 9"/>
           <p:cNvSpPr txBox="1"/>
           <p:nvPr/>
         </p:nvSpPr>
         <p:spPr>
           <a:xfrm>
-            <a:off x="4619625" y="3457575"/>
-            <a:ext cx="4524374" cy="274320"/>
+            <a:off x="4686300" y="4086225"/>
+            <a:ext cx="4457700" cy="274320"/>
           </a:xfrm>
           <a:prstGeom prst="rect">
             <a:avLst/>
@@ -13337,14 +13499,14 @@
       </p:sp>
       <p:sp>
         <p:nvSpPr>
-          <p:cNvPr id="8" name="TextBox 7"/>
+          <p:cNvPr id="11" name="TextBox 10"/>
           <p:cNvSpPr txBox="1"/>
           <p:nvPr/>
         </p:nvSpPr>
         <p:spPr>
           <a:xfrm>
-            <a:off x="4619625" y="3714750"/>
-            <a:ext cx="4524374" cy="274320"/>
+            <a:off x="4686300" y="4343400"/>
+            <a:ext cx="4457700" cy="274320"/>
           </a:xfrm>
           <a:prstGeom prst="rect">
             <a:avLst/>
@@ -13501,8 +13663,53 @@
         </p:nvSpPr>
         <p:spPr>
           <a:xfrm>
-            <a:off x="5581649" y="638175"/>
-            <a:ext cx="3562349" cy="342900"/>
+            <a:off x="247649" y="3486150"/>
+            <a:ext cx="3809999" cy="274320"/>
+          </a:xfrm>
+          <a:prstGeom prst="rect">
+            <a:avLst/>
+          </a:prstGeom>
+          <a:noFill/>
+        </p:spPr>
+        <p:txBody>
+          <a:bodyPr wrap="square" lIns="0" rIns="0" tIns="0" bIns="0">
+            <a:spAutoFit/>
+          </a:bodyPr>
+          <a:lstStyle/>
+          <a:p>
+            <a:pPr algn="ctr">
+              <a:lnSpc>
+                <a:spcPct val="100000"/>
+              </a:lnSpc>
+              <a:spcBef>
+                <a:spcPts val="0"/>
+              </a:spcBef>
+              <a:spcAft>
+                <a:spcPts val="0"/>
+              </a:spcAft>
+            </a:pPr>
+            <a:r>
+              <a:rPr sz="1000" i="1">
+                <a:solidFill>
+                  <a:srgbClr val="CCCCCC"/>
+                </a:solidFill>
+                <a:latin typeface="Arial"/>
+              </a:rPr>
+              <a:t>Task completion progress visualization</a:t>
+            </a:r>
+          </a:p>
+        </p:txBody>
+      </p:sp>
+      <p:sp>
+        <p:nvSpPr>
+          <p:cNvPr id="5" name="TextBox 4"/>
+          <p:cNvSpPr txBox="1"/>
+          <p:nvPr/>
+        </p:nvSpPr>
+        <p:spPr>
+          <a:xfrm>
+            <a:off x="5724524" y="657225"/>
+            <a:ext cx="3419474" cy="342900"/>
           </a:xfrm>
           <a:prstGeom prst="rect">
             <a:avLst/>
@@ -13641,8 +13848,8 @@
         </p:nvSpPr>
         <p:spPr>
           <a:xfrm>
-            <a:off x="4619625" y="542925"/>
-            <a:ext cx="942975" cy="1333500"/>
+            <a:off x="4686300" y="542925"/>
+            <a:ext cx="923924" cy="1333500"/>
           </a:xfrm>
           <a:prstGeom prst="rect">
             <a:avLst/>
@@ -13675,8 +13882,8 @@
           <p:nvPr/>
         </p:nvGraphicFramePr>
         <p:xfrm>
-          <a:off x="4619625" y="542925"/>
-          <a:ext cx="1026794" cy="1285872"/>
+          <a:off x="4686300" y="542925"/>
+          <a:ext cx="1014352" cy="1285872"/>
         </p:xfrm>
         <a:graphic>
           <a:graphicData uri="http://schemas.openxmlformats.org/drawingml/2006/table">
@@ -13685,8 +13892,8 @@
                 <a:tableStyleId>{5C22544A-7EE6-4342-B048-85BDC9FD1C3A}</a:tableStyleId>
               </a:tblPr>
               <a:tblGrid>
-                <a:gridCol w="722947"/>
-                <a:gridCol w="303847"/>
+                <a:gridCol w="719673"/>
+                <a:gridCol w="294679"/>
               </a:tblGrid>
               <a:tr h="321468">
                 <a:tc>
@@ -14313,7 +14520,7 @@
         <p:spPr>
           <a:xfrm>
             <a:off x="247649" y="800100"/>
-            <a:ext cx="1828800" cy="1628775"/>
+            <a:ext cx="1800225" cy="1628775"/>
           </a:xfrm>
           <a:prstGeom prst="rect">
             <a:avLst/>
@@ -14347,7 +14554,7 @@
         </p:nvGraphicFramePr>
         <p:xfrm>
           <a:off x="247649" y="800100"/>
-          <a:ext cx="2001201" cy="1571625"/>
+          <a:ext cx="1978854" cy="1571625"/>
         </p:xfrm>
         <a:graphic>
           <a:graphicData uri="http://schemas.openxmlformats.org/drawingml/2006/table">
@@ -14356,9 +14563,9 @@
                 <a:tableStyleId>{5C22544A-7EE6-4342-B048-85BDC9FD1C3A}</a:tableStyleId>
               </a:tblPr>
               <a:tblGrid>
-                <a:gridCol w="848677"/>
-                <a:gridCol w="513397"/>
-                <a:gridCol w="639127"/>
+                <a:gridCol w="842210"/>
+                <a:gridCol w="504229"/>
+                <a:gridCol w="632415"/>
               </a:tblGrid>
               <a:tr h="314325">
                 <a:tc>
@@ -15297,8 +15504,8 @@
         </p:nvSpPr>
         <p:spPr>
           <a:xfrm>
-            <a:off x="5581649" y="561974"/>
-            <a:ext cx="3562349" cy="274320"/>
+            <a:off x="5724524" y="561974"/>
+            <a:ext cx="3419474" cy="274320"/>
           </a:xfrm>
           <a:prstGeom prst="rect">
             <a:avLst/>
@@ -15342,8 +15549,8 @@
         </p:nvSpPr>
         <p:spPr>
           <a:xfrm>
-            <a:off x="5581649" y="819149"/>
-            <a:ext cx="3562349" cy="342900"/>
+            <a:off x="5724524" y="819149"/>
+            <a:ext cx="3419474" cy="342900"/>
           </a:xfrm>
           <a:prstGeom prst="rect">
             <a:avLst/>
@@ -15504,7 +15711,7 @@
         <p:spPr>
           <a:xfrm>
             <a:off x="247649" y="800100"/>
-            <a:ext cx="1828800" cy="1628775"/>
+            <a:ext cx="1800225" cy="1628775"/>
           </a:xfrm>
           <a:prstGeom prst="rect">
             <a:avLst/>
@@ -15538,7 +15745,7 @@
         </p:nvGraphicFramePr>
         <p:xfrm>
           <a:off x="247649" y="800100"/>
-          <a:ext cx="2001201" cy="1571625"/>
+          <a:ext cx="1978854" cy="1571625"/>
         </p:xfrm>
         <a:graphic>
           <a:graphicData uri="http://schemas.openxmlformats.org/drawingml/2006/table">
@@ -15547,9 +15754,9 @@
                 <a:tableStyleId>{5C22544A-7EE6-4342-B048-85BDC9FD1C3A}</a:tableStyleId>
               </a:tblPr>
               <a:tblGrid>
-                <a:gridCol w="848677"/>
-                <a:gridCol w="513397"/>
-                <a:gridCol w="639127"/>
+                <a:gridCol w="842210"/>
+                <a:gridCol w="504229"/>
+                <a:gridCol w="632415"/>
               </a:tblGrid>
               <a:tr h="314325">
                 <a:tc>
@@ -16488,8 +16695,8 @@
         </p:nvSpPr>
         <p:spPr>
           <a:xfrm>
-            <a:off x="2171700" y="561974"/>
-            <a:ext cx="6972300" cy="274320"/>
+            <a:off x="2286000" y="561974"/>
+            <a:ext cx="6858000" cy="274320"/>
           </a:xfrm>
           <a:prstGeom prst="rect">
             <a:avLst/>
@@ -16533,8 +16740,8 @@
         </p:nvSpPr>
         <p:spPr>
           <a:xfrm>
-            <a:off x="2171700" y="819149"/>
-            <a:ext cx="6972300" cy="274320"/>
+            <a:off x="2286000" y="819149"/>
+            <a:ext cx="6858000" cy="274320"/>
           </a:xfrm>
           <a:prstGeom prst="rect">
             <a:avLst/>
@@ -16695,7 +16902,7 @@
         <p:spPr>
           <a:xfrm>
             <a:off x="200025" y="847724"/>
-            <a:ext cx="5191125" cy="1628775"/>
+            <a:ext cx="5153024" cy="1628775"/>
           </a:xfrm>
           <a:prstGeom prst="rect">
             <a:avLst/>
@@ -16729,7 +16936,7 @@
         </p:nvGraphicFramePr>
         <p:xfrm>
           <a:off x="200025" y="847724"/>
-          <a:ext cx="5699759" cy="1571625"/>
+          <a:ext cx="5661695" cy="1571625"/>
         </p:xfrm>
         <a:graphic>
           <a:graphicData uri="http://schemas.openxmlformats.org/drawingml/2006/table">
@@ -16738,10 +16945,10 @@
                 <a:tableStyleId>{5C22544A-7EE6-4342-B048-85BDC9FD1C3A}</a:tableStyleId>
               </a:tblPr>
               <a:tblGrid>
-                <a:gridCol w="1393507"/>
-                <a:gridCol w="880110"/>
-                <a:gridCol w="1613535"/>
-                <a:gridCol w="1812607"/>
+                <a:gridCol w="1389332"/>
+                <a:gridCol w="858254"/>
+                <a:gridCol w="1610997"/>
+                <a:gridCol w="1803112"/>
               </a:tblGrid>
               <a:tr h="314325">
                 <a:tc>
@@ -18030,8 +18237,8 @@
         </p:nvSpPr>
         <p:spPr>
           <a:xfrm>
-            <a:off x="200025" y="2781300"/>
-            <a:ext cx="1800225" cy="1333500"/>
+            <a:off x="200025" y="2790824"/>
+            <a:ext cx="1771650" cy="1333500"/>
           </a:xfrm>
           <a:prstGeom prst="rect">
             <a:avLst/>
@@ -18064,8 +18271,8 @@
           <p:nvPr/>
         </p:nvGraphicFramePr>
         <p:xfrm>
-          <a:off x="200025" y="2781300"/>
-          <a:ext cx="1969769" cy="1285872"/>
+          <a:off x="200025" y="2790824"/>
+          <a:ext cx="1947258" cy="1285872"/>
         </p:xfrm>
         <a:graphic>
           <a:graphicData uri="http://schemas.openxmlformats.org/drawingml/2006/table">
@@ -18074,10 +18281,10 @@
                 <a:tableStyleId>{5C22544A-7EE6-4342-B048-85BDC9FD1C3A}</a:tableStyleId>
               </a:tblPr>
               <a:tblGrid>
-                <a:gridCol w="471487"/>
-                <a:gridCol w="377190"/>
-                <a:gridCol w="534352"/>
-                <a:gridCol w="586740"/>
+                <a:gridCol w="463547"/>
+                <a:gridCol w="376125"/>
+                <a:gridCol w="527804"/>
+                <a:gridCol w="579782"/>
               </a:tblGrid>
               <a:tr h="321468">
                 <a:tc>
@@ -19075,7 +19282,7 @@
         </p:nvSpPr>
         <p:spPr>
           <a:xfrm>
-            <a:off x="200025" y="4114800"/>
+            <a:off x="200025" y="4124324"/>
             <a:ext cx="8943975" cy="274320"/>
           </a:xfrm>
           <a:prstGeom prst="rect">
@@ -19120,7 +19327,7 @@
         </p:nvSpPr>
         <p:spPr>
           <a:xfrm>
-            <a:off x="200025" y="4343400"/>
+            <a:off x="200025" y="4352924"/>
             <a:ext cx="8943975" cy="541972"/>
           </a:xfrm>
           <a:prstGeom prst="rect">
@@ -19578,7 +19785,7 @@
         </p:nvSpPr>
         <p:spPr>
           <a:xfrm>
-            <a:off x="200025" y="1735454"/>
+            <a:off x="200025" y="1744980"/>
             <a:ext cx="8943975" cy="678180"/>
           </a:xfrm>
           <a:prstGeom prst="rect">
@@ -19845,7 +20052,7 @@
         <p:spPr>
           <a:xfrm>
             <a:off x="200025" y="847724"/>
-            <a:ext cx="8943975" cy="1838324"/>
+            <a:ext cx="8943975" cy="1904999"/>
           </a:xfrm>
           <a:prstGeom prst="rect">
             <a:avLst/>
@@ -19891,7 +20098,7 @@
         </p:nvSpPr>
         <p:spPr>
           <a:xfrm>
-            <a:off x="200025" y="2552700"/>
+            <a:off x="200025" y="2619374"/>
             <a:ext cx="8943975" cy="304800"/>
           </a:xfrm>
           <a:prstGeom prst="rect">
@@ -19936,8 +20143,8 @@
         </p:nvSpPr>
         <p:spPr>
           <a:xfrm>
-            <a:off x="200025" y="2857500"/>
-            <a:ext cx="8943975" cy="1838324"/>
+            <a:off x="200025" y="2933699"/>
+            <a:ext cx="8943975" cy="1904999"/>
           </a:xfrm>
           <a:prstGeom prst="rect">
             <a:avLst/>
@@ -19983,7 +20190,7 @@
         </p:nvSpPr>
         <p:spPr>
           <a:xfrm>
-            <a:off x="200025" y="4562475"/>
+            <a:off x="200025" y="4705350"/>
             <a:ext cx="8943975" cy="304800"/>
           </a:xfrm>
           <a:prstGeom prst="rect">
@@ -20055,7 +20262,7 @@
         <p:spPr>
           <a:xfrm>
             <a:off x="200025" y="180975"/>
-            <a:ext cx="8943975" cy="2143125"/>
+            <a:ext cx="8943975" cy="2219324"/>
           </a:xfrm>
           <a:prstGeom prst="rect">
             <a:avLst/>
@@ -20217,8 +20424,8 @@
         </p:nvSpPr>
         <p:spPr>
           <a:xfrm>
-            <a:off x="200025" y="847724"/>
-            <a:ext cx="8943975" cy="960119"/>
+            <a:off x="200025" y="857250"/>
+            <a:ext cx="8943975" cy="551497"/>
           </a:xfrm>
           <a:prstGeom prst="rect">
             <a:avLst/>
@@ -20249,13 +20456,73 @@
               <a:t>• </a:t>
             </a:r>
             <a:r>
+              <a:rPr i="1" sz="1000">
+                <a:solidFill>
+                  <a:srgbClr val="E0E0E0"/>
+                </a:solidFill>
+                <a:latin typeface="Arial"/>
+              </a:rPr>
+              <a:t>Nested items</a:t>
+            </a:r>
+            <a:r>
+              <a:rPr sz="1000">
+                <a:solidFill>
+                  <a:srgbClr val="E0E0E0"/>
+                </a:solidFill>
+                <a:latin typeface="Arial"/>
+              </a:rPr>
+              <a:t> with proper indentation</a:t>
+            </a:r>
+          </a:p>
+          <a:p>
+            <a:pPr algn="l"/>
+            <a:r>
+              <a:rPr sz="1000">
+                <a:solidFill>
+                  <a:srgbClr val="E0E0E0"/>
+                </a:solidFill>
+                <a:latin typeface="Arial"/>
+              </a:rPr>
+              <a:t>• </a:t>
+            </a:r>
+            <a:r>
+              <a:rPr sz="800">
+                <a:solidFill>
+                  <a:srgbClr val="FFFFFF"/>
+                </a:solidFill>
+                <a:latin typeface="Courier New"/>
+              </a:rPr>
+              <a:t>Code elements</a:t>
+            </a:r>
+            <a:r>
+              <a:rPr sz="1000">
+                <a:solidFill>
+                  <a:srgbClr val="E0E0E0"/>
+                </a:solidFill>
+                <a:latin typeface="Arial"/>
+              </a:rPr>
+              <a:t> in list items</a:t>
+            </a:r>
+          </a:p>
+          <a:p>
+            <a:pPr algn="l"/>
+            <a:r>
+              <a:rPr sz="1000">
+                <a:solidFill>
+                  <a:srgbClr val="E0E0E0"/>
+                </a:solidFill>
+                <a:latin typeface="Arial"/>
+              </a:rPr>
+              <a:t>• </a:t>
+            </a:r>
+            <a:r>
               <a:rPr b="1" sz="1000">
                 <a:solidFill>
-                  <a:srgbClr val="E0E0E0"/>
-                </a:solidFill>
-                <a:latin typeface="Arial"/>
-              </a:rPr>
-              <a:t>Primary feature</a:t>
+                  <a:srgbClr val="FFCC00"/>
+                </a:solidFill>
+                <a:latin typeface="Arial"/>
+              </a:rPr>
+              <a:t>Highlighted content</a:t>
             </a:r>
             <a:r>
               <a:rPr sz="1000">
@@ -20264,157 +20531,7 @@
                 </a:solidFill>
                 <a:latin typeface="Arial"/>
               </a:rPr>
-              <a:t>: Full markdown support</a:t>
-            </a:r>
-          </a:p>
-          <a:p>
-            <a:pPr algn="l"/>
-            <a:r>
-              <a:rPr sz="1000">
-                <a:solidFill>
-                  <a:srgbClr val="E0E0E0"/>
-                </a:solidFill>
-                <a:latin typeface="Arial"/>
-              </a:rPr>
-              <a:t>• </a:t>
-            </a:r>
-            <a:r>
-              <a:rPr b="1" sz="1000">
-                <a:solidFill>
-                  <a:srgbClr val="E0E0E0"/>
-                </a:solidFill>
-                <a:latin typeface="Arial"/>
-              </a:rPr>
-              <a:t>Secondary feature</a:t>
-            </a:r>
-            <a:r>
-              <a:rPr sz="1000">
-                <a:solidFill>
-                  <a:srgbClr val="E0E0E0"/>
-                </a:solidFill>
-                <a:latin typeface="Arial"/>
-              </a:rPr>
-              <a:t>: Inline styling within lists</a:t>
-            </a:r>
-          </a:p>
-          <a:p>
-            <a:pPr lvl="1" algn="l"/>
-            <a:r>
-              <a:rPr sz="1000">
-                <a:solidFill>
-                  <a:srgbClr val="E0E0E0"/>
-                </a:solidFill>
-                <a:latin typeface="Arial"/>
-              </a:rPr>
-              <a:t>• </a:t>
-            </a:r>
-            <a:r>
-              <a:rPr i="1" sz="1000">
-                <a:solidFill>
-                  <a:srgbClr val="E0E0E0"/>
-                </a:solidFill>
-                <a:latin typeface="Arial"/>
-              </a:rPr>
-              <a:t>Nested items</a:t>
-            </a:r>
-            <a:r>
-              <a:rPr sz="1000">
-                <a:solidFill>
-                  <a:srgbClr val="E0E0E0"/>
-                </a:solidFill>
-                <a:latin typeface="Arial"/>
-              </a:rPr>
-              <a:t> with proper indentation</a:t>
-            </a:r>
-          </a:p>
-          <a:p>
-            <a:pPr lvl="1" algn="l"/>
-            <a:r>
-              <a:rPr sz="1000">
-                <a:solidFill>
-                  <a:srgbClr val="E0E0E0"/>
-                </a:solidFill>
-                <a:latin typeface="Arial"/>
-              </a:rPr>
-              <a:t>• </a:t>
-            </a:r>
-            <a:r>
-              <a:rPr sz="800">
-                <a:solidFill>
-                  <a:srgbClr val="FFFFFF"/>
-                </a:solidFill>
-                <a:latin typeface="Courier New"/>
-              </a:rPr>
-              <a:t>Code elements</a:t>
-            </a:r>
-            <a:r>
-              <a:rPr sz="1000">
-                <a:solidFill>
-                  <a:srgbClr val="E0E0E0"/>
-                </a:solidFill>
-                <a:latin typeface="Arial"/>
-              </a:rPr>
-              <a:t> in list items</a:t>
-            </a:r>
-          </a:p>
-          <a:p>
-            <a:pPr lvl="1" algn="l"/>
-            <a:r>
-              <a:rPr sz="1000">
-                <a:solidFill>
-                  <a:srgbClr val="E0E0E0"/>
-                </a:solidFill>
-                <a:latin typeface="Arial"/>
-              </a:rPr>
-              <a:t>• </a:t>
-            </a:r>
-            <a:r>
-              <a:rPr b="1" sz="1000">
-                <a:solidFill>
-                  <a:srgbClr val="FFCC00"/>
-                </a:solidFill>
-                <a:latin typeface="Arial"/>
-              </a:rPr>
-              <a:t>Highlighted content</a:t>
-            </a:r>
-            <a:r>
-              <a:rPr sz="1000">
-                <a:solidFill>
-                  <a:srgbClr val="E0E0E0"/>
-                </a:solidFill>
-                <a:latin typeface="Arial"/>
-              </a:rPr>
               <a:t> for emphasis</a:t>
-            </a:r>
-          </a:p>
-          <a:p>
-            <a:pPr algn="l"/>
-            <a:r>
-              <a:rPr sz="1000">
-                <a:solidFill>
-                  <a:srgbClr val="E0E0E0"/>
-                </a:solidFill>
-                <a:latin typeface="Arial"/>
-              </a:rPr>
-              <a:t>• </a:t>
-            </a:r>
-            <a:r>
-              <a:rPr b="1" sz="1000">
-                <a:solidFill>
-                  <a:srgbClr val="E0E0E0"/>
-                </a:solidFill>
-                <a:latin typeface="Arial"/>
-              </a:rPr>
-              <a:t>Tertiary feature</a:t>
-            </a:r>
-            <a:r>
-              <a:rPr sz="1000">
-                <a:solidFill>
-                  <a:srgbClr val="E0E0E0"/>
-                </a:solidFill>
-                <a:latin typeface="Arial"/>
-              </a:rPr>
-              <a:t>: Multiple nesting levels</a:t>
             </a:r>
           </a:p>
         </p:txBody>
@@ -20427,7 +20544,7 @@
         </p:nvSpPr>
         <p:spPr>
           <a:xfrm>
-            <a:off x="200025" y="1712595"/>
+            <a:off x="200025" y="1313497"/>
             <a:ext cx="8943975" cy="304800"/>
           </a:xfrm>
           <a:prstGeom prst="rect">
@@ -20472,8 +20589,8 @@
         </p:nvSpPr>
         <p:spPr>
           <a:xfrm>
-            <a:off x="200025" y="2017394"/>
-            <a:ext cx="8943975" cy="1786890"/>
+            <a:off x="200025" y="1627822"/>
+            <a:ext cx="8943975" cy="551497"/>
           </a:xfrm>
           <a:prstGeom prst="rect">
             <a:avLst/>
@@ -20504,26 +20621,26 @@
               <a:t>1. </a:t>
             </a:r>
             <a:r>
-              <a:rPr b="1" sz="1000">
-                <a:solidFill>
-                  <a:srgbClr val="E0E0E0"/>
-                </a:solidFill>
-                <a:latin typeface="Arial"/>
-              </a:rPr>
-              <a:t>Setup Phase</a:t>
-            </a:r>
-          </a:p>
-          <a:p>
-            <a:pPr lvl="1" algn="l"/>
-            <a:r>
               <a:rPr sz="1000">
                 <a:solidFill>
                   <a:srgbClr val="E0E0E0"/>
                 </a:solidFill>
                 <a:latin typeface="Arial"/>
               </a:rPr>
-              <a:t>1. </a:t>
-            </a:r>
+              <a:t>Install dependencies with </a:t>
+            </a:r>
+            <a:r>
+              <a:rPr sz="800">
+                <a:solidFill>
+                  <a:srgbClr val="FFFFFF"/>
+                </a:solidFill>
+                <a:latin typeface="Courier New"/>
+              </a:rPr>
+              <a:t>pip install -r requirements.txt</a:t>
+            </a:r>
+          </a:p>
+          <a:p>
+            <a:pPr algn="l"/>
             <a:r>
               <a:rPr sz="1000">
                 <a:solidFill>
@@ -20531,20 +20648,8 @@
                 </a:solidFill>
                 <a:latin typeface="Arial"/>
               </a:rPr>
-              <a:t>Install dependencies with </a:t>
-            </a:r>
-            <a:r>
-              <a:rPr sz="800">
-                <a:solidFill>
-                  <a:srgbClr val="FFFFFF"/>
-                </a:solidFill>
-                <a:latin typeface="Courier New"/>
-              </a:rPr>
-              <a:t>pip install -r requirements.txt</a:t>
-            </a:r>
-          </a:p>
-          <a:p>
-            <a:pPr lvl="1" algn="l"/>
+              <a:t>2. </a:t>
+            </a:r>
             <a:r>
               <a:rPr sz="1000">
                 <a:solidFill>
@@ -20552,8 +20657,11 @@
                 </a:solidFill>
                 <a:latin typeface="Arial"/>
               </a:rPr>
-              <a:t>2. </a:t>
-            </a:r>
+              <a:t>Configure environment variables</a:t>
+            </a:r>
+          </a:p>
+          <a:p>
+            <a:pPr algn="l"/>
             <a:r>
               <a:rPr sz="1000">
                 <a:solidFill>
@@ -20561,11 +20669,8 @@
                 </a:solidFill>
                 <a:latin typeface="Arial"/>
               </a:rPr>
-              <a:t>Configure environment variables</a:t>
-            </a:r>
-          </a:p>
-          <a:p>
-            <a:pPr lvl="1" algn="l"/>
+              <a:t>3. </a:t>
+            </a:r>
             <a:r>
               <a:rPr sz="1000">
                 <a:solidFill>
@@ -20573,247 +20678,7 @@
                 </a:solidFill>
                 <a:latin typeface="Arial"/>
               </a:rPr>
-              <a:t>3. </a:t>
-            </a:r>
-            <a:r>
-              <a:rPr sz="1000">
-                <a:solidFill>
-                  <a:srgbClr val="E0E0E0"/>
-                </a:solidFill>
-                <a:latin typeface="Arial"/>
-              </a:rPr>
               <a:t>Initialize database schema</a:t>
-            </a:r>
-          </a:p>
-          <a:p>
-            <a:pPr algn="l"/>
-            <a:r>
-              <a:rPr sz="1000">
-                <a:solidFill>
-                  <a:srgbClr val="E0E0E0"/>
-                </a:solidFill>
-                <a:latin typeface="Arial"/>
-              </a:rPr>
-              <a:t>2. </a:t>
-            </a:r>
-            <a:r>
-              <a:rPr b="1" sz="1000">
-                <a:solidFill>
-                  <a:srgbClr val="E0E0E0"/>
-                </a:solidFill>
-                <a:latin typeface="Arial"/>
-              </a:rPr>
-              <a:t>Development Phase</a:t>
-            </a:r>
-          </a:p>
-          <a:p>
-            <a:pPr lvl="1" algn="l"/>
-            <a:r>
-              <a:rPr sz="1000">
-                <a:solidFill>
-                  <a:srgbClr val="E0E0E0"/>
-                </a:solidFill>
-                <a:latin typeface="Arial"/>
-              </a:rPr>
-              <a:t>1. </a:t>
-            </a:r>
-            <a:r>
-              <a:rPr sz="1000">
-                <a:solidFill>
-                  <a:srgbClr val="E0E0E0"/>
-                </a:solidFill>
-                <a:latin typeface="Arial"/>
-              </a:rPr>
-              <a:t>Write </a:t>
-            </a:r>
-            <a:r>
-              <a:rPr b="1" sz="1000">
-                <a:solidFill>
-                  <a:srgbClr val="FFCC00"/>
-                </a:solidFill>
-                <a:latin typeface="Arial"/>
-              </a:rPr>
-              <a:t>clean, maintainable code</a:t>
-            </a:r>
-          </a:p>
-          <a:p>
-            <a:pPr lvl="1" algn="l"/>
-            <a:r>
-              <a:rPr sz="1000">
-                <a:solidFill>
-                  <a:srgbClr val="E0E0E0"/>
-                </a:solidFill>
-                <a:latin typeface="Arial"/>
-              </a:rPr>
-              <a:t>2. </a:t>
-            </a:r>
-            <a:r>
-              <a:rPr sz="1000">
-                <a:solidFill>
-                  <a:srgbClr val="E0E0E0"/>
-                </a:solidFill>
-                <a:latin typeface="Arial"/>
-              </a:rPr>
-              <a:t>Add comprehensive </a:t>
-            </a:r>
-            <a:r>
-              <a:rPr i="1" sz="1000">
-                <a:solidFill>
-                  <a:srgbClr val="E0E0E0"/>
-                </a:solidFill>
-                <a:latin typeface="Arial"/>
-              </a:rPr>
-              <a:t>unit tests</a:t>
-            </a:r>
-          </a:p>
-          <a:p>
-            <a:pPr lvl="1" algn="l"/>
-            <a:r>
-              <a:rPr sz="1000">
-                <a:solidFill>
-                  <a:srgbClr val="E0E0E0"/>
-                </a:solidFill>
-                <a:latin typeface="Arial"/>
-              </a:rPr>
-              <a:t>3. </a:t>
-            </a:r>
-            <a:r>
-              <a:rPr sz="1000">
-                <a:solidFill>
-                  <a:srgbClr val="E0E0E0"/>
-                </a:solidFill>
-                <a:latin typeface="Arial"/>
-              </a:rPr>
-              <a:t>Document </a:t>
-            </a:r>
-            <a:r>
-              <a:rPr b="1" sz="1000">
-                <a:solidFill>
-                  <a:srgbClr val="E0E0E0"/>
-                </a:solidFill>
-                <a:latin typeface="Arial"/>
-              </a:rPr>
-              <a:t>public APIs</a:t>
-            </a:r>
-          </a:p>
-          <a:p>
-            <a:pPr algn="l"/>
-            <a:r>
-              <a:rPr sz="1000">
-                <a:solidFill>
-                  <a:srgbClr val="E0E0E0"/>
-                </a:solidFill>
-                <a:latin typeface="Arial"/>
-              </a:rPr>
-              <a:t>3. </a:t>
-            </a:r>
-            <a:r>
-              <a:rPr b="1" sz="1000">
-                <a:solidFill>
-                  <a:srgbClr val="E0E0E0"/>
-                </a:solidFill>
-                <a:latin typeface="Arial"/>
-              </a:rPr>
-              <a:t>Deployment Phase</a:t>
-            </a:r>
-          </a:p>
-          <a:p>
-            <a:pPr lvl="1" algn="l"/>
-            <a:r>
-              <a:rPr sz="1000">
-                <a:solidFill>
-                  <a:srgbClr val="E0E0E0"/>
-                </a:solidFill>
-                <a:latin typeface="Arial"/>
-              </a:rPr>
-              <a:t>1. </a:t>
-            </a:r>
-            <a:r>
-              <a:rPr sz="1000">
-                <a:solidFill>
-                  <a:srgbClr val="E0E0E0"/>
-                </a:solidFill>
-                <a:latin typeface="Arial"/>
-              </a:rPr>
-              <a:t>Run </a:t>
-            </a:r>
-            <a:r>
-              <a:rPr sz="800">
-                <a:solidFill>
-                  <a:srgbClr val="FFFFFF"/>
-                </a:solidFill>
-                <a:latin typeface="Courier New"/>
-              </a:rPr>
-              <a:t>pytest</a:t>
-            </a:r>
-            <a:r>
-              <a:rPr sz="1000">
-                <a:solidFill>
-                  <a:srgbClr val="E0E0E0"/>
-                </a:solidFill>
-                <a:latin typeface="Arial"/>
-              </a:rPr>
-              <a:t> for quality assurance</a:t>
-            </a:r>
-          </a:p>
-          <a:p>
-            <a:pPr lvl="1" algn="l"/>
-            <a:r>
-              <a:rPr sz="1000">
-                <a:solidFill>
-                  <a:srgbClr val="E0E0E0"/>
-                </a:solidFill>
-                <a:latin typeface="Arial"/>
-              </a:rPr>
-              <a:t>2. </a:t>
-            </a:r>
-            <a:r>
-              <a:rPr sz="1000">
-                <a:solidFill>
-                  <a:srgbClr val="E0E0E0"/>
-                </a:solidFill>
-                <a:latin typeface="Arial"/>
-              </a:rPr>
-              <a:t>Deploy to </a:t>
-            </a:r>
-            <a:r>
-              <a:rPr b="1" sz="1000">
-                <a:solidFill>
-                  <a:srgbClr val="FFCC00"/>
-                </a:solidFill>
-                <a:latin typeface="Arial"/>
-              </a:rPr>
-              <a:t>production environment</a:t>
-            </a:r>
-          </a:p>
-          <a:p>
-            <a:pPr lvl="1" algn="l"/>
-            <a:r>
-              <a:rPr sz="1000">
-                <a:solidFill>
-                  <a:srgbClr val="E0E0E0"/>
-                </a:solidFill>
-                <a:latin typeface="Arial"/>
-              </a:rPr>
-              <a:t>3. </a:t>
-            </a:r>
-            <a:r>
-              <a:rPr sz="1000">
-                <a:solidFill>
-                  <a:srgbClr val="E0E0E0"/>
-                </a:solidFill>
-                <a:latin typeface="Arial"/>
-              </a:rPr>
-              <a:t>Monitor </a:t>
-            </a:r>
-            <a:r>
-              <a:rPr i="1" sz="1000">
-                <a:solidFill>
-                  <a:srgbClr val="E0E0E0"/>
-                </a:solidFill>
-                <a:latin typeface="Arial"/>
-              </a:rPr>
-              <a:t>system performance</a:t>
             </a:r>
           </a:p>
         </p:txBody>

</xml_diff>

<commit_message>
add counter toc on titles; improve how we style dataframe tables
</commit_message>
<xml_diff>
--- a/output/comprehensive_demo_dark.pptx
+++ b/output/comprehensive_demo_dark.pptx
@@ -10524,7 +10524,7 @@
         </p:nvSpPr>
         <p:spPr>
           <a:xfrm>
-            <a:off x="200025" y="2933699"/>
+            <a:off x="200025" y="2943225"/>
             <a:ext cx="8943975" cy="304800"/>
           </a:xfrm>
           <a:prstGeom prst="rect">
@@ -10569,7 +10569,7 @@
         </p:nvSpPr>
         <p:spPr>
           <a:xfrm>
-            <a:off x="200025" y="3238500"/>
+            <a:off x="200025" y="3248024"/>
             <a:ext cx="8943975" cy="274320"/>
           </a:xfrm>
           <a:prstGeom prst="rect">
@@ -10622,7 +10622,7 @@
         </p:blipFill>
         <p:spPr>
           <a:xfrm>
-            <a:off x="838200" y="3257550"/>
+            <a:off x="838200" y="3267075"/>
             <a:ext cx="7467599" cy="447675"/>
           </a:xfrm>
           <a:prstGeom prst="rect">
@@ -10638,7 +10638,7 @@
         </p:nvSpPr>
         <p:spPr>
           <a:xfrm>
-            <a:off x="200025" y="3981449"/>
+            <a:off x="200025" y="3990974"/>
             <a:ext cx="8943975" cy="274320"/>
           </a:xfrm>
           <a:prstGeom prst="rect">

</xml_diff>

<commit_message>
Tentative feature to add speaker notes; messy implementation, needs architectural revamp
</commit_message>
<xml_diff>
--- a/output/comprehensive_demo_dark.pptx
+++ b/output/comprehensive_demo_dark.pptx
@@ -23,12 +23,14 @@
     <p:sldId id="271" r:id="rId22"/>
     <p:sldId id="272" r:id="rId23"/>
     <p:sldId id="273" r:id="rId24"/>
-    <p:sldId id="274" r:id="rId25"/>
-    <p:sldId id="275" r:id="rId26"/>
-    <p:sldId id="276" r:id="rId27"/>
-    <p:sldId id="277" r:id="rId28"/>
-    <p:sldId id="278" r:id="rId29"/>
-    <p:sldId id="279" r:id="rId30"/>
+    <p:sldId id="274" r:id="rId26"/>
+    <p:sldId id="275" r:id="rId27"/>
+    <p:sldId id="276" r:id="rId28"/>
+    <p:sldId id="277" r:id="rId29"/>
+    <p:sldId id="278" r:id="rId30"/>
+    <p:sldId id="279" r:id="rId31"/>
+    <p:sldId id="280" r:id="rId32"/>
+    <p:sldId id="281" r:id="rId33"/>
   </p:sldIdLst>
   <p:sldSz cx="9144000" cy="5143500" type="screen4x3"/>
   <p:notesSz cx="6858000" cy="9144000"/>
@@ -128,6 +130,499 @@
     </a:lvl9pPr>
   </p:defaultTextStyle>
 </p:presentation>
+</file>
+
+<file path=ppt/notesMasters/notesMaster1.xml><?xml version="1.0" encoding="utf-8"?>
+<p:notesMaster xmlns:a="http://schemas.openxmlformats.org/drawingml/2006/main" xmlns:p="http://schemas.openxmlformats.org/presentationml/2006/main" xmlns:r="http://schemas.openxmlformats.org/officeDocument/2006/relationships">
+  <p:cSld>
+    <p:bg>
+      <p:bgRef idx="1001">
+        <a:schemeClr val="bg1"/>
+      </p:bgRef>
+    </p:bg>
+    <p:spTree>
+      <p:nvGrpSpPr>
+        <p:cNvPr id="1" name=""/>
+        <p:cNvGrpSpPr/>
+        <p:nvPr/>
+      </p:nvGrpSpPr>
+      <p:grpSpPr>
+        <a:xfrm>
+          <a:off x="0" y="0"/>
+          <a:ext cx="0" cy="0"/>
+          <a:chOff x="0" y="0"/>
+          <a:chExt cx="0" cy="0"/>
+        </a:xfrm>
+      </p:grpSpPr>
+      <p:sp>
+        <p:nvSpPr>
+          <p:cNvPr id="2" name="Header Placeholder 1"/>
+          <p:cNvSpPr>
+            <a:spLocks noGrp="1"/>
+          </p:cNvSpPr>
+          <p:nvPr>
+            <p:ph type="hdr" sz="quarter"/>
+          </p:nvPr>
+        </p:nvSpPr>
+        <p:spPr>
+          <a:xfrm>
+            <a:off x="0" y="0"/>
+            <a:ext cx="2971800" cy="457200"/>
+          </a:xfrm>
+          <a:prstGeom prst="rect">
+            <a:avLst/>
+          </a:prstGeom>
+        </p:spPr>
+        <p:txBody>
+          <a:bodyPr vert="horz" lIns="91440" tIns="45720" rIns="91440" bIns="45720" rtlCol="0"/>
+          <a:lstStyle>
+            <a:lvl1pPr algn="l">
+              <a:defRPr sz="1200"/>
+            </a:lvl1pPr>
+          </a:lstStyle>
+          <a:p>
+            <a:endParaRPr lang="en-US"/>
+          </a:p>
+        </p:txBody>
+      </p:sp>
+      <p:sp>
+        <p:nvSpPr>
+          <p:cNvPr id="3" name="Date Placeholder 2"/>
+          <p:cNvSpPr>
+            <a:spLocks noGrp="1"/>
+          </p:cNvSpPr>
+          <p:nvPr>
+            <p:ph type="dt" idx="1"/>
+          </p:nvPr>
+        </p:nvSpPr>
+        <p:spPr>
+          <a:xfrm>
+            <a:off x="3884613" y="0"/>
+            <a:ext cx="2971800" cy="457200"/>
+          </a:xfrm>
+          <a:prstGeom prst="rect">
+            <a:avLst/>
+          </a:prstGeom>
+        </p:spPr>
+        <p:txBody>
+          <a:bodyPr vert="horz" lIns="91440" tIns="45720" rIns="91440" bIns="45720" rtlCol="0"/>
+          <a:lstStyle>
+            <a:lvl1pPr algn="r">
+              <a:defRPr sz="1200"/>
+            </a:lvl1pPr>
+          </a:lstStyle>
+          <a:p>
+            <a:fld id="{0F89C1C7-3DCD-1040-A9CF-14679D8B5DDD}" type="datetimeFigureOut">
+              <a:rPr lang="en-US" smtClean="0"/>
+              <a:t>10/17/16</a:t>
+            </a:fld>
+            <a:endParaRPr lang="en-US"/>
+          </a:p>
+        </p:txBody>
+      </p:sp>
+      <p:sp>
+        <p:nvSpPr>
+          <p:cNvPr id="4" name="Slide Image Placeholder 3"/>
+          <p:cNvSpPr>
+            <a:spLocks noGrp="1" noRot="1" noChangeAspect="1"/>
+          </p:cNvSpPr>
+          <p:nvPr>
+            <p:ph type="sldImg" idx="2"/>
+          </p:nvPr>
+        </p:nvSpPr>
+        <p:spPr>
+          <a:xfrm>
+            <a:off x="1143000" y="685800"/>
+            <a:ext cx="4572000" cy="3429000"/>
+          </a:xfrm>
+          <a:prstGeom prst="rect">
+            <a:avLst/>
+          </a:prstGeom>
+          <a:noFill/>
+          <a:ln w="12700">
+            <a:solidFill>
+              <a:prstClr val="black"/>
+            </a:solidFill>
+          </a:ln>
+        </p:spPr>
+        <p:txBody>
+          <a:bodyPr vert="horz" lIns="91440" tIns="45720" rIns="91440" bIns="45720" rtlCol="0" anchor="ctr"/>
+          <a:lstStyle/>
+          <a:p>
+            <a:endParaRPr lang="en-US"/>
+          </a:p>
+        </p:txBody>
+      </p:sp>
+      <p:sp>
+        <p:nvSpPr>
+          <p:cNvPr id="5" name="Notes Placeholder 4"/>
+          <p:cNvSpPr>
+            <a:spLocks noGrp="1"/>
+          </p:cNvSpPr>
+          <p:nvPr>
+            <p:ph type="body" sz="quarter" idx="3"/>
+          </p:nvPr>
+        </p:nvSpPr>
+        <p:spPr>
+          <a:xfrm>
+            <a:off x="685800" y="4343400"/>
+            <a:ext cx="5486400" cy="4114800"/>
+          </a:xfrm>
+          <a:prstGeom prst="rect">
+            <a:avLst/>
+          </a:prstGeom>
+        </p:spPr>
+        <p:txBody>
+          <a:bodyPr vert="horz" lIns="91440" tIns="45720" rIns="91440" bIns="45720" rtlCol="0"/>
+          <a:lstStyle/>
+          <a:p>
+            <a:pPr lvl="0"/>
+            <a:r>
+              <a:rPr lang="en-US" smtClean="0"/>
+              <a:t>Click to edit Master text styles</a:t>
+            </a:r>
+          </a:p>
+          <a:p>
+            <a:pPr lvl="1"/>
+            <a:r>
+              <a:rPr lang="en-US" smtClean="0"/>
+              <a:t>Second level</a:t>
+            </a:r>
+          </a:p>
+          <a:p>
+            <a:pPr lvl="2"/>
+            <a:r>
+              <a:rPr lang="en-US" smtClean="0"/>
+              <a:t>Third level</a:t>
+            </a:r>
+          </a:p>
+          <a:p>
+            <a:pPr lvl="3"/>
+            <a:r>
+              <a:rPr lang="en-US" smtClean="0"/>
+              <a:t>Fourth level</a:t>
+            </a:r>
+          </a:p>
+          <a:p>
+            <a:pPr lvl="4"/>
+            <a:r>
+              <a:rPr lang="en-US" smtClean="0"/>
+              <a:t>Fifth level</a:t>
+            </a:r>
+            <a:endParaRPr lang="en-US"/>
+          </a:p>
+        </p:txBody>
+      </p:sp>
+      <p:sp>
+        <p:nvSpPr>
+          <p:cNvPr id="6" name="Footer Placeholder 5"/>
+          <p:cNvSpPr>
+            <a:spLocks noGrp="1"/>
+          </p:cNvSpPr>
+          <p:nvPr>
+            <p:ph type="ftr" sz="quarter" idx="4"/>
+          </p:nvPr>
+        </p:nvSpPr>
+        <p:spPr>
+          <a:xfrm>
+            <a:off x="0" y="8685213"/>
+            <a:ext cx="2971800" cy="457200"/>
+          </a:xfrm>
+          <a:prstGeom prst="rect">
+            <a:avLst/>
+          </a:prstGeom>
+        </p:spPr>
+        <p:txBody>
+          <a:bodyPr vert="horz" lIns="91440" tIns="45720" rIns="91440" bIns="45720" rtlCol="0" anchor="b"/>
+          <a:lstStyle>
+            <a:lvl1pPr algn="l">
+              <a:defRPr sz="1200"/>
+            </a:lvl1pPr>
+          </a:lstStyle>
+          <a:p>
+            <a:endParaRPr lang="en-US"/>
+          </a:p>
+        </p:txBody>
+      </p:sp>
+      <p:sp>
+        <p:nvSpPr>
+          <p:cNvPr id="7" name="Slide Number Placeholder 6"/>
+          <p:cNvSpPr>
+            <a:spLocks noGrp="1"/>
+          </p:cNvSpPr>
+          <p:nvPr>
+            <p:ph type="sldNum" sz="quarter" idx="5"/>
+          </p:nvPr>
+        </p:nvSpPr>
+        <p:spPr>
+          <a:xfrm>
+            <a:off x="3884613" y="8685213"/>
+            <a:ext cx="2971800" cy="457200"/>
+          </a:xfrm>
+          <a:prstGeom prst="rect">
+            <a:avLst/>
+          </a:prstGeom>
+        </p:spPr>
+        <p:txBody>
+          <a:bodyPr vert="horz" lIns="91440" tIns="45720" rIns="91440" bIns="45720" rtlCol="0" anchor="b"/>
+          <a:lstStyle>
+            <a:lvl1pPr algn="r">
+              <a:defRPr sz="1200"/>
+            </a:lvl1pPr>
+          </a:lstStyle>
+          <a:p>
+            <a:fld id="{BB5E49A5-4136-284D-997B-48E1D791AD67}" type="slidenum">
+              <a:rPr lang="en-US" smtClean="0"/>
+              <a:t>‹#›</a:t>
+            </a:fld>
+            <a:endParaRPr lang="en-US"/>
+          </a:p>
+        </p:txBody>
+      </p:sp>
+    </p:spTree>
+    <p:extLst>
+      <p:ext uri="{BB962C8B-B14F-4D97-AF65-F5344CB8AC3E}">
+        <p14:creationId xmlns:p14="http://schemas.microsoft.com/office/powerpoint/2010/main" val="2623252185"/>
+      </p:ext>
+    </p:extLst>
+  </p:cSld>
+  <p:clrMap bg1="lt1" tx1="dk1" bg2="lt2" tx2="dk2" accent1="accent1" accent2="accent2" accent3="accent3" accent4="accent4" accent5="accent5" accent6="accent6" hlink="hlink" folHlink="folHlink"/>
+  <p:notesStyle>
+    <a:lvl1pPr marL="0" algn="l" defTabSz="457200" rtl="0" eaLnBrk="1" latinLnBrk="0" hangingPunct="1">
+      <a:defRPr sz="1200" kern="1200">
+        <a:solidFill>
+          <a:schemeClr val="tx1"/>
+        </a:solidFill>
+        <a:latin typeface="+mn-lt"/>
+        <a:ea typeface="+mn-ea"/>
+        <a:cs typeface="+mn-cs"/>
+      </a:defRPr>
+    </a:lvl1pPr>
+    <a:lvl2pPr marL="457200" algn="l" defTabSz="457200" rtl="0" eaLnBrk="1" latinLnBrk="0" hangingPunct="1">
+      <a:defRPr sz="1200" kern="1200">
+        <a:solidFill>
+          <a:schemeClr val="tx1"/>
+        </a:solidFill>
+        <a:latin typeface="+mn-lt"/>
+        <a:ea typeface="+mn-ea"/>
+        <a:cs typeface="+mn-cs"/>
+      </a:defRPr>
+    </a:lvl2pPr>
+    <a:lvl3pPr marL="914400" algn="l" defTabSz="457200" rtl="0" eaLnBrk="1" latinLnBrk="0" hangingPunct="1">
+      <a:defRPr sz="1200" kern="1200">
+        <a:solidFill>
+          <a:schemeClr val="tx1"/>
+        </a:solidFill>
+        <a:latin typeface="+mn-lt"/>
+        <a:ea typeface="+mn-ea"/>
+        <a:cs typeface="+mn-cs"/>
+      </a:defRPr>
+    </a:lvl3pPr>
+    <a:lvl4pPr marL="1371600" algn="l" defTabSz="457200" rtl="0" eaLnBrk="1" latinLnBrk="0" hangingPunct="1">
+      <a:defRPr sz="1200" kern="1200">
+        <a:solidFill>
+          <a:schemeClr val="tx1"/>
+        </a:solidFill>
+        <a:latin typeface="+mn-lt"/>
+        <a:ea typeface="+mn-ea"/>
+        <a:cs typeface="+mn-cs"/>
+      </a:defRPr>
+    </a:lvl4pPr>
+    <a:lvl5pPr marL="1828800" algn="l" defTabSz="457200" rtl="0" eaLnBrk="1" latinLnBrk="0" hangingPunct="1">
+      <a:defRPr sz="1200" kern="1200">
+        <a:solidFill>
+          <a:schemeClr val="tx1"/>
+        </a:solidFill>
+        <a:latin typeface="+mn-lt"/>
+        <a:ea typeface="+mn-ea"/>
+        <a:cs typeface="+mn-cs"/>
+      </a:defRPr>
+    </a:lvl5pPr>
+    <a:lvl6pPr marL="2286000" algn="l" defTabSz="457200" rtl="0" eaLnBrk="1" latinLnBrk="0" hangingPunct="1">
+      <a:defRPr sz="1200" kern="1200">
+        <a:solidFill>
+          <a:schemeClr val="tx1"/>
+        </a:solidFill>
+        <a:latin typeface="+mn-lt"/>
+        <a:ea typeface="+mn-ea"/>
+        <a:cs typeface="+mn-cs"/>
+      </a:defRPr>
+    </a:lvl6pPr>
+    <a:lvl7pPr marL="2743200" algn="l" defTabSz="457200" rtl="0" eaLnBrk="1" latinLnBrk="0" hangingPunct="1">
+      <a:defRPr sz="1200" kern="1200">
+        <a:solidFill>
+          <a:schemeClr val="tx1"/>
+        </a:solidFill>
+        <a:latin typeface="+mn-lt"/>
+        <a:ea typeface="+mn-ea"/>
+        <a:cs typeface="+mn-cs"/>
+      </a:defRPr>
+    </a:lvl7pPr>
+    <a:lvl8pPr marL="3200400" algn="l" defTabSz="457200" rtl="0" eaLnBrk="1" latinLnBrk="0" hangingPunct="1">
+      <a:defRPr sz="1200" kern="1200">
+        <a:solidFill>
+          <a:schemeClr val="tx1"/>
+        </a:solidFill>
+        <a:latin typeface="+mn-lt"/>
+        <a:ea typeface="+mn-ea"/>
+        <a:cs typeface="+mn-cs"/>
+      </a:defRPr>
+    </a:lvl8pPr>
+    <a:lvl9pPr marL="3657600" algn="l" defTabSz="457200" rtl="0" eaLnBrk="1" latinLnBrk="0" hangingPunct="1">
+      <a:defRPr sz="1200" kern="1200">
+        <a:solidFill>
+          <a:schemeClr val="tx1"/>
+        </a:solidFill>
+        <a:latin typeface="+mn-lt"/>
+        <a:ea typeface="+mn-ea"/>
+        <a:cs typeface="+mn-cs"/>
+      </a:defRPr>
+    </a:lvl9pPr>
+  </p:notesStyle>
+</p:notesMaster>
+</file>
+
+<file path=ppt/notesSlides/notesSlide1.xml><?xml version="1.0" encoding="utf-8"?>
+<p:notes xmlns:a="http://schemas.openxmlformats.org/drawingml/2006/main" xmlns:p="http://schemas.openxmlformats.org/presentationml/2006/main" xmlns:r="http://schemas.openxmlformats.org/officeDocument/2006/relationships">
+  <p:cSld>
+    <p:spTree>
+      <p:nvGrpSpPr>
+        <p:cNvPr id="1" name=""/>
+        <p:cNvGrpSpPr/>
+        <p:nvPr/>
+      </p:nvGrpSpPr>
+      <p:grpSpPr>
+        <a:xfrm>
+          <a:off x="0" y="0"/>
+          <a:ext cx="0" cy="0"/>
+          <a:chOff x="0" y="0"/>
+          <a:chExt cx="0" cy="0"/>
+        </a:xfrm>
+      </p:grpSpPr>
+      <p:sp>
+        <p:nvSpPr>
+          <p:cNvPr id="2" name="Slide Image Placeholder 1"/>
+          <p:cNvSpPr>
+            <a:spLocks noGrp="1"/>
+          </p:cNvSpPr>
+          <p:nvPr>
+            <p:ph type="sldImg" idx="2"/>
+          </p:nvPr>
+        </p:nvSpPr>
+        <p:spPr/>
+      </p:sp>
+      <p:sp>
+        <p:nvSpPr>
+          <p:cNvPr id="3" name="Notes Placeholder 2"/>
+          <p:cNvSpPr>
+            <a:spLocks noGrp="1"/>
+          </p:cNvSpPr>
+          <p:nvPr>
+            <p:ph type="body" idx="3" sz="quarter"/>
+          </p:nvPr>
+        </p:nvSpPr>
+        <p:spPr/>
+        <p:txBody>
+          <a:bodyPr/>
+          <a:lstStyle/>
+          <a:p>
+            <a:r>
+              <a:t>This is the first speaker note example. It contains important details for the presenter about the slide content and should appear in PowerPoint's speaker notes section.</a:t>
+            </a:r>
+          </a:p>
+        </p:txBody>
+      </p:sp>
+      <p:sp>
+        <p:nvSpPr>
+          <p:cNvPr id="4" name="Slide Number Placeholder 3"/>
+          <p:cNvSpPr>
+            <a:spLocks noGrp="1"/>
+          </p:cNvSpPr>
+          <p:nvPr>
+            <p:ph type="sldNum" idx="5" sz="quarter"/>
+          </p:nvPr>
+        </p:nvSpPr>
+        <p:spPr/>
+      </p:sp>
+    </p:spTree>
+  </p:cSld>
+  <p:clrMapOvr>
+    <a:masterClrMapping/>
+  </p:clrMapOvr>
+</p:notes>
+</file>
+
+<file path=ppt/notesSlides/notesSlide2.xml><?xml version="1.0" encoding="utf-8"?>
+<p:notes xmlns:a="http://schemas.openxmlformats.org/drawingml/2006/main" xmlns:p="http://schemas.openxmlformats.org/presentationml/2006/main" xmlns:r="http://schemas.openxmlformats.org/officeDocument/2006/relationships">
+  <p:cSld>
+    <p:spTree>
+      <p:nvGrpSpPr>
+        <p:cNvPr id="1" name=""/>
+        <p:cNvGrpSpPr/>
+        <p:nvPr/>
+      </p:nvGrpSpPr>
+      <p:grpSpPr>
+        <a:xfrm>
+          <a:off x="0" y="0"/>
+          <a:ext cx="0" cy="0"/>
+          <a:chOff x="0" y="0"/>
+          <a:chExt cx="0" cy="0"/>
+        </a:xfrm>
+      </p:grpSpPr>
+      <p:sp>
+        <p:nvSpPr>
+          <p:cNvPr id="2" name="Slide Image Placeholder 1"/>
+          <p:cNvSpPr>
+            <a:spLocks noGrp="1"/>
+          </p:cNvSpPr>
+          <p:nvPr>
+            <p:ph type="sldImg" idx="2"/>
+          </p:nvPr>
+        </p:nvSpPr>
+        <p:spPr/>
+      </p:sp>
+      <p:sp>
+        <p:nvSpPr>
+          <p:cNvPr id="3" name="Notes Placeholder 2"/>
+          <p:cNvSpPr>
+            <a:spLocks noGrp="1"/>
+          </p:cNvSpPr>
+          <p:nvPr>
+            <p:ph type="body" idx="3" sz="quarter"/>
+          </p:nvPr>
+        </p:nvSpPr>
+        <p:spPr/>
+        <p:txBody>
+          <a:bodyPr/>
+          <a:lstStyle/>
+          <a:p>
+            <a:r>
+              <a:t>This is the second speaker note with multiple lines.
+It demonstrates that speaker notes can span multiple lines and contain rich information.
+Presenters can include bullet points, additional context, or reminders here.
+These notes will appear in PowerPoint's speaker notes view but won't affect the slide layout.</a:t>
+            </a:r>
+          </a:p>
+        </p:txBody>
+      </p:sp>
+      <p:sp>
+        <p:nvSpPr>
+          <p:cNvPr id="4" name="Slide Number Placeholder 3"/>
+          <p:cNvSpPr>
+            <a:spLocks noGrp="1"/>
+          </p:cNvSpPr>
+          <p:nvPr>
+            <p:ph type="sldNum" idx="5" sz="quarter"/>
+          </p:nvPr>
+        </p:nvSpPr>
+        <p:spPr/>
+      </p:sp>
+    </p:spTree>
+  </p:cSld>
+  <p:clrMapOvr>
+    <a:masterClrMapping/>
+  </p:clrMapOvr>
+</p:notes>
 </file>
 
 <file path=ppt/slideLayouts/slideLayout1.xml><?xml version="1.0" encoding="utf-8"?>
@@ -10094,7 +10589,7 @@
                 </a:solidFill>
                 <a:latin typeface="Arial"/>
               </a:rPr>
-              <a:t>🧮 Math Equations Support</a:t>
+              <a:t>📝 Speaker Notes Demo</a:t>
             </a:r>
           </a:p>
         </p:txBody>
@@ -10139,7 +10634,43 @@
                 </a:solidFill>
                 <a:latin typeface="Arial"/>
               </a:rPr>
-              <a:t>The slide generator now supports LaTeX math equations using KaTeX rendering.</a:t>
+              <a:t>This slide demonstrates </a:t>
+            </a:r>
+            <a:r>
+              <a:rPr b="1" sz="1000">
+                <a:solidFill>
+                  <a:srgbClr val="E0E0E0"/>
+                </a:solidFill>
+                <a:latin typeface="Arial"/>
+              </a:rPr>
+              <a:t>speaker notes functionality</a:t>
+            </a:r>
+            <a:r>
+              <a:rPr sz="1000">
+                <a:solidFill>
+                  <a:srgbClr val="E0E0E0"/>
+                </a:solidFill>
+                <a:latin typeface="Arial"/>
+              </a:rPr>
+              <a:t> with </a:t>
+            </a:r>
+            <a:r>
+              <a:rPr i="1" sz="1000">
+                <a:solidFill>
+                  <a:srgbClr val="E0E0E0"/>
+                </a:solidFill>
+                <a:latin typeface="Arial"/>
+              </a:rPr>
+              <a:t>various styling elements</a:t>
+            </a:r>
+            <a:r>
+              <a:rPr sz="1000">
+                <a:solidFill>
+                  <a:srgbClr val="E0E0E0"/>
+                </a:solidFill>
+                <a:latin typeface="Arial"/>
+              </a:rPr>
+              <a:t>.</a:t>
             </a:r>
           </a:p>
         </p:txBody>
@@ -10152,52 +10683,7 @@
         </p:nvSpPr>
         <p:spPr>
           <a:xfrm>
-            <a:off x="200025" y="676274"/>
-            <a:ext cx="8943975" cy="304800"/>
-          </a:xfrm>
-          <a:prstGeom prst="rect">
-            <a:avLst/>
-          </a:prstGeom>
-          <a:noFill/>
-        </p:spPr>
-        <p:txBody>
-          <a:bodyPr wrap="square" lIns="0" rIns="0" tIns="0" bIns="0">
-            <a:spAutoFit/>
-          </a:bodyPr>
-          <a:lstStyle/>
-          <a:p>
-            <a:pPr algn="l">
-              <a:lnSpc>
-                <a:spcPct val="100000"/>
-              </a:lnSpc>
-              <a:spcBef>
-                <a:spcPts val="0"/>
-              </a:spcBef>
-              <a:spcAft>
-                <a:spcPts val="0"/>
-              </a:spcAft>
-            </a:pPr>
-            <a:r>
-              <a:rPr sz="1300" b="1">
-                <a:solidFill>
-                  <a:srgbClr val="E0E0E0"/>
-                </a:solidFill>
-                <a:latin typeface="Arial"/>
-              </a:rPr>
-              <a:t>Inline Math</a:t>
-            </a:r>
-          </a:p>
-        </p:txBody>
-      </p:sp>
-      <p:sp>
-        <p:nvSpPr>
-          <p:cNvPr id="5" name="TextBox 4"/>
-          <p:cNvSpPr txBox="1"/>
-          <p:nvPr/>
-        </p:nvSpPr>
-        <p:spPr>
-          <a:xfrm>
-            <a:off x="200025" y="990599"/>
+            <a:off x="200025" y="771525"/>
             <a:ext cx="8943975" cy="274320"/>
           </a:xfrm>
           <a:prstGeom prst="rect">
@@ -10229,7 +10715,16 @@
                 </a:solidFill>
                 <a:latin typeface="Arial"/>
               </a:rPr>
-              <a:t>You can include inline math like </a:t>
+              <a:t>You can add </a:t>
+            </a:r>
+            <a:r>
+              <a:rPr b="1" sz="1000">
+                <a:solidFill>
+                  <a:srgbClr val="FFCC00"/>
+                </a:solidFill>
+                <a:latin typeface="Arial"/>
+              </a:rPr>
+              <a:t>highlighted text</a:t>
             </a:r>
             <a:r>
               <a:rPr sz="1000">
@@ -10238,7 +10733,16 @@
                 </a:solidFill>
                 <a:latin typeface="Arial"/>
               </a:rPr>
-              <a:t>$E=mc^2$</a:t>
+              <a:t> and </a:t>
+            </a:r>
+            <a:r>
+              <a:rPr sz="800">
+                <a:solidFill>
+                  <a:srgbClr val="FFFFFF"/>
+                </a:solidFill>
+                <a:latin typeface="Courier New"/>
+              </a:rPr>
+              <a:t>inline code</a:t>
             </a:r>
             <a:r>
               <a:rPr sz="1000">
@@ -10247,38 +10751,20 @@
                 </a:solidFill>
                 <a:latin typeface="Arial"/>
               </a:rPr>
-              <a:t> or </a:t>
-            </a:r>
-            <a:r>
-              <a:rPr sz="1000">
-                <a:solidFill>
-                  <a:srgbClr val="E0E0E0"/>
-                </a:solidFill>
-                <a:latin typeface="Arial"/>
-              </a:rPr>
-              <a:t>$\alpha + \beta = \gamma$</a:t>
-            </a:r>
-            <a:r>
-              <a:rPr sz="1000">
-                <a:solidFill>
-                  <a:srgbClr val="E0E0E0"/>
-                </a:solidFill>
-                <a:latin typeface="Arial"/>
-              </a:rPr>
-              <a:t> directly in your text.</a:t>
+              <a:t> to make your content more engaging.</a:t>
             </a:r>
           </a:p>
         </p:txBody>
       </p:sp>
       <p:sp>
         <p:nvSpPr>
-          <p:cNvPr id="6" name="TextBox 5"/>
+          <p:cNvPr id="5" name="TextBox 4"/>
           <p:cNvSpPr txBox="1"/>
           <p:nvPr/>
         </p:nvSpPr>
         <p:spPr>
           <a:xfrm>
-            <a:off x="200025" y="1219200"/>
+            <a:off x="200025" y="1009649"/>
             <a:ext cx="8943975" cy="274320"/>
           </a:xfrm>
           <a:prstGeom prst="rect">
@@ -10310,7 +10796,17 @@
                 </a:solidFill>
                 <a:latin typeface="Arial"/>
               </a:rPr>
-              <a:t>The quadratic formula is </a:t>
+              <a:t>Visit our </a:t>
+            </a:r>
+            <a:r>
+              <a:rPr u="sng" sz="1000">
+                <a:solidFill>
+                  <a:srgbClr val="0066CC"/>
+                </a:solidFill>
+                <a:latin typeface="Arial"/>
+                <a:hlinkClick r:id="rId2"/>
+              </a:rPr>
+              <a:t>official website</a:t>
             </a:r>
             <a:r>
               <a:rPr sz="1000">
@@ -10319,358 +10815,7 @@
                 </a:solidFill>
                 <a:latin typeface="Arial"/>
               </a:rPr>
-              <a:t>$x = \frac{-b \pm \sqrt{b^2-4ac}}{2a}$</a:t>
-            </a:r>
-            <a:r>
-              <a:rPr sz="1000">
-                <a:solidFill>
-                  <a:srgbClr val="E0E0E0"/>
-                </a:solidFill>
-                <a:latin typeface="Arial"/>
-              </a:rPr>
-              <a:t>.</a:t>
-            </a:r>
-          </a:p>
-        </p:txBody>
-      </p:sp>
-      <p:sp>
-        <p:nvSpPr>
-          <p:cNvPr id="7" name="TextBox 6"/>
-          <p:cNvSpPr txBox="1"/>
-          <p:nvPr/>
-        </p:nvSpPr>
-        <p:spPr>
-          <a:xfrm>
-            <a:off x="200025" y="1352549"/>
-            <a:ext cx="8943975" cy="304800"/>
-          </a:xfrm>
-          <a:prstGeom prst="rect">
-            <a:avLst/>
-          </a:prstGeom>
-          <a:noFill/>
-        </p:spPr>
-        <p:txBody>
-          <a:bodyPr wrap="square" lIns="0" rIns="0" tIns="0" bIns="0">
-            <a:spAutoFit/>
-          </a:bodyPr>
-          <a:lstStyle/>
-          <a:p>
-            <a:pPr algn="l">
-              <a:lnSpc>
-                <a:spcPct val="100000"/>
-              </a:lnSpc>
-              <a:spcBef>
-                <a:spcPts val="0"/>
-              </a:spcBef>
-              <a:spcAft>
-                <a:spcPts val="0"/>
-              </a:spcAft>
-            </a:pPr>
-            <a:r>
-              <a:rPr sz="1300" b="1">
-                <a:solidFill>
-                  <a:srgbClr val="E0E0E0"/>
-                </a:solidFill>
-                <a:latin typeface="Arial"/>
-              </a:rPr>
-              <a:t>Block Math</a:t>
-            </a:r>
-          </a:p>
-        </p:txBody>
-      </p:sp>
-      <p:sp>
-        <p:nvSpPr>
-          <p:cNvPr id="8" name="TextBox 7"/>
-          <p:cNvSpPr txBox="1"/>
-          <p:nvPr/>
-        </p:nvSpPr>
-        <p:spPr>
-          <a:xfrm>
-            <a:off x="200025" y="1666874"/>
-            <a:ext cx="8943975" cy="274320"/>
-          </a:xfrm>
-          <a:prstGeom prst="rect">
-            <a:avLst/>
-          </a:prstGeom>
-          <a:noFill/>
-        </p:spPr>
-        <p:txBody>
-          <a:bodyPr wrap="square" lIns="0" rIns="0" tIns="0" bIns="0">
-            <a:spAutoFit/>
-          </a:bodyPr>
-          <a:lstStyle/>
-          <a:p>
-            <a:pPr algn="l">
-              <a:lnSpc>
-                <a:spcPct val="100000"/>
-              </a:lnSpc>
-              <a:spcBef>
-                <a:spcPts val="0"/>
-              </a:spcBef>
-              <a:spcAft>
-                <a:spcPts val="0"/>
-              </a:spcAft>
-            </a:pPr>
-            <a:r>
-              <a:rPr sz="1000">
-                <a:solidFill>
-                  <a:srgbClr val="E0E0E0"/>
-                </a:solidFill>
-                <a:latin typeface="Arial"/>
-              </a:rPr>
-              <a:t>For display math, use double dollar signs:</a:t>
-            </a:r>
-          </a:p>
-        </p:txBody>
-      </p:sp>
-      <p:pic>
-        <p:nvPicPr>
-          <p:cNvPr id="9" name="Picture 8" descr="98d66b88d1dd5d5aa7595eb2cd154e01.png"/>
-          <p:cNvPicPr>
-            <a:picLocks noChangeAspect="1"/>
-          </p:cNvPicPr>
-          <p:nvPr/>
-        </p:nvPicPr>
-        <p:blipFill>
-          <a:blip r:embed="rId2"/>
-          <a:stretch>
-            <a:fillRect/>
-          </a:stretch>
-        </p:blipFill>
-        <p:spPr>
-          <a:xfrm>
-            <a:off x="838200" y="1743075"/>
-            <a:ext cx="7467599" cy="466724"/>
-          </a:xfrm>
-          <a:prstGeom prst="rect">
-            <a:avLst/>
-          </a:prstGeom>
-        </p:spPr>
-      </p:pic>
-      <p:sp>
-        <p:nvSpPr>
-          <p:cNvPr id="10" name="TextBox 9"/>
-          <p:cNvSpPr txBox="1"/>
-          <p:nvPr/>
-        </p:nvSpPr>
-        <p:spPr>
-          <a:xfrm>
-            <a:off x="200025" y="2428875"/>
-            <a:ext cx="8943975" cy="274320"/>
-          </a:xfrm>
-          <a:prstGeom prst="rect">
-            <a:avLst/>
-          </a:prstGeom>
-          <a:noFill/>
-        </p:spPr>
-        <p:txBody>
-          <a:bodyPr wrap="square" lIns="0" rIns="0" tIns="0" bIns="0">
-            <a:spAutoFit/>
-          </a:bodyPr>
-          <a:lstStyle/>
-          <a:p>
-            <a:pPr algn="l">
-              <a:lnSpc>
-                <a:spcPct val="100000"/>
-              </a:lnSpc>
-              <a:spcBef>
-                <a:spcPts val="0"/>
-              </a:spcBef>
-              <a:spcAft>
-                <a:spcPts val="0"/>
-              </a:spcAft>
-            </a:pPr>
-            <a:r>
-              <a:rPr sz="1000">
-                <a:solidFill>
-                  <a:srgbClr val="E0E0E0"/>
-                </a:solidFill>
-                <a:latin typeface="Arial"/>
-              </a:rPr>
-              <a:t>Euler's famous identity:</a:t>
-            </a:r>
-          </a:p>
-        </p:txBody>
-      </p:sp>
-      <p:pic>
-        <p:nvPicPr>
-          <p:cNvPr id="11" name="Picture 10" descr="a9d2ba54b06d18626aa73df549f0a938.png"/>
-          <p:cNvPicPr>
-            <a:picLocks noChangeAspect="1"/>
-          </p:cNvPicPr>
-          <p:nvPr/>
-        </p:nvPicPr>
-        <p:blipFill>
-          <a:blip r:embed="rId3"/>
-          <a:stretch>
-            <a:fillRect/>
-          </a:stretch>
-        </p:blipFill>
-        <p:spPr>
-          <a:xfrm>
-            <a:off x="838200" y="2486025"/>
-            <a:ext cx="7467599" cy="228600"/>
-          </a:xfrm>
-          <a:prstGeom prst="rect">
-            <a:avLst/>
-          </a:prstGeom>
-        </p:spPr>
-      </p:pic>
-      <p:sp>
-        <p:nvSpPr>
-          <p:cNvPr id="12" name="TextBox 11"/>
-          <p:cNvSpPr txBox="1"/>
-          <p:nvPr/>
-        </p:nvSpPr>
-        <p:spPr>
-          <a:xfrm>
-            <a:off x="200025" y="2943225"/>
-            <a:ext cx="8943975" cy="304800"/>
-          </a:xfrm>
-          <a:prstGeom prst="rect">
-            <a:avLst/>
-          </a:prstGeom>
-          <a:noFill/>
-        </p:spPr>
-        <p:txBody>
-          <a:bodyPr wrap="square" lIns="0" rIns="0" tIns="0" bIns="0">
-            <a:spAutoFit/>
-          </a:bodyPr>
-          <a:lstStyle/>
-          <a:p>
-            <a:pPr algn="l">
-              <a:lnSpc>
-                <a:spcPct val="100000"/>
-              </a:lnSpc>
-              <a:spcBef>
-                <a:spcPts val="0"/>
-              </a:spcBef>
-              <a:spcAft>
-                <a:spcPts val="0"/>
-              </a:spcAft>
-            </a:pPr>
-            <a:r>
-              <a:rPr sz="1300" b="1">
-                <a:solidFill>
-                  <a:srgbClr val="E0E0E0"/>
-                </a:solidFill>
-                <a:latin typeface="Arial"/>
-              </a:rPr>
-              <a:t>Complex Equations</a:t>
-            </a:r>
-          </a:p>
-        </p:txBody>
-      </p:sp>
-      <p:sp>
-        <p:nvSpPr>
-          <p:cNvPr id="13" name="TextBox 12"/>
-          <p:cNvSpPr txBox="1"/>
-          <p:nvPr/>
-        </p:nvSpPr>
-        <p:spPr>
-          <a:xfrm>
-            <a:off x="200025" y="3248024"/>
-            <a:ext cx="8943975" cy="274320"/>
-          </a:xfrm>
-          <a:prstGeom prst="rect">
-            <a:avLst/>
-          </a:prstGeom>
-          <a:noFill/>
-        </p:spPr>
-        <p:txBody>
-          <a:bodyPr wrap="square" lIns="0" rIns="0" tIns="0" bIns="0">
-            <a:spAutoFit/>
-          </a:bodyPr>
-          <a:lstStyle/>
-          <a:p>
-            <a:pPr algn="l">
-              <a:lnSpc>
-                <a:spcPct val="100000"/>
-              </a:lnSpc>
-              <a:spcBef>
-                <a:spcPts val="0"/>
-              </a:spcBef>
-              <a:spcAft>
-                <a:spcPts val="0"/>
-              </a:spcAft>
-            </a:pPr>
-            <a:r>
-              <a:rPr sz="1000">
-                <a:solidFill>
-                  <a:srgbClr val="E0E0E0"/>
-                </a:solidFill>
-                <a:latin typeface="Arial"/>
-              </a:rPr>
-              <a:t>More complex equations like matrices are also supported:</a:t>
-            </a:r>
-          </a:p>
-        </p:txBody>
-      </p:sp>
-      <p:pic>
-        <p:nvPicPr>
-          <p:cNvPr id="14" name="Picture 13" descr="c517a3c10966ea397e30bfc9599eec7e.png"/>
-          <p:cNvPicPr>
-            <a:picLocks noChangeAspect="1"/>
-          </p:cNvPicPr>
-          <p:nvPr/>
-        </p:nvPicPr>
-        <p:blipFill>
-          <a:blip r:embed="rId4"/>
-          <a:stretch>
-            <a:fillRect/>
-          </a:stretch>
-        </p:blipFill>
-        <p:spPr>
-          <a:xfrm>
-            <a:off x="838200" y="3267075"/>
-            <a:ext cx="7467599" cy="447675"/>
-          </a:xfrm>
-          <a:prstGeom prst="rect">
-            <a:avLst/>
-          </a:prstGeom>
-        </p:spPr>
-      </p:pic>
-      <p:sp>
-        <p:nvSpPr>
-          <p:cNvPr id="15" name="TextBox 14"/>
-          <p:cNvSpPr txBox="1"/>
-          <p:nvPr/>
-        </p:nvSpPr>
-        <p:spPr>
-          <a:xfrm>
-            <a:off x="200025" y="3990974"/>
-            <a:ext cx="8943975" cy="274320"/>
-          </a:xfrm>
-          <a:prstGeom prst="rect">
-            <a:avLst/>
-          </a:prstGeom>
-          <a:noFill/>
-        </p:spPr>
-        <p:txBody>
-          <a:bodyPr wrap="square" lIns="0" rIns="0" tIns="0" bIns="0">
-            <a:spAutoFit/>
-          </a:bodyPr>
-          <a:lstStyle/>
-          <a:p>
-            <a:pPr algn="l">
-              <a:lnSpc>
-                <a:spcPct val="100000"/>
-              </a:lnSpc>
-              <a:spcBef>
-                <a:spcPts val="0"/>
-              </a:spcBef>
-              <a:spcAft>
-                <a:spcPts val="0"/>
-              </a:spcAft>
-            </a:pPr>
-            <a:r>
-              <a:rPr sz="1000">
-                <a:solidFill>
-                  <a:srgbClr val="E0E0E0"/>
-                </a:solidFill>
-                <a:latin typeface="Arial"/>
-              </a:rPr>
-              <a:t>Math equations are automatically cached for performance and work in both themes!</a:t>
+              <a:t> for more information.</a:t>
             </a:r>
           </a:p>
         </p:txBody>
@@ -10741,7 +10886,7 @@
                 </a:solidFill>
                 <a:latin typeface="Arial"/>
               </a:rPr>
-              <a:t>📈 Figures Demo</a:t>
+              <a:t>🎤 Advanced Speaker Notes</a:t>
             </a:r>
           </a:p>
         </p:txBody>
@@ -10786,89 +10931,56 @@
                 </a:solidFill>
                 <a:latin typeface="Arial"/>
               </a:rPr>
-              <a:t>Bar chart (80% width):</a:t>
+              <a:t>This is the </a:t>
+            </a:r>
+            <a:r>
+              <a:rPr b="1" sz="1000">
+                <a:solidFill>
+                  <a:srgbClr val="E0E0E0"/>
+                </a:solidFill>
+                <a:latin typeface="Arial"/>
+              </a:rPr>
+              <a:t>second example</a:t>
+            </a:r>
+            <a:r>
+              <a:rPr sz="1000">
+                <a:solidFill>
+                  <a:srgbClr val="E0E0E0"/>
+                </a:solidFill>
+                <a:latin typeface="Arial"/>
+              </a:rPr>
+              <a:t> slide showing more </a:t>
+            </a:r>
+            <a:r>
+              <a:rPr i="1" sz="1000">
+                <a:solidFill>
+                  <a:srgbClr val="E0E0E0"/>
+                </a:solidFill>
+                <a:latin typeface="Arial"/>
+              </a:rPr>
+              <a:t>complex formatting</a:t>
+            </a:r>
+            <a:r>
+              <a:rPr sz="1000">
+                <a:solidFill>
+                  <a:srgbClr val="E0E0E0"/>
+                </a:solidFill>
+                <a:latin typeface="Arial"/>
+              </a:rPr>
+              <a:t> with speaker notes.</a:t>
             </a:r>
           </a:p>
         </p:txBody>
       </p:sp>
-      <p:pic>
-        <p:nvPicPr>
-          <p:cNvPr id="4" name="Picture 3" descr="chart_bar.png"/>
-          <p:cNvPicPr>
-            <a:picLocks noChangeAspect="1"/>
-          </p:cNvPicPr>
-          <p:nvPr/>
-        </p:nvPicPr>
-        <p:blipFill>
-          <a:blip r:embed="rId2"/>
-          <a:stretch>
-            <a:fillRect/>
-          </a:stretch>
-        </p:blipFill>
-        <p:spPr>
-          <a:xfrm>
-            <a:off x="200025" y="676274"/>
-            <a:ext cx="4457700" cy="3343275"/>
-          </a:xfrm>
-          <a:prstGeom prst="rect">
-            <a:avLst/>
-          </a:prstGeom>
-        </p:spPr>
-      </p:pic>
       <p:sp>
         <p:nvSpPr>
-          <p:cNvPr id="5" name="TextBox 4"/>
+          <p:cNvPr id="4" name="TextBox 3"/>
           <p:cNvSpPr txBox="1"/>
           <p:nvPr/>
         </p:nvSpPr>
         <p:spPr>
           <a:xfrm>
-            <a:off x="200025" y="3619499"/>
-            <a:ext cx="4457700" cy="274320"/>
-          </a:xfrm>
-          <a:prstGeom prst="rect">
-            <a:avLst/>
-          </a:prstGeom>
-          <a:noFill/>
-        </p:spPr>
-        <p:txBody>
-          <a:bodyPr wrap="square" lIns="0" rIns="0" tIns="0" bIns="0">
-            <a:spAutoFit/>
-          </a:bodyPr>
-          <a:lstStyle/>
-          <a:p>
-            <a:pPr algn="ctr">
-              <a:lnSpc>
-                <a:spcPct val="100000"/>
-              </a:lnSpc>
-              <a:spcBef>
-                <a:spcPts val="0"/>
-              </a:spcBef>
-              <a:spcAft>
-                <a:spcPts val="0"/>
-              </a:spcAft>
-            </a:pPr>
-            <a:r>
-              <a:rPr sz="1000" i="1">
-                <a:solidFill>
-                  <a:srgbClr val="CCCCCC"/>
-                </a:solidFill>
-                <a:latin typeface="Arial"/>
-              </a:rPr>
-              <a:t>Sample bar chart demonstrating data visualization with proper scaling</a:t>
-            </a:r>
-          </a:p>
-        </p:txBody>
-      </p:sp>
-      <p:sp>
-        <p:nvSpPr>
-          <p:cNvPr id="6" name="TextBox 5"/>
-          <p:cNvSpPr txBox="1"/>
-          <p:nvPr/>
-        </p:nvSpPr>
-        <p:spPr>
-          <a:xfrm>
-            <a:off x="200025" y="3848099"/>
+            <a:off x="200025" y="771525"/>
             <a:ext cx="8943975" cy="274320"/>
           </a:xfrm>
           <a:prstGeom prst="rect">
@@ -10900,7 +11012,172 @@
                 </a:solidFill>
                 <a:latin typeface="Arial"/>
               </a:rPr>
-              <a:t>Pie chart (60% height):</a:t>
+              <a:t>Key points to remember:</a:t>
+            </a:r>
+          </a:p>
+        </p:txBody>
+      </p:sp>
+      <p:sp>
+        <p:nvSpPr>
+          <p:cNvPr id="5" name="TextBox 4"/>
+          <p:cNvSpPr txBox="1"/>
+          <p:nvPr/>
+        </p:nvSpPr>
+        <p:spPr>
+          <a:xfrm>
+            <a:off x="200025" y="1000125"/>
+            <a:ext cx="8943975" cy="551497"/>
+          </a:xfrm>
+          <a:prstGeom prst="rect">
+            <a:avLst/>
+          </a:prstGeom>
+          <a:noFill/>
+        </p:spPr>
+        <p:txBody>
+          <a:bodyPr wrap="square" lIns="0" rIns="0" tIns="0" bIns="0">
+            <a:spAutoFit/>
+          </a:bodyPr>
+          <a:lstStyle/>
+          <a:p>
+            <a:pPr algn="l">
+              <a:spcBef>
+                <a:spcPts val="0"/>
+              </a:spcBef>
+              <a:spcAft>
+                <a:spcPts val="0"/>
+              </a:spcAft>
+            </a:pPr>
+            <a:r>
+              <a:rPr sz="1000">
+                <a:solidFill>
+                  <a:srgbClr val="E0E0E0"/>
+                </a:solidFill>
+                <a:latin typeface="Arial"/>
+              </a:rPr>
+              <a:t>• </a:t>
+            </a:r>
+            <a:r>
+              <a:rPr b="1" sz="1000">
+                <a:solidFill>
+                  <a:srgbClr val="FFCC00"/>
+                </a:solidFill>
+                <a:latin typeface="Arial"/>
+              </a:rPr>
+              <a:t>Important information</a:t>
+            </a:r>
+            <a:r>
+              <a:rPr sz="1000">
+                <a:solidFill>
+                  <a:srgbClr val="E0E0E0"/>
+                </a:solidFill>
+                <a:latin typeface="Arial"/>
+              </a:rPr>
+              <a:t> should be highlighted</a:t>
+            </a:r>
+          </a:p>
+          <a:p>
+            <a:pPr algn="l"/>
+            <a:r>
+              <a:rPr sz="1000">
+                <a:solidFill>
+                  <a:srgbClr val="E0E0E0"/>
+                </a:solidFill>
+                <a:latin typeface="Arial"/>
+              </a:rPr>
+              <a:t>• </a:t>
+            </a:r>
+            <a:r>
+              <a:rPr sz="1000">
+                <a:solidFill>
+                  <a:srgbClr val="E0E0E0"/>
+                </a:solidFill>
+                <a:latin typeface="Arial"/>
+              </a:rPr>
+              <a:t>Use </a:t>
+            </a:r>
+            <a:r>
+              <a:rPr sz="800">
+                <a:solidFill>
+                  <a:srgbClr val="FFFFFF"/>
+                </a:solidFill>
+                <a:latin typeface="Courier New"/>
+              </a:rPr>
+              <a:t>code blocks</a:t>
+            </a:r>
+            <a:r>
+              <a:rPr sz="1000">
+                <a:solidFill>
+                  <a:srgbClr val="E0E0E0"/>
+                </a:solidFill>
+                <a:latin typeface="Arial"/>
+              </a:rPr>
+              <a:t> for technical terms</a:t>
+            </a:r>
+          </a:p>
+          <a:p>
+            <a:pPr algn="l"/>
+            <a:r>
+              <a:rPr sz="1000">
+                <a:solidFill>
+                  <a:srgbClr val="E0E0E0"/>
+                </a:solidFill>
+                <a:latin typeface="Arial"/>
+              </a:rPr>
+              <a:t>• </a:t>
+            </a:r>
+            <a:r>
+              <a:rPr sz="1000">
+                <a:solidFill>
+                  <a:srgbClr val="E0E0E0"/>
+                </a:solidFill>
+                <a:latin typeface="Arial"/>
+              </a:rPr>
+              <a:t>Link to external resources when needed</a:t>
+            </a:r>
+          </a:p>
+        </p:txBody>
+      </p:sp>
+      <p:sp>
+        <p:nvSpPr>
+          <p:cNvPr id="6" name="TextBox 5"/>
+          <p:cNvSpPr txBox="1"/>
+          <p:nvPr/>
+        </p:nvSpPr>
+        <p:spPr>
+          <a:xfrm>
+            <a:off x="200025" y="1551622"/>
+            <a:ext cx="8943975" cy="274320"/>
+          </a:xfrm>
+          <a:prstGeom prst="rect">
+            <a:avLst/>
+          </a:prstGeom>
+          <a:noFill/>
+        </p:spPr>
+        <p:txBody>
+          <a:bodyPr wrap="square" lIns="0" rIns="0" tIns="0" bIns="0">
+            <a:spAutoFit/>
+          </a:bodyPr>
+          <a:lstStyle/>
+          <a:p>
+            <a:pPr algn="l">
+              <a:lnSpc>
+                <a:spcPct val="100000"/>
+              </a:lnSpc>
+              <a:spcBef>
+                <a:spcPts val="0"/>
+              </a:spcBef>
+              <a:spcAft>
+                <a:spcPts val="0"/>
+              </a:spcAft>
+            </a:pPr>
+            <a:r>
+              <a:rPr sz="1000">
+                <a:solidFill>
+                  <a:srgbClr val="E0E0E0"/>
+                </a:solidFill>
+                <a:latin typeface="Arial"/>
+              </a:rPr>
+              <a:t>The speaker notes below contain additional context and talking points.</a:t>
             </a:r>
           </a:p>
         </p:txBody>
@@ -12192,6 +12469,883 @@
 </file>
 
 <file path=ppt/slides/slide20.xml><?xml version="1.0" encoding="utf-8"?>
+<p:sld xmlns:a="http://schemas.openxmlformats.org/drawingml/2006/main" xmlns:p="http://schemas.openxmlformats.org/presentationml/2006/main" xmlns:r="http://schemas.openxmlformats.org/officeDocument/2006/relationships">
+  <p:cSld>
+    <p:bg>
+      <p:bgPr>
+        <a:solidFill>
+          <a:srgbClr val="1A1A1A"/>
+        </a:solidFill>
+        <a:effectLst/>
+      </p:bgPr>
+    </p:bg>
+    <p:spTree>
+      <p:nvGrpSpPr>
+        <p:cNvPr id="1" name=""/>
+        <p:cNvGrpSpPr/>
+        <p:nvPr/>
+      </p:nvGrpSpPr>
+      <p:grpSpPr/>
+      <p:sp>
+        <p:nvSpPr>
+          <p:cNvPr id="2" name="TextBox 1"/>
+          <p:cNvSpPr txBox="1"/>
+          <p:nvPr/>
+        </p:nvSpPr>
+        <p:spPr>
+          <a:xfrm>
+            <a:off x="200025" y="180975"/>
+            <a:ext cx="8943975" cy="361950"/>
+          </a:xfrm>
+          <a:prstGeom prst="rect">
+            <a:avLst/>
+          </a:prstGeom>
+          <a:noFill/>
+        </p:spPr>
+        <p:txBody>
+          <a:bodyPr wrap="square" lIns="0" rIns="0" tIns="0" bIns="0">
+            <a:spAutoFit/>
+          </a:bodyPr>
+          <a:lstStyle/>
+          <a:p>
+            <a:pPr algn="l">
+              <a:lnSpc>
+                <a:spcPct val="100000"/>
+              </a:lnSpc>
+              <a:spcBef>
+                <a:spcPts val="0"/>
+              </a:spcBef>
+              <a:spcAft>
+                <a:spcPts val="0"/>
+              </a:spcAft>
+            </a:pPr>
+            <a:r>
+              <a:rPr sz="1600" b="1">
+                <a:solidFill>
+                  <a:srgbClr val="E0E0E0"/>
+                </a:solidFill>
+                <a:latin typeface="Arial"/>
+              </a:rPr>
+              <a:t>🧮 Math Equations Support</a:t>
+            </a:r>
+          </a:p>
+        </p:txBody>
+      </p:sp>
+      <p:sp>
+        <p:nvSpPr>
+          <p:cNvPr id="3" name="TextBox 2"/>
+          <p:cNvSpPr txBox="1"/>
+          <p:nvPr/>
+        </p:nvSpPr>
+        <p:spPr>
+          <a:xfrm>
+            <a:off x="200025" y="542925"/>
+            <a:ext cx="8943975" cy="274320"/>
+          </a:xfrm>
+          <a:prstGeom prst="rect">
+            <a:avLst/>
+          </a:prstGeom>
+          <a:noFill/>
+        </p:spPr>
+        <p:txBody>
+          <a:bodyPr wrap="square" lIns="0" rIns="0" tIns="0" bIns="0">
+            <a:spAutoFit/>
+          </a:bodyPr>
+          <a:lstStyle/>
+          <a:p>
+            <a:pPr algn="l">
+              <a:lnSpc>
+                <a:spcPct val="100000"/>
+              </a:lnSpc>
+              <a:spcBef>
+                <a:spcPts val="0"/>
+              </a:spcBef>
+              <a:spcAft>
+                <a:spcPts val="0"/>
+              </a:spcAft>
+            </a:pPr>
+            <a:r>
+              <a:rPr sz="1000">
+                <a:solidFill>
+                  <a:srgbClr val="E0E0E0"/>
+                </a:solidFill>
+                <a:latin typeface="Arial"/>
+              </a:rPr>
+              <a:t>The slide generator now supports LaTeX math equations using KaTeX rendering.</a:t>
+            </a:r>
+          </a:p>
+        </p:txBody>
+      </p:sp>
+      <p:sp>
+        <p:nvSpPr>
+          <p:cNvPr id="4" name="TextBox 3"/>
+          <p:cNvSpPr txBox="1"/>
+          <p:nvPr/>
+        </p:nvSpPr>
+        <p:spPr>
+          <a:xfrm>
+            <a:off x="200025" y="676274"/>
+            <a:ext cx="8943975" cy="304800"/>
+          </a:xfrm>
+          <a:prstGeom prst="rect">
+            <a:avLst/>
+          </a:prstGeom>
+          <a:noFill/>
+        </p:spPr>
+        <p:txBody>
+          <a:bodyPr wrap="square" lIns="0" rIns="0" tIns="0" bIns="0">
+            <a:spAutoFit/>
+          </a:bodyPr>
+          <a:lstStyle/>
+          <a:p>
+            <a:pPr algn="l">
+              <a:lnSpc>
+                <a:spcPct val="100000"/>
+              </a:lnSpc>
+              <a:spcBef>
+                <a:spcPts val="0"/>
+              </a:spcBef>
+              <a:spcAft>
+                <a:spcPts val="0"/>
+              </a:spcAft>
+            </a:pPr>
+            <a:r>
+              <a:rPr sz="1300" b="1">
+                <a:solidFill>
+                  <a:srgbClr val="E0E0E0"/>
+                </a:solidFill>
+                <a:latin typeface="Arial"/>
+              </a:rPr>
+              <a:t>Inline Math</a:t>
+            </a:r>
+          </a:p>
+        </p:txBody>
+      </p:sp>
+      <p:sp>
+        <p:nvSpPr>
+          <p:cNvPr id="5" name="TextBox 4"/>
+          <p:cNvSpPr txBox="1"/>
+          <p:nvPr/>
+        </p:nvSpPr>
+        <p:spPr>
+          <a:xfrm>
+            <a:off x="200025" y="990599"/>
+            <a:ext cx="8943975" cy="274320"/>
+          </a:xfrm>
+          <a:prstGeom prst="rect">
+            <a:avLst/>
+          </a:prstGeom>
+          <a:noFill/>
+        </p:spPr>
+        <p:txBody>
+          <a:bodyPr wrap="square" lIns="0" rIns="0" tIns="0" bIns="0">
+            <a:spAutoFit/>
+          </a:bodyPr>
+          <a:lstStyle/>
+          <a:p>
+            <a:pPr algn="l">
+              <a:lnSpc>
+                <a:spcPct val="100000"/>
+              </a:lnSpc>
+              <a:spcBef>
+                <a:spcPts val="0"/>
+              </a:spcBef>
+              <a:spcAft>
+                <a:spcPts val="0"/>
+              </a:spcAft>
+            </a:pPr>
+            <a:r>
+              <a:rPr sz="1000">
+                <a:solidFill>
+                  <a:srgbClr val="E0E0E0"/>
+                </a:solidFill>
+                <a:latin typeface="Arial"/>
+              </a:rPr>
+              <a:t>You can include inline math like </a:t>
+            </a:r>
+            <a:r>
+              <a:rPr sz="1000">
+                <a:solidFill>
+                  <a:srgbClr val="E0E0E0"/>
+                </a:solidFill>
+                <a:latin typeface="Arial"/>
+              </a:rPr>
+              <a:t>$E=mc^2$</a:t>
+            </a:r>
+            <a:r>
+              <a:rPr sz="1000">
+                <a:solidFill>
+                  <a:srgbClr val="E0E0E0"/>
+                </a:solidFill>
+                <a:latin typeface="Arial"/>
+              </a:rPr>
+              <a:t> or </a:t>
+            </a:r>
+            <a:r>
+              <a:rPr sz="1000">
+                <a:solidFill>
+                  <a:srgbClr val="E0E0E0"/>
+                </a:solidFill>
+                <a:latin typeface="Arial"/>
+              </a:rPr>
+              <a:t>$\alpha + \beta = \gamma$</a:t>
+            </a:r>
+            <a:r>
+              <a:rPr sz="1000">
+                <a:solidFill>
+                  <a:srgbClr val="E0E0E0"/>
+                </a:solidFill>
+                <a:latin typeface="Arial"/>
+              </a:rPr>
+              <a:t> directly in your text.</a:t>
+            </a:r>
+          </a:p>
+        </p:txBody>
+      </p:sp>
+      <p:sp>
+        <p:nvSpPr>
+          <p:cNvPr id="6" name="TextBox 5"/>
+          <p:cNvSpPr txBox="1"/>
+          <p:nvPr/>
+        </p:nvSpPr>
+        <p:spPr>
+          <a:xfrm>
+            <a:off x="200025" y="1219200"/>
+            <a:ext cx="8943975" cy="274320"/>
+          </a:xfrm>
+          <a:prstGeom prst="rect">
+            <a:avLst/>
+          </a:prstGeom>
+          <a:noFill/>
+        </p:spPr>
+        <p:txBody>
+          <a:bodyPr wrap="square" lIns="0" rIns="0" tIns="0" bIns="0">
+            <a:spAutoFit/>
+          </a:bodyPr>
+          <a:lstStyle/>
+          <a:p>
+            <a:pPr algn="l">
+              <a:lnSpc>
+                <a:spcPct val="100000"/>
+              </a:lnSpc>
+              <a:spcBef>
+                <a:spcPts val="0"/>
+              </a:spcBef>
+              <a:spcAft>
+                <a:spcPts val="0"/>
+              </a:spcAft>
+            </a:pPr>
+            <a:r>
+              <a:rPr sz="1000">
+                <a:solidFill>
+                  <a:srgbClr val="E0E0E0"/>
+                </a:solidFill>
+                <a:latin typeface="Arial"/>
+              </a:rPr>
+              <a:t>The quadratic formula is </a:t>
+            </a:r>
+            <a:r>
+              <a:rPr sz="1000">
+                <a:solidFill>
+                  <a:srgbClr val="E0E0E0"/>
+                </a:solidFill>
+                <a:latin typeface="Arial"/>
+              </a:rPr>
+              <a:t>$x = \frac{-b \pm \sqrt{b^2-4ac}}{2a}$</a:t>
+            </a:r>
+            <a:r>
+              <a:rPr sz="1000">
+                <a:solidFill>
+                  <a:srgbClr val="E0E0E0"/>
+                </a:solidFill>
+                <a:latin typeface="Arial"/>
+              </a:rPr>
+              <a:t>.</a:t>
+            </a:r>
+          </a:p>
+        </p:txBody>
+      </p:sp>
+      <p:sp>
+        <p:nvSpPr>
+          <p:cNvPr id="7" name="TextBox 6"/>
+          <p:cNvSpPr txBox="1"/>
+          <p:nvPr/>
+        </p:nvSpPr>
+        <p:spPr>
+          <a:xfrm>
+            <a:off x="200025" y="1352549"/>
+            <a:ext cx="8943975" cy="304800"/>
+          </a:xfrm>
+          <a:prstGeom prst="rect">
+            <a:avLst/>
+          </a:prstGeom>
+          <a:noFill/>
+        </p:spPr>
+        <p:txBody>
+          <a:bodyPr wrap="square" lIns="0" rIns="0" tIns="0" bIns="0">
+            <a:spAutoFit/>
+          </a:bodyPr>
+          <a:lstStyle/>
+          <a:p>
+            <a:pPr algn="l">
+              <a:lnSpc>
+                <a:spcPct val="100000"/>
+              </a:lnSpc>
+              <a:spcBef>
+                <a:spcPts val="0"/>
+              </a:spcBef>
+              <a:spcAft>
+                <a:spcPts val="0"/>
+              </a:spcAft>
+            </a:pPr>
+            <a:r>
+              <a:rPr sz="1300" b="1">
+                <a:solidFill>
+                  <a:srgbClr val="E0E0E0"/>
+                </a:solidFill>
+                <a:latin typeface="Arial"/>
+              </a:rPr>
+              <a:t>Block Math</a:t>
+            </a:r>
+          </a:p>
+        </p:txBody>
+      </p:sp>
+      <p:sp>
+        <p:nvSpPr>
+          <p:cNvPr id="8" name="TextBox 7"/>
+          <p:cNvSpPr txBox="1"/>
+          <p:nvPr/>
+        </p:nvSpPr>
+        <p:spPr>
+          <a:xfrm>
+            <a:off x="200025" y="1666874"/>
+            <a:ext cx="8943975" cy="274320"/>
+          </a:xfrm>
+          <a:prstGeom prst="rect">
+            <a:avLst/>
+          </a:prstGeom>
+          <a:noFill/>
+        </p:spPr>
+        <p:txBody>
+          <a:bodyPr wrap="square" lIns="0" rIns="0" tIns="0" bIns="0">
+            <a:spAutoFit/>
+          </a:bodyPr>
+          <a:lstStyle/>
+          <a:p>
+            <a:pPr algn="l">
+              <a:lnSpc>
+                <a:spcPct val="100000"/>
+              </a:lnSpc>
+              <a:spcBef>
+                <a:spcPts val="0"/>
+              </a:spcBef>
+              <a:spcAft>
+                <a:spcPts val="0"/>
+              </a:spcAft>
+            </a:pPr>
+            <a:r>
+              <a:rPr sz="1000">
+                <a:solidFill>
+                  <a:srgbClr val="E0E0E0"/>
+                </a:solidFill>
+                <a:latin typeface="Arial"/>
+              </a:rPr>
+              <a:t>For display math, use double dollar signs:</a:t>
+            </a:r>
+          </a:p>
+        </p:txBody>
+      </p:sp>
+      <p:pic>
+        <p:nvPicPr>
+          <p:cNvPr id="9" name="Picture 8" descr="98d66b88d1dd5d5aa7595eb2cd154e01.png"/>
+          <p:cNvPicPr>
+            <a:picLocks noChangeAspect="1"/>
+          </p:cNvPicPr>
+          <p:nvPr/>
+        </p:nvPicPr>
+        <p:blipFill>
+          <a:blip r:embed="rId2"/>
+          <a:stretch>
+            <a:fillRect/>
+          </a:stretch>
+        </p:blipFill>
+        <p:spPr>
+          <a:xfrm>
+            <a:off x="838200" y="1743075"/>
+            <a:ext cx="7467599" cy="466724"/>
+          </a:xfrm>
+          <a:prstGeom prst="rect">
+            <a:avLst/>
+          </a:prstGeom>
+        </p:spPr>
+      </p:pic>
+      <p:sp>
+        <p:nvSpPr>
+          <p:cNvPr id="10" name="TextBox 9"/>
+          <p:cNvSpPr txBox="1"/>
+          <p:nvPr/>
+        </p:nvSpPr>
+        <p:spPr>
+          <a:xfrm>
+            <a:off x="200025" y="2428875"/>
+            <a:ext cx="8943975" cy="274320"/>
+          </a:xfrm>
+          <a:prstGeom prst="rect">
+            <a:avLst/>
+          </a:prstGeom>
+          <a:noFill/>
+        </p:spPr>
+        <p:txBody>
+          <a:bodyPr wrap="square" lIns="0" rIns="0" tIns="0" bIns="0">
+            <a:spAutoFit/>
+          </a:bodyPr>
+          <a:lstStyle/>
+          <a:p>
+            <a:pPr algn="l">
+              <a:lnSpc>
+                <a:spcPct val="100000"/>
+              </a:lnSpc>
+              <a:spcBef>
+                <a:spcPts val="0"/>
+              </a:spcBef>
+              <a:spcAft>
+                <a:spcPts val="0"/>
+              </a:spcAft>
+            </a:pPr>
+            <a:r>
+              <a:rPr sz="1000">
+                <a:solidFill>
+                  <a:srgbClr val="E0E0E0"/>
+                </a:solidFill>
+                <a:latin typeface="Arial"/>
+              </a:rPr>
+              <a:t>Euler's famous identity:</a:t>
+            </a:r>
+          </a:p>
+        </p:txBody>
+      </p:sp>
+      <p:pic>
+        <p:nvPicPr>
+          <p:cNvPr id="11" name="Picture 10" descr="a9d2ba54b06d18626aa73df549f0a938.png"/>
+          <p:cNvPicPr>
+            <a:picLocks noChangeAspect="1"/>
+          </p:cNvPicPr>
+          <p:nvPr/>
+        </p:nvPicPr>
+        <p:blipFill>
+          <a:blip r:embed="rId3"/>
+          <a:stretch>
+            <a:fillRect/>
+          </a:stretch>
+        </p:blipFill>
+        <p:spPr>
+          <a:xfrm>
+            <a:off x="838200" y="2486025"/>
+            <a:ext cx="7467599" cy="228600"/>
+          </a:xfrm>
+          <a:prstGeom prst="rect">
+            <a:avLst/>
+          </a:prstGeom>
+        </p:spPr>
+      </p:pic>
+      <p:sp>
+        <p:nvSpPr>
+          <p:cNvPr id="12" name="TextBox 11"/>
+          <p:cNvSpPr txBox="1"/>
+          <p:nvPr/>
+        </p:nvSpPr>
+        <p:spPr>
+          <a:xfrm>
+            <a:off x="200025" y="2933699"/>
+            <a:ext cx="8943975" cy="304800"/>
+          </a:xfrm>
+          <a:prstGeom prst="rect">
+            <a:avLst/>
+          </a:prstGeom>
+          <a:noFill/>
+        </p:spPr>
+        <p:txBody>
+          <a:bodyPr wrap="square" lIns="0" rIns="0" tIns="0" bIns="0">
+            <a:spAutoFit/>
+          </a:bodyPr>
+          <a:lstStyle/>
+          <a:p>
+            <a:pPr algn="l">
+              <a:lnSpc>
+                <a:spcPct val="100000"/>
+              </a:lnSpc>
+              <a:spcBef>
+                <a:spcPts val="0"/>
+              </a:spcBef>
+              <a:spcAft>
+                <a:spcPts val="0"/>
+              </a:spcAft>
+            </a:pPr>
+            <a:r>
+              <a:rPr sz="1300" b="1">
+                <a:solidFill>
+                  <a:srgbClr val="E0E0E0"/>
+                </a:solidFill>
+                <a:latin typeface="Arial"/>
+              </a:rPr>
+              <a:t>Complex Equations</a:t>
+            </a:r>
+          </a:p>
+        </p:txBody>
+      </p:sp>
+      <p:sp>
+        <p:nvSpPr>
+          <p:cNvPr id="13" name="TextBox 12"/>
+          <p:cNvSpPr txBox="1"/>
+          <p:nvPr/>
+        </p:nvSpPr>
+        <p:spPr>
+          <a:xfrm>
+            <a:off x="200025" y="3238500"/>
+            <a:ext cx="8943975" cy="274320"/>
+          </a:xfrm>
+          <a:prstGeom prst="rect">
+            <a:avLst/>
+          </a:prstGeom>
+          <a:noFill/>
+        </p:spPr>
+        <p:txBody>
+          <a:bodyPr wrap="square" lIns="0" rIns="0" tIns="0" bIns="0">
+            <a:spAutoFit/>
+          </a:bodyPr>
+          <a:lstStyle/>
+          <a:p>
+            <a:pPr algn="l">
+              <a:lnSpc>
+                <a:spcPct val="100000"/>
+              </a:lnSpc>
+              <a:spcBef>
+                <a:spcPts val="0"/>
+              </a:spcBef>
+              <a:spcAft>
+                <a:spcPts val="0"/>
+              </a:spcAft>
+            </a:pPr>
+            <a:r>
+              <a:rPr sz="1000">
+                <a:solidFill>
+                  <a:srgbClr val="E0E0E0"/>
+                </a:solidFill>
+                <a:latin typeface="Arial"/>
+              </a:rPr>
+              <a:t>More complex equations like matrices are also supported:</a:t>
+            </a:r>
+          </a:p>
+        </p:txBody>
+      </p:sp>
+      <p:pic>
+        <p:nvPicPr>
+          <p:cNvPr id="14" name="Picture 13" descr="c517a3c10966ea397e30bfc9599eec7e.png"/>
+          <p:cNvPicPr>
+            <a:picLocks noChangeAspect="1"/>
+          </p:cNvPicPr>
+          <p:nvPr/>
+        </p:nvPicPr>
+        <p:blipFill>
+          <a:blip r:embed="rId4"/>
+          <a:stretch>
+            <a:fillRect/>
+          </a:stretch>
+        </p:blipFill>
+        <p:spPr>
+          <a:xfrm>
+            <a:off x="838200" y="3257550"/>
+            <a:ext cx="7467599" cy="447675"/>
+          </a:xfrm>
+          <a:prstGeom prst="rect">
+            <a:avLst/>
+          </a:prstGeom>
+        </p:spPr>
+      </p:pic>
+      <p:sp>
+        <p:nvSpPr>
+          <p:cNvPr id="15" name="TextBox 14"/>
+          <p:cNvSpPr txBox="1"/>
+          <p:nvPr/>
+        </p:nvSpPr>
+        <p:spPr>
+          <a:xfrm>
+            <a:off x="200025" y="3981449"/>
+            <a:ext cx="8943975" cy="274320"/>
+          </a:xfrm>
+          <a:prstGeom prst="rect">
+            <a:avLst/>
+          </a:prstGeom>
+          <a:noFill/>
+        </p:spPr>
+        <p:txBody>
+          <a:bodyPr wrap="square" lIns="0" rIns="0" tIns="0" bIns="0">
+            <a:spAutoFit/>
+          </a:bodyPr>
+          <a:lstStyle/>
+          <a:p>
+            <a:pPr algn="l">
+              <a:lnSpc>
+                <a:spcPct val="100000"/>
+              </a:lnSpc>
+              <a:spcBef>
+                <a:spcPts val="0"/>
+              </a:spcBef>
+              <a:spcAft>
+                <a:spcPts val="0"/>
+              </a:spcAft>
+            </a:pPr>
+            <a:r>
+              <a:rPr sz="1000">
+                <a:solidFill>
+                  <a:srgbClr val="E0E0E0"/>
+                </a:solidFill>
+                <a:latin typeface="Arial"/>
+              </a:rPr>
+              <a:t>Math equations are automatically cached for performance and work in both themes!</a:t>
+            </a:r>
+          </a:p>
+        </p:txBody>
+      </p:sp>
+    </p:spTree>
+  </p:cSld>
+  <p:clrMapOvr>
+    <a:masterClrMapping/>
+  </p:clrMapOvr>
+</p:sld>
+</file>
+
+<file path=ppt/slides/slide21.xml><?xml version="1.0" encoding="utf-8"?>
+<p:sld xmlns:a="http://schemas.openxmlformats.org/drawingml/2006/main" xmlns:p="http://schemas.openxmlformats.org/presentationml/2006/main" xmlns:r="http://schemas.openxmlformats.org/officeDocument/2006/relationships">
+  <p:cSld>
+    <p:bg>
+      <p:bgPr>
+        <a:solidFill>
+          <a:srgbClr val="1A1A1A"/>
+        </a:solidFill>
+        <a:effectLst/>
+      </p:bgPr>
+    </p:bg>
+    <p:spTree>
+      <p:nvGrpSpPr>
+        <p:cNvPr id="1" name=""/>
+        <p:cNvGrpSpPr/>
+        <p:nvPr/>
+      </p:nvGrpSpPr>
+      <p:grpSpPr/>
+      <p:sp>
+        <p:nvSpPr>
+          <p:cNvPr id="2" name="TextBox 1"/>
+          <p:cNvSpPr txBox="1"/>
+          <p:nvPr/>
+        </p:nvSpPr>
+        <p:spPr>
+          <a:xfrm>
+            <a:off x="200025" y="180975"/>
+            <a:ext cx="8943975" cy="361950"/>
+          </a:xfrm>
+          <a:prstGeom prst="rect">
+            <a:avLst/>
+          </a:prstGeom>
+          <a:noFill/>
+        </p:spPr>
+        <p:txBody>
+          <a:bodyPr wrap="square" lIns="0" rIns="0" tIns="0" bIns="0">
+            <a:spAutoFit/>
+          </a:bodyPr>
+          <a:lstStyle/>
+          <a:p>
+            <a:pPr algn="l">
+              <a:lnSpc>
+                <a:spcPct val="100000"/>
+              </a:lnSpc>
+              <a:spcBef>
+                <a:spcPts val="0"/>
+              </a:spcBef>
+              <a:spcAft>
+                <a:spcPts val="0"/>
+              </a:spcAft>
+            </a:pPr>
+            <a:r>
+              <a:rPr sz="1600" b="1">
+                <a:solidFill>
+                  <a:srgbClr val="E0E0E0"/>
+                </a:solidFill>
+                <a:latin typeface="Arial"/>
+              </a:rPr>
+              <a:t>📈 Figures Demo</a:t>
+            </a:r>
+          </a:p>
+        </p:txBody>
+      </p:sp>
+      <p:sp>
+        <p:nvSpPr>
+          <p:cNvPr id="3" name="TextBox 2"/>
+          <p:cNvSpPr txBox="1"/>
+          <p:nvPr/>
+        </p:nvSpPr>
+        <p:spPr>
+          <a:xfrm>
+            <a:off x="200025" y="542925"/>
+            <a:ext cx="8943975" cy="274320"/>
+          </a:xfrm>
+          <a:prstGeom prst="rect">
+            <a:avLst/>
+          </a:prstGeom>
+          <a:noFill/>
+        </p:spPr>
+        <p:txBody>
+          <a:bodyPr wrap="square" lIns="0" rIns="0" tIns="0" bIns="0">
+            <a:spAutoFit/>
+          </a:bodyPr>
+          <a:lstStyle/>
+          <a:p>
+            <a:pPr algn="l">
+              <a:lnSpc>
+                <a:spcPct val="100000"/>
+              </a:lnSpc>
+              <a:spcBef>
+                <a:spcPts val="0"/>
+              </a:spcBef>
+              <a:spcAft>
+                <a:spcPts val="0"/>
+              </a:spcAft>
+            </a:pPr>
+            <a:r>
+              <a:rPr sz="1000">
+                <a:solidFill>
+                  <a:srgbClr val="E0E0E0"/>
+                </a:solidFill>
+                <a:latin typeface="Arial"/>
+              </a:rPr>
+              <a:t>Bar chart (80% width):</a:t>
+            </a:r>
+          </a:p>
+        </p:txBody>
+      </p:sp>
+      <p:pic>
+        <p:nvPicPr>
+          <p:cNvPr id="4" name="Picture 3" descr="chart_bar.png"/>
+          <p:cNvPicPr>
+            <a:picLocks noChangeAspect="1"/>
+          </p:cNvPicPr>
+          <p:nvPr/>
+        </p:nvPicPr>
+        <p:blipFill>
+          <a:blip r:embed="rId2"/>
+          <a:stretch>
+            <a:fillRect/>
+          </a:stretch>
+        </p:blipFill>
+        <p:spPr>
+          <a:xfrm>
+            <a:off x="200025" y="676274"/>
+            <a:ext cx="4457700" cy="3343275"/>
+          </a:xfrm>
+          <a:prstGeom prst="rect">
+            <a:avLst/>
+          </a:prstGeom>
+        </p:spPr>
+      </p:pic>
+      <p:sp>
+        <p:nvSpPr>
+          <p:cNvPr id="5" name="TextBox 4"/>
+          <p:cNvSpPr txBox="1"/>
+          <p:nvPr/>
+        </p:nvSpPr>
+        <p:spPr>
+          <a:xfrm>
+            <a:off x="200025" y="3619499"/>
+            <a:ext cx="4457700" cy="274320"/>
+          </a:xfrm>
+          <a:prstGeom prst="rect">
+            <a:avLst/>
+          </a:prstGeom>
+          <a:noFill/>
+        </p:spPr>
+        <p:txBody>
+          <a:bodyPr wrap="square" lIns="0" rIns="0" tIns="0" bIns="0">
+            <a:spAutoFit/>
+          </a:bodyPr>
+          <a:lstStyle/>
+          <a:p>
+            <a:pPr algn="ctr">
+              <a:lnSpc>
+                <a:spcPct val="100000"/>
+              </a:lnSpc>
+              <a:spcBef>
+                <a:spcPts val="0"/>
+              </a:spcBef>
+              <a:spcAft>
+                <a:spcPts val="0"/>
+              </a:spcAft>
+            </a:pPr>
+            <a:r>
+              <a:rPr sz="1000" i="1">
+                <a:solidFill>
+                  <a:srgbClr val="CCCCCC"/>
+                </a:solidFill>
+                <a:latin typeface="Arial"/>
+              </a:rPr>
+              <a:t>Sample bar chart demonstrating data visualization with proper scaling</a:t>
+            </a:r>
+          </a:p>
+        </p:txBody>
+      </p:sp>
+      <p:sp>
+        <p:nvSpPr>
+          <p:cNvPr id="6" name="TextBox 5"/>
+          <p:cNvSpPr txBox="1"/>
+          <p:nvPr/>
+        </p:nvSpPr>
+        <p:spPr>
+          <a:xfrm>
+            <a:off x="200025" y="3848099"/>
+            <a:ext cx="8943975" cy="274320"/>
+          </a:xfrm>
+          <a:prstGeom prst="rect">
+            <a:avLst/>
+          </a:prstGeom>
+          <a:noFill/>
+        </p:spPr>
+        <p:txBody>
+          <a:bodyPr wrap="square" lIns="0" rIns="0" tIns="0" bIns="0">
+            <a:spAutoFit/>
+          </a:bodyPr>
+          <a:lstStyle/>
+          <a:p>
+            <a:pPr algn="l">
+              <a:lnSpc>
+                <a:spcPct val="100000"/>
+              </a:lnSpc>
+              <a:spcBef>
+                <a:spcPts val="0"/>
+              </a:spcBef>
+              <a:spcAft>
+                <a:spcPts val="0"/>
+              </a:spcAft>
+            </a:pPr>
+            <a:r>
+              <a:rPr sz="1000">
+                <a:solidFill>
+                  <a:srgbClr val="E0E0E0"/>
+                </a:solidFill>
+                <a:latin typeface="Arial"/>
+              </a:rPr>
+              <a:t>Pie chart (60% height):</a:t>
+            </a:r>
+          </a:p>
+        </p:txBody>
+      </p:sp>
+    </p:spTree>
+  </p:cSld>
+  <p:clrMapOvr>
+    <a:masterClrMapping/>
+  </p:clrMapOvr>
+</p:sld>
+</file>
+
+<file path=ppt/slides/slide22.xml><?xml version="1.0" encoding="utf-8"?>
 <p:sld xmlns:a="http://schemas.openxmlformats.org/drawingml/2006/main" xmlns:p="http://schemas.openxmlformats.org/presentationml/2006/main" xmlns:r="http://schemas.openxmlformats.org/officeDocument/2006/relationships">
   <p:cSld>
     <p:bg>
@@ -13568,7 +14722,7 @@
 </p:sld>
 </file>
 
-<file path=ppt/slides/slide21.xml><?xml version="1.0" encoding="utf-8"?>
+<file path=ppt/slides/slide23.xml><?xml version="1.0" encoding="utf-8"?>
 <p:sld xmlns:a="http://schemas.openxmlformats.org/drawingml/2006/main" xmlns:p="http://schemas.openxmlformats.org/presentationml/2006/main" xmlns:r="http://schemas.openxmlformats.org/officeDocument/2006/relationships">
   <p:cSld>
     <p:bg>
@@ -13753,7 +14907,7 @@
 </p:sld>
 </file>
 
-<file path=ppt/slides/slide22.xml><?xml version="1.0" encoding="utf-8"?>
+<file path=ppt/slides/slide24.xml><?xml version="1.0" encoding="utf-8"?>
 <p:sld xmlns:a="http://schemas.openxmlformats.org/drawingml/2006/main" xmlns:p="http://schemas.openxmlformats.org/presentationml/2006/main" xmlns:r="http://schemas.openxmlformats.org/officeDocument/2006/relationships">
   <p:cSld>
     <p:bg>
@@ -14403,7 +15557,7 @@
 </p:sld>
 </file>
 
-<file path=ppt/slides/slide23.xml><?xml version="1.0" encoding="utf-8"?>
+<file path=ppt/slides/slide25.xml><?xml version="1.0" encoding="utf-8"?>
 <p:sld xmlns:a="http://schemas.openxmlformats.org/drawingml/2006/main" xmlns:p="http://schemas.openxmlformats.org/presentationml/2006/main" xmlns:r="http://schemas.openxmlformats.org/officeDocument/2006/relationships">
   <p:cSld>
     <p:bg>
@@ -15594,7 +16748,7 @@
 </p:sld>
 </file>
 
-<file path=ppt/slides/slide24.xml><?xml version="1.0" encoding="utf-8"?>
+<file path=ppt/slides/slide26.xml><?xml version="1.0" encoding="utf-8"?>
 <p:sld xmlns:a="http://schemas.openxmlformats.org/drawingml/2006/main" xmlns:p="http://schemas.openxmlformats.org/presentationml/2006/main" xmlns:r="http://schemas.openxmlformats.org/officeDocument/2006/relationships">
   <p:cSld>
     <p:bg>
@@ -22015,4 +23169,324 @@
   </a:objectDefaults>
   <a:extraClrSchemeLst/>
 </a:theme>
+</file>
+
+<file path=ppt/theme/theme2.xml><?xml version="1.0" encoding="utf-8"?>
+<a:theme xmlns:a="http://schemas.openxmlformats.org/drawingml/2006/main" name="Office Theme">
+  <a:themeElements>
+    <a:clrScheme name="Office">
+      <a:dk1>
+        <a:sysClr val="windowText" lastClr="000000"/>
+      </a:dk1>
+      <a:lt1>
+        <a:sysClr val="window" lastClr="FFFFFF"/>
+      </a:lt1>
+      <a:dk2>
+        <a:srgbClr val="1F497D"/>
+      </a:dk2>
+      <a:lt2>
+        <a:srgbClr val="EEECE1"/>
+      </a:lt2>
+      <a:accent1>
+        <a:srgbClr val="4F81BD"/>
+      </a:accent1>
+      <a:accent2>
+        <a:srgbClr val="C0504D"/>
+      </a:accent2>
+      <a:accent3>
+        <a:srgbClr val="9BBB59"/>
+      </a:accent3>
+      <a:accent4>
+        <a:srgbClr val="8064A2"/>
+      </a:accent4>
+      <a:accent5>
+        <a:srgbClr val="4BACC6"/>
+      </a:accent5>
+      <a:accent6>
+        <a:srgbClr val="F79646"/>
+      </a:accent6>
+      <a:hlink>
+        <a:srgbClr val="0000FF"/>
+      </a:hlink>
+      <a:folHlink>
+        <a:srgbClr val="800080"/>
+      </a:folHlink>
+    </a:clrScheme>
+    <a:fontScheme name="Office">
+      <a:majorFont>
+        <a:latin typeface="Calibri"/>
+        <a:ea typeface=""/>
+        <a:cs typeface=""/>
+        <a:font script="Jpan" typeface="ＭＳ Ｐゴシック"/>
+        <a:font script="Hang" typeface="맑은 고딕"/>
+        <a:font script="Hans" typeface="宋体"/>
+        <a:font script="Hant" typeface="新細明體"/>
+        <a:font script="Arab" typeface="Times New Roman"/>
+        <a:font script="Hebr" typeface="Times New Roman"/>
+        <a:font script="Thai" typeface="Angsana New"/>
+        <a:font script="Ethi" typeface="Nyala"/>
+        <a:font script="Beng" typeface="Vrinda"/>
+        <a:font script="Gujr" typeface="Shruti"/>
+        <a:font script="Khmr" typeface="MoolBoran"/>
+        <a:font script="Knda" typeface="Tunga"/>
+        <a:font script="Guru" typeface="Raavi"/>
+        <a:font script="Cans" typeface="Euphemia"/>
+        <a:font script="Cher" typeface="Plantagenet Cherokee"/>
+        <a:font script="Yiii" typeface="Microsoft Yi Baiti"/>
+        <a:font script="Tibt" typeface="Microsoft Himalaya"/>
+        <a:font script="Thaa" typeface="MV Boli"/>
+        <a:font script="Deva" typeface="Mangal"/>
+        <a:font script="Telu" typeface="Gautami"/>
+        <a:font script="Taml" typeface="Latha"/>
+        <a:font script="Syrc" typeface="Estrangelo Edessa"/>
+        <a:font script="Orya" typeface="Kalinga"/>
+        <a:font script="Mlym" typeface="Kartika"/>
+        <a:font script="Laoo" typeface="DokChampa"/>
+        <a:font script="Sinh" typeface="Iskoola Pota"/>
+        <a:font script="Mong" typeface="Mongolian Baiti"/>
+        <a:font script="Viet" typeface="Times New Roman"/>
+        <a:font script="Uigh" typeface="Microsoft Uighur"/>
+        <a:font script="Geor" typeface="Sylfaen"/>
+      </a:majorFont>
+      <a:minorFont>
+        <a:latin typeface="Calibri"/>
+        <a:ea typeface=""/>
+        <a:cs typeface=""/>
+        <a:font script="Jpan" typeface="ＭＳ Ｐゴシック"/>
+        <a:font script="Hang" typeface="맑은 고딕"/>
+        <a:font script="Hans" typeface="宋体"/>
+        <a:font script="Hant" typeface="新細明體"/>
+        <a:font script="Arab" typeface="Arial"/>
+        <a:font script="Hebr" typeface="Arial"/>
+        <a:font script="Thai" typeface="Cordia New"/>
+        <a:font script="Ethi" typeface="Nyala"/>
+        <a:font script="Beng" typeface="Vrinda"/>
+        <a:font script="Gujr" typeface="Shruti"/>
+        <a:font script="Khmr" typeface="DaunPenh"/>
+        <a:font script="Knda" typeface="Tunga"/>
+        <a:font script="Guru" typeface="Raavi"/>
+        <a:font script="Cans" typeface="Euphemia"/>
+        <a:font script="Cher" typeface="Plantagenet Cherokee"/>
+        <a:font script="Yiii" typeface="Microsoft Yi Baiti"/>
+        <a:font script="Tibt" typeface="Microsoft Himalaya"/>
+        <a:font script="Thaa" typeface="MV Boli"/>
+        <a:font script="Deva" typeface="Mangal"/>
+        <a:font script="Telu" typeface="Gautami"/>
+        <a:font script="Taml" typeface="Latha"/>
+        <a:font script="Syrc" typeface="Estrangelo Edessa"/>
+        <a:font script="Orya" typeface="Kalinga"/>
+        <a:font script="Mlym" typeface="Kartika"/>
+        <a:font script="Laoo" typeface="DokChampa"/>
+        <a:font script="Sinh" typeface="Iskoola Pota"/>
+        <a:font script="Mong" typeface="Mongolian Baiti"/>
+        <a:font script="Viet" typeface="Arial"/>
+        <a:font script="Uigh" typeface="Microsoft Uighur"/>
+        <a:font script="Geor" typeface="Sylfaen"/>
+      </a:minorFont>
+    </a:fontScheme>
+    <a:fmtScheme name="Office">
+      <a:fillStyleLst>
+        <a:solidFill>
+          <a:schemeClr val="phClr"/>
+        </a:solidFill>
+        <a:gradFill rotWithShape="1">
+          <a:gsLst>
+            <a:gs pos="0">
+              <a:schemeClr val="phClr">
+                <a:tint val="50000"/>
+                <a:satMod val="300000"/>
+              </a:schemeClr>
+            </a:gs>
+            <a:gs pos="35000">
+              <a:schemeClr val="phClr">
+                <a:tint val="37000"/>
+                <a:satMod val="300000"/>
+              </a:schemeClr>
+            </a:gs>
+            <a:gs pos="100000">
+              <a:schemeClr val="phClr">
+                <a:tint val="15000"/>
+                <a:satMod val="350000"/>
+              </a:schemeClr>
+            </a:gs>
+          </a:gsLst>
+          <a:lin ang="16200000" scaled="1"/>
+        </a:gradFill>
+        <a:gradFill rotWithShape="1">
+          <a:gsLst>
+            <a:gs pos="0">
+              <a:schemeClr val="phClr">
+                <a:tint val="100000"/>
+                <a:shade val="100000"/>
+                <a:satMod val="130000"/>
+              </a:schemeClr>
+            </a:gs>
+            <a:gs pos="100000">
+              <a:schemeClr val="phClr">
+                <a:tint val="50000"/>
+                <a:shade val="100000"/>
+                <a:satMod val="350000"/>
+              </a:schemeClr>
+            </a:gs>
+          </a:gsLst>
+          <a:lin ang="16200000" scaled="0"/>
+        </a:gradFill>
+      </a:fillStyleLst>
+      <a:lnStyleLst>
+        <a:ln w="9525" cap="flat" cmpd="sng" algn="ctr">
+          <a:solidFill>
+            <a:schemeClr val="phClr">
+              <a:shade val="95000"/>
+              <a:satMod val="105000"/>
+            </a:schemeClr>
+          </a:solidFill>
+          <a:prstDash val="solid"/>
+        </a:ln>
+        <a:ln w="25400" cap="flat" cmpd="sng" algn="ctr">
+          <a:solidFill>
+            <a:schemeClr val="phClr"/>
+          </a:solidFill>
+          <a:prstDash val="solid"/>
+        </a:ln>
+        <a:ln w="38100" cap="flat" cmpd="sng" algn="ctr">
+          <a:solidFill>
+            <a:schemeClr val="phClr"/>
+          </a:solidFill>
+          <a:prstDash val="solid"/>
+        </a:ln>
+      </a:lnStyleLst>
+      <a:effectStyleLst>
+        <a:effectStyle>
+          <a:effectLst>
+            <a:outerShdw blurRad="40000" dist="20000" dir="5400000" rotWithShape="0">
+              <a:srgbClr val="000000">
+                <a:alpha val="38000"/>
+              </a:srgbClr>
+            </a:outerShdw>
+          </a:effectLst>
+        </a:effectStyle>
+        <a:effectStyle>
+          <a:effectLst>
+            <a:outerShdw blurRad="40000" dist="23000" dir="5400000" rotWithShape="0">
+              <a:srgbClr val="000000">
+                <a:alpha val="35000"/>
+              </a:srgbClr>
+            </a:outerShdw>
+          </a:effectLst>
+        </a:effectStyle>
+        <a:effectStyle>
+          <a:effectLst>
+            <a:outerShdw blurRad="40000" dist="23000" dir="5400000" rotWithShape="0">
+              <a:srgbClr val="000000">
+                <a:alpha val="35000"/>
+              </a:srgbClr>
+            </a:outerShdw>
+          </a:effectLst>
+          <a:scene3d>
+            <a:camera prst="orthographicFront">
+              <a:rot lat="0" lon="0" rev="0"/>
+            </a:camera>
+            <a:lightRig rig="threePt" dir="t">
+              <a:rot lat="0" lon="0" rev="1200000"/>
+            </a:lightRig>
+          </a:scene3d>
+          <a:sp3d>
+            <a:bevelT w="63500" h="25400"/>
+          </a:sp3d>
+        </a:effectStyle>
+      </a:effectStyleLst>
+      <a:bgFillStyleLst>
+        <a:solidFill>
+          <a:schemeClr val="phClr"/>
+        </a:solidFill>
+        <a:gradFill rotWithShape="1">
+          <a:gsLst>
+            <a:gs pos="0">
+              <a:schemeClr val="phClr">
+                <a:tint val="40000"/>
+                <a:satMod val="350000"/>
+              </a:schemeClr>
+            </a:gs>
+            <a:gs pos="40000">
+              <a:schemeClr val="phClr">
+                <a:tint val="45000"/>
+                <a:shade val="99000"/>
+                <a:satMod val="350000"/>
+              </a:schemeClr>
+            </a:gs>
+            <a:gs pos="100000">
+              <a:schemeClr val="phClr">
+                <a:shade val="20000"/>
+                <a:satMod val="255000"/>
+              </a:schemeClr>
+            </a:gs>
+          </a:gsLst>
+          <a:path path="circle">
+            <a:fillToRect l="50000" t="-80000" r="50000" b="180000"/>
+          </a:path>
+        </a:gradFill>
+        <a:gradFill rotWithShape="1">
+          <a:gsLst>
+            <a:gs pos="0">
+              <a:schemeClr val="phClr">
+                <a:tint val="80000"/>
+                <a:satMod val="300000"/>
+              </a:schemeClr>
+            </a:gs>
+            <a:gs pos="100000">
+              <a:schemeClr val="phClr">
+                <a:shade val="30000"/>
+                <a:satMod val="200000"/>
+              </a:schemeClr>
+            </a:gs>
+          </a:gsLst>
+          <a:path path="circle">
+            <a:fillToRect l="50000" t="50000" r="50000" b="50000"/>
+          </a:path>
+        </a:gradFill>
+      </a:bgFillStyleLst>
+    </a:fmtScheme>
+  </a:themeElements>
+  <a:objectDefaults>
+    <a:spDef>
+      <a:spPr/>
+      <a:bodyPr/>
+      <a:lstStyle/>
+      <a:style>
+        <a:lnRef idx="1">
+          <a:schemeClr val="accent1"/>
+        </a:lnRef>
+        <a:fillRef idx="3">
+          <a:schemeClr val="accent1"/>
+        </a:fillRef>
+        <a:effectRef idx="2">
+          <a:schemeClr val="accent1"/>
+        </a:effectRef>
+        <a:fontRef idx="minor">
+          <a:schemeClr val="lt1"/>
+        </a:fontRef>
+      </a:style>
+    </a:spDef>
+    <a:lnDef>
+      <a:spPr/>
+      <a:bodyPr/>
+      <a:lstStyle/>
+      <a:style>
+        <a:lnRef idx="2">
+          <a:schemeClr val="accent1"/>
+        </a:lnRef>
+        <a:fillRef idx="0">
+          <a:schemeClr val="accent1"/>
+        </a:fillRef>
+        <a:effectRef idx="1">
+          <a:schemeClr val="accent1"/>
+        </a:effectRef>
+        <a:fontRef idx="minor">
+          <a:schemeClr val="tx1"/>
+        </a:fontRef>
+      </a:style>
+    </a:lnDef>
+  </a:objectDefaults>
+  <a:extraClrSchemeLst/>
+</a:theme>
 </file>
</xml_diff>